<commit_message>
Ajout première partie ppt présentation
</commit_message>
<xml_diff>
--- a/Remise/Remise 1/Presentation_Remise_1.pptx
+++ b/Remise/Remise 1/Presentation_Remise_1.pptx
@@ -7,7 +7,16 @@
   <p:sldIdLst>
     <p:sldId id="256" r:id="rId2"/>
     <p:sldId id="258" r:id="rId3"/>
-    <p:sldId id="257" r:id="rId4"/>
+    <p:sldId id="259" r:id="rId4"/>
+    <p:sldId id="257" r:id="rId5"/>
+    <p:sldId id="260" r:id="rId6"/>
+    <p:sldId id="261" r:id="rId7"/>
+    <p:sldId id="262" r:id="rId8"/>
+    <p:sldId id="263" r:id="rId9"/>
+    <p:sldId id="264" r:id="rId10"/>
+    <p:sldId id="265" r:id="rId11"/>
+    <p:sldId id="266" r:id="rId12"/>
+    <p:sldId id="267" r:id="rId13"/>
   </p:sldIdLst>
   <p:sldSz cx="12192000" cy="6858000"/>
   <p:notesSz cx="6858000" cy="9144000"/>
@@ -6501,7 +6510,23 @@
           <a:bodyPr/>
           <a:lstStyle/>
           <a:p>
-            <a:endParaRPr lang="en-US"/>
+            <a:r>
+              <a:rPr lang="fr-CA" dirty="0"/>
+              <a:t>Simulation d’une alimentation des électroaimants d’un accélérateur de</a:t>
+            </a:r>
+            <a:r>
+              <a:rPr lang="fr-CA" b="1" cap="all" dirty="0"/>
+              <a:t> </a:t>
+            </a:r>
+            <a:r>
+              <a:rPr lang="fr-CA" dirty="0"/>
+              <a:t>particules.</a:t>
+            </a:r>
+            <a:r>
+              <a:rPr lang="en-US" dirty="0"/>
+              <a:t> </a:t>
+            </a:r>
+            <a:endParaRPr lang="en-US" dirty="0"/>
           </a:p>
         </p:txBody>
       </p:sp>
@@ -6520,7 +6545,15 @@
           <a:bodyPr/>
           <a:lstStyle/>
           <a:p>
-            <a:endParaRPr lang="en-US"/>
+            <a:r>
+              <a:rPr lang="fr-FR" dirty="0" smtClean="0"/>
+              <a:t>Par l’équipe </a:t>
+            </a:r>
+            <a:r>
+              <a:rPr lang="fr-FR" dirty="0" err="1" smtClean="0"/>
+              <a:t>Électrosim</a:t>
+            </a:r>
+            <a:endParaRPr lang="fr-FR" dirty="0"/>
           </a:p>
         </p:txBody>
       </p:sp>
@@ -6544,6 +6577,294 @@
 </p:sld>
 </file>
 
+<file path=ppt/slides/slide10.xml><?xml version="1.0" encoding="utf-8"?>
+<p:sld xmlns:a="http://schemas.openxmlformats.org/drawingml/2006/main" xmlns:r="http://schemas.openxmlformats.org/officeDocument/2006/relationships" xmlns:p="http://schemas.openxmlformats.org/presentationml/2006/main">
+  <p:cSld>
+    <p:spTree>
+      <p:nvGrpSpPr>
+        <p:cNvPr id="1" name=""/>
+        <p:cNvGrpSpPr/>
+        <p:nvPr/>
+      </p:nvGrpSpPr>
+      <p:grpSpPr>
+        <a:xfrm>
+          <a:off x="0" y="0"/>
+          <a:ext cx="0" cy="0"/>
+          <a:chOff x="0" y="0"/>
+          <a:chExt cx="0" cy="0"/>
+        </a:xfrm>
+      </p:grpSpPr>
+      <p:sp>
+        <p:nvSpPr>
+          <p:cNvPr id="4" name="Title 1"/>
+          <p:cNvSpPr>
+            <a:spLocks noGrp="1"/>
+          </p:cNvSpPr>
+          <p:nvPr>
+            <p:ph type="title"/>
+          </p:nvPr>
+        </p:nvSpPr>
+        <p:spPr>
+          <a:xfrm>
+            <a:off x="677334" y="609600"/>
+            <a:ext cx="8596668" cy="1320800"/>
+          </a:xfrm>
+        </p:spPr>
+        <p:txBody>
+          <a:bodyPr/>
+          <a:lstStyle/>
+          <a:p>
+            <a:r>
+              <a:rPr lang="en-US" dirty="0" err="1" smtClean="0"/>
+              <a:t>État</a:t>
+            </a:r>
+            <a:r>
+              <a:rPr lang="en-US" dirty="0" smtClean="0"/>
+              <a:t> de la situation (2/2)</a:t>
+            </a:r>
+            <a:endParaRPr lang="en-US" dirty="0"/>
+          </a:p>
+        </p:txBody>
+      </p:sp>
+      <p:sp>
+        <p:nvSpPr>
+          <p:cNvPr id="5" name="Content Placeholder 2"/>
+          <p:cNvSpPr>
+            <a:spLocks noGrp="1"/>
+          </p:cNvSpPr>
+          <p:nvPr>
+            <p:ph idx="1"/>
+          </p:nvPr>
+        </p:nvSpPr>
+        <p:spPr>
+          <a:xfrm>
+            <a:off x="677334" y="2160589"/>
+            <a:ext cx="8596668" cy="3880773"/>
+          </a:xfrm>
+        </p:spPr>
+        <p:txBody>
+          <a:bodyPr>
+            <a:normAutofit/>
+          </a:bodyPr>
+          <a:lstStyle/>
+          <a:p>
+            <a:pPr marL="0" indent="0">
+              <a:buNone/>
+            </a:pPr>
+            <a:r>
+              <a:rPr lang="en-US" sz="2800" dirty="0" smtClean="0"/>
+              <a:t>Tests </a:t>
+            </a:r>
+            <a:r>
+              <a:rPr lang="en-US" sz="2800" dirty="0" err="1" smtClean="0"/>
+              <a:t>préliminaires</a:t>
+            </a:r>
+            <a:endParaRPr lang="en-US" sz="2800" dirty="0"/>
+          </a:p>
+        </p:txBody>
+      </p:sp>
+    </p:spTree>
+    <p:extLst>
+      <p:ext uri="{BB962C8B-B14F-4D97-AF65-F5344CB8AC3E}">
+        <p14:creationId xmlns:p14="http://schemas.microsoft.com/office/powerpoint/2010/main" val="3692122036"/>
+      </p:ext>
+    </p:extLst>
+  </p:cSld>
+  <p:clrMapOvr>
+    <a:masterClrMapping/>
+  </p:clrMapOvr>
+</p:sld>
+</file>
+
+<file path=ppt/slides/slide11.xml><?xml version="1.0" encoding="utf-8"?>
+<p:sld xmlns:a="http://schemas.openxmlformats.org/drawingml/2006/main" xmlns:r="http://schemas.openxmlformats.org/officeDocument/2006/relationships" xmlns:p="http://schemas.openxmlformats.org/presentationml/2006/main">
+  <p:cSld>
+    <p:spTree>
+      <p:nvGrpSpPr>
+        <p:cNvPr id="1" name=""/>
+        <p:cNvGrpSpPr/>
+        <p:nvPr/>
+      </p:nvGrpSpPr>
+      <p:grpSpPr>
+        <a:xfrm>
+          <a:off x="0" y="0"/>
+          <a:ext cx="0" cy="0"/>
+          <a:chOff x="0" y="0"/>
+          <a:chExt cx="0" cy="0"/>
+        </a:xfrm>
+      </p:grpSpPr>
+      <p:sp>
+        <p:nvSpPr>
+          <p:cNvPr id="2" name="Title 1"/>
+          <p:cNvSpPr>
+            <a:spLocks noGrp="1"/>
+          </p:cNvSpPr>
+          <p:nvPr>
+            <p:ph type="title"/>
+          </p:nvPr>
+        </p:nvSpPr>
+        <p:spPr/>
+        <p:txBody>
+          <a:bodyPr/>
+          <a:lstStyle/>
+          <a:p>
+            <a:r>
+              <a:rPr lang="fr-FR" b="1" dirty="0"/>
+              <a:t>Diagramme de </a:t>
+            </a:r>
+            <a:r>
+              <a:rPr lang="fr-FR" b="1" dirty="0" smtClean="0"/>
+              <a:t>contexte</a:t>
+            </a:r>
+            <a:r>
+              <a:rPr lang="fr-FR" dirty="0"/>
+              <a:t/>
+            </a:r>
+            <a:br>
+              <a:rPr lang="fr-FR" dirty="0"/>
+            </a:br>
+            <a:endParaRPr lang="en-US" dirty="0"/>
+          </a:p>
+        </p:txBody>
+      </p:sp>
+      <p:sp>
+        <p:nvSpPr>
+          <p:cNvPr id="4" name="TextBox 3"/>
+          <p:cNvSpPr txBox="1"/>
+          <p:nvPr/>
+        </p:nvSpPr>
+        <p:spPr>
+          <a:xfrm flipH="1">
+            <a:off x="4806735" y="-989472"/>
+            <a:ext cx="3521850" cy="4179537"/>
+          </a:xfrm>
+          <a:prstGeom prst="rect">
+            <a:avLst/>
+          </a:prstGeom>
+          <a:noFill/>
+        </p:spPr>
+        <p:txBody>
+          <a:bodyPr wrap="square" rtlCol="0">
+            <a:spAutoFit/>
+          </a:bodyPr>
+          <a:lstStyle/>
+          <a:p>
+            <a:endParaRPr lang="fr-CA"/>
+          </a:p>
+        </p:txBody>
+      </p:sp>
+      <p:pic>
+        <p:nvPicPr>
+          <p:cNvPr id="6" name="Picture 5" descr="Contexte_D4 - New Page.png"/>
+          <p:cNvPicPr>
+            <a:picLocks noChangeAspect="1"/>
+          </p:cNvPicPr>
+          <p:nvPr/>
+        </p:nvPicPr>
+        <p:blipFill>
+          <a:blip r:embed="rId2">
+            <a:extLst>
+              <a:ext uri="{28A0092B-C50C-407E-A947-70E740481C1C}">
+                <a14:useLocalDpi xmlns:a14="http://schemas.microsoft.com/office/drawing/2010/main" val="0"/>
+              </a:ext>
+            </a:extLst>
+          </a:blip>
+          <a:stretch>
+            <a:fillRect/>
+          </a:stretch>
+        </p:blipFill>
+        <p:spPr>
+          <a:xfrm>
+            <a:off x="343790" y="1314373"/>
+            <a:ext cx="9839897" cy="4982184"/>
+          </a:xfrm>
+          <a:prstGeom prst="rect">
+            <a:avLst/>
+          </a:prstGeom>
+        </p:spPr>
+      </p:pic>
+    </p:spTree>
+    <p:extLst>
+      <p:ext uri="{BB962C8B-B14F-4D97-AF65-F5344CB8AC3E}">
+        <p14:creationId xmlns:p14="http://schemas.microsoft.com/office/powerpoint/2010/main" val="3337306044"/>
+      </p:ext>
+    </p:extLst>
+  </p:cSld>
+  <p:clrMapOvr>
+    <a:masterClrMapping/>
+  </p:clrMapOvr>
+</p:sld>
+</file>
+
+<file path=ppt/slides/slide12.xml><?xml version="1.0" encoding="utf-8"?>
+<p:sld xmlns:a="http://schemas.openxmlformats.org/drawingml/2006/main" xmlns:r="http://schemas.openxmlformats.org/officeDocument/2006/relationships" xmlns:p="http://schemas.openxmlformats.org/presentationml/2006/main">
+  <p:cSld>
+    <p:spTree>
+      <p:nvGrpSpPr>
+        <p:cNvPr id="1" name=""/>
+        <p:cNvGrpSpPr/>
+        <p:nvPr/>
+      </p:nvGrpSpPr>
+      <p:grpSpPr>
+        <a:xfrm>
+          <a:off x="0" y="0"/>
+          <a:ext cx="0" cy="0"/>
+          <a:chOff x="0" y="0"/>
+          <a:chExt cx="0" cy="0"/>
+        </a:xfrm>
+      </p:grpSpPr>
+      <p:sp>
+        <p:nvSpPr>
+          <p:cNvPr id="2" name="Title 1"/>
+          <p:cNvSpPr>
+            <a:spLocks noGrp="1"/>
+          </p:cNvSpPr>
+          <p:nvPr>
+            <p:ph type="title"/>
+          </p:nvPr>
+        </p:nvSpPr>
+        <p:spPr/>
+        <p:txBody>
+          <a:bodyPr/>
+          <a:lstStyle/>
+          <a:p>
+            <a:r>
+              <a:rPr lang="en-US" dirty="0" err="1" smtClean="0"/>
+              <a:t>Diagramme</a:t>
+            </a:r>
+            <a:r>
+              <a:rPr lang="en-US" dirty="0" smtClean="0"/>
+              <a:t> des </a:t>
+            </a:r>
+            <a:r>
+              <a:rPr lang="en-US" dirty="0" err="1" smtClean="0"/>
+              <a:t>propriétés</a:t>
+            </a:r>
+            <a:r>
+              <a:rPr lang="en-US" dirty="0" smtClean="0"/>
+              <a:t> </a:t>
+            </a:r>
+            <a:r>
+              <a:rPr lang="en-US" dirty="0" err="1" smtClean="0"/>
+              <a:t>fonctionnelles</a:t>
+            </a:r>
+            <a:endParaRPr lang="en-US" dirty="0"/>
+          </a:p>
+        </p:txBody>
+      </p:sp>
+    </p:spTree>
+    <p:extLst>
+      <p:ext uri="{BB962C8B-B14F-4D97-AF65-F5344CB8AC3E}">
+        <p14:creationId xmlns:p14="http://schemas.microsoft.com/office/powerpoint/2010/main" val="261770818"/>
+      </p:ext>
+    </p:extLst>
+  </p:cSld>
+  <p:clrMapOvr>
+    <a:masterClrMapping/>
+  </p:clrMapOvr>
+</p:sld>
+</file>
+
 <file path=ppt/slides/slide2.xml><?xml version="1.0" encoding="utf-8"?>
 <p:sld xmlns:a="http://schemas.openxmlformats.org/drawingml/2006/main" xmlns:r="http://schemas.openxmlformats.org/officeDocument/2006/relationships" xmlns:p="http://schemas.openxmlformats.org/presentationml/2006/main">
   <p:cSld>
@@ -6561,6 +6882,102 @@
           <a:chExt cx="0" cy="0"/>
         </a:xfrm>
       </p:grpSpPr>
+      <p:sp>
+        <p:nvSpPr>
+          <p:cNvPr id="3" name="Title 2"/>
+          <p:cNvSpPr>
+            <a:spLocks noGrp="1"/>
+          </p:cNvSpPr>
+          <p:nvPr>
+            <p:ph type="title"/>
+          </p:nvPr>
+        </p:nvSpPr>
+        <p:spPr/>
+        <p:txBody>
+          <a:bodyPr/>
+          <a:lstStyle/>
+          <a:p>
+            <a:r>
+              <a:rPr lang="fr-FR" dirty="0" smtClean="0"/>
+              <a:t>Contexte et problématique</a:t>
+            </a:r>
+            <a:endParaRPr lang="fr-FR" dirty="0"/>
+          </a:p>
+        </p:txBody>
+      </p:sp>
+      <p:sp>
+        <p:nvSpPr>
+          <p:cNvPr id="4" name="Content Placeholder 3"/>
+          <p:cNvSpPr>
+            <a:spLocks noGrp="1"/>
+          </p:cNvSpPr>
+          <p:nvPr>
+            <p:ph idx="1"/>
+          </p:nvPr>
+        </p:nvSpPr>
+        <p:spPr/>
+        <p:txBody>
+          <a:bodyPr>
+            <a:normAutofit fontScale="92500"/>
+          </a:bodyPr>
+          <a:lstStyle/>
+          <a:p>
+            <a:r>
+              <a:rPr lang="fr-CA" dirty="0" smtClean="0"/>
+              <a:t>Le CERN: Organisation européenne pour la recherche nucléaire</a:t>
+            </a:r>
+          </a:p>
+          <a:p>
+            <a:pPr lvl="1"/>
+            <a:r>
+              <a:rPr lang="fr-CA" dirty="0" smtClean="0"/>
+              <a:t>Recherche sur les particules fondamentales</a:t>
+            </a:r>
+          </a:p>
+          <a:p>
+            <a:pPr lvl="1"/>
+            <a:r>
+              <a:rPr lang="fr-CA" dirty="0" smtClean="0"/>
+              <a:t>Utilisation d’accélérateurs de particules pour créer des collisions à haute énergie (~8TeV total)</a:t>
+            </a:r>
+          </a:p>
+          <a:p>
+            <a:pPr lvl="1"/>
+            <a:r>
+              <a:rPr lang="fr-CA" dirty="0" smtClean="0"/>
+              <a:t>Nécessite des alimentations électroniques de haute puissance</a:t>
+            </a:r>
+          </a:p>
+          <a:p>
+            <a:r>
+              <a:rPr lang="fr-CA" dirty="0" smtClean="0"/>
+              <a:t>Le laboratoire du CERN désir remplacer l’alimentation actuelle du Booster du Synchrotron.</a:t>
+            </a:r>
+          </a:p>
+          <a:p>
+            <a:pPr lvl="1"/>
+            <a:r>
+              <a:rPr lang="fr-CA" dirty="0" smtClean="0"/>
+              <a:t>Nécessite la conception d’une nouvelle alimentation électronique à haute puissance </a:t>
+            </a:r>
+          </a:p>
+          <a:p>
+            <a:pPr lvl="1"/>
+            <a:r>
+              <a:rPr lang="fr-CA" dirty="0" smtClean="0"/>
+              <a:t>La nouvelle alimentation doit permettre une augmentation de puissance et une meilleure efficacité.</a:t>
+            </a:r>
+          </a:p>
+          <a:p>
+            <a:pPr lvl="1"/>
+            <a:r>
+              <a:rPr lang="fr-CA" dirty="0" smtClean="0"/>
+              <a:t>Une telle conception requiert un outil de CAO permettant de tester plusieurs configurations</a:t>
+            </a:r>
+            <a:endParaRPr lang="fr-CA" dirty="0"/>
+          </a:p>
+        </p:txBody>
+      </p:sp>
     </p:spTree>
     <p:extLst>
       <p:ext uri="{BB962C8B-B14F-4D97-AF65-F5344CB8AC3E}">
@@ -6598,6 +7015,258 @@
           <a:chExt cx="0" cy="0"/>
         </a:xfrm>
       </p:grpSpPr>
+      <p:sp>
+        <p:nvSpPr>
+          <p:cNvPr id="2" name="Title 1"/>
+          <p:cNvSpPr>
+            <a:spLocks noGrp="1"/>
+          </p:cNvSpPr>
+          <p:nvPr>
+            <p:ph type="title"/>
+          </p:nvPr>
+        </p:nvSpPr>
+        <p:spPr/>
+        <p:txBody>
+          <a:bodyPr/>
+          <a:lstStyle/>
+          <a:p>
+            <a:r>
+              <a:rPr lang="en-US" dirty="0" err="1" smtClean="0"/>
+              <a:t>Objectifs</a:t>
+            </a:r>
+            <a:endParaRPr lang="en-US" dirty="0"/>
+          </a:p>
+        </p:txBody>
+      </p:sp>
+      <p:sp>
+        <p:nvSpPr>
+          <p:cNvPr id="3" name="Content Placeholder 2"/>
+          <p:cNvSpPr>
+            <a:spLocks noGrp="1"/>
+          </p:cNvSpPr>
+          <p:nvPr>
+            <p:ph idx="1"/>
+          </p:nvPr>
+        </p:nvSpPr>
+        <p:spPr/>
+        <p:txBody>
+          <a:bodyPr>
+            <a:normAutofit/>
+          </a:bodyPr>
+          <a:lstStyle/>
+          <a:p>
+            <a:r>
+              <a:rPr lang="fr-CA" dirty="0"/>
+              <a:t>Livrer </a:t>
+            </a:r>
+            <a:r>
+              <a:rPr lang="fr-CA" dirty="0" smtClean="0"/>
+              <a:t>3 outils </a:t>
+            </a:r>
+            <a:r>
+              <a:rPr lang="fr-CA" dirty="0"/>
+              <a:t>de </a:t>
+            </a:r>
+            <a:r>
+              <a:rPr lang="fr-CA" dirty="0" smtClean="0"/>
+              <a:t>dimensionnement</a:t>
+            </a:r>
+          </a:p>
+          <a:p>
+            <a:pPr lvl="1"/>
+            <a:r>
+              <a:rPr lang="fr-CA" dirty="0" smtClean="0"/>
+              <a:t>Convivial</a:t>
+            </a:r>
+          </a:p>
+          <a:p>
+            <a:pPr lvl="1"/>
+            <a:r>
+              <a:rPr lang="fr-CA" dirty="0" smtClean="0"/>
+              <a:t>Utilise des paramètres usuels </a:t>
+            </a:r>
+          </a:p>
+          <a:p>
+            <a:r>
+              <a:rPr lang="fr-CA" dirty="0" smtClean="0"/>
+              <a:t>Livrer 3 outils de simulation</a:t>
+            </a:r>
+          </a:p>
+          <a:p>
+            <a:pPr marL="742950" lvl="2" indent="-342900"/>
+            <a:r>
+              <a:rPr lang="fr-CA" dirty="0" err="1"/>
+              <a:t>Matlab</a:t>
+            </a:r>
+            <a:r>
+              <a:rPr lang="fr-CA" dirty="0"/>
+              <a:t> (Simulink), </a:t>
+            </a:r>
+            <a:r>
+              <a:rPr lang="fr-CA" dirty="0" err="1"/>
+              <a:t>Opal</a:t>
+            </a:r>
+            <a:r>
+              <a:rPr lang="fr-CA" dirty="0"/>
+              <a:t>-RT, </a:t>
+            </a:r>
+            <a:r>
+              <a:rPr lang="fr-CA" dirty="0" smtClean="0"/>
+              <a:t>PSIM</a:t>
+            </a:r>
+          </a:p>
+          <a:p>
+            <a:r>
+              <a:rPr lang="fr-CA" dirty="0" smtClean="0"/>
+              <a:t>Documenter le fonctionnement des outils de dimensionnement et de simulation</a:t>
+            </a:r>
+          </a:p>
+          <a:p>
+            <a:pPr lvl="1"/>
+            <a:r>
+              <a:rPr lang="fr-CA" dirty="0" smtClean="0"/>
+              <a:t>Présenter des exemples d’utilisation</a:t>
+            </a:r>
+          </a:p>
+        </p:txBody>
+      </p:sp>
+    </p:spTree>
+    <p:extLst>
+      <p:ext uri="{BB962C8B-B14F-4D97-AF65-F5344CB8AC3E}">
+        <p14:creationId xmlns:p14="http://schemas.microsoft.com/office/powerpoint/2010/main" val="1618535019"/>
+      </p:ext>
+    </p:extLst>
+  </p:cSld>
+  <p:clrMapOvr>
+    <a:masterClrMapping/>
+  </p:clrMapOvr>
+  <p:timing>
+    <p:tnLst>
+      <p:par>
+        <p:cTn xmlns:p14="http://schemas.microsoft.com/office/powerpoint/2010/main" id="1" dur="indefinite" restart="never" nodeType="tmRoot"/>
+      </p:par>
+    </p:tnLst>
+  </p:timing>
+</p:sld>
+</file>
+
+<file path=ppt/slides/slide4.xml><?xml version="1.0" encoding="utf-8"?>
+<p:sld xmlns:a="http://schemas.openxmlformats.org/drawingml/2006/main" xmlns:r="http://schemas.openxmlformats.org/officeDocument/2006/relationships" xmlns:p="http://schemas.openxmlformats.org/presentationml/2006/main">
+  <p:cSld>
+    <p:spTree>
+      <p:nvGrpSpPr>
+        <p:cNvPr id="1" name=""/>
+        <p:cNvGrpSpPr/>
+        <p:nvPr/>
+      </p:nvGrpSpPr>
+      <p:grpSpPr>
+        <a:xfrm>
+          <a:off x="0" y="0"/>
+          <a:ext cx="0" cy="0"/>
+          <a:chOff x="0" y="0"/>
+          <a:chExt cx="0" cy="0"/>
+        </a:xfrm>
+      </p:grpSpPr>
+      <p:sp>
+        <p:nvSpPr>
+          <p:cNvPr id="2" name="Title 1"/>
+          <p:cNvSpPr>
+            <a:spLocks noGrp="1"/>
+          </p:cNvSpPr>
+          <p:nvPr>
+            <p:ph type="title"/>
+          </p:nvPr>
+        </p:nvSpPr>
+        <p:spPr/>
+        <p:txBody>
+          <a:bodyPr/>
+          <a:lstStyle/>
+          <a:p>
+            <a:r>
+              <a:rPr lang="en-US" dirty="0" err="1" smtClean="0"/>
+              <a:t>Exigences</a:t>
+            </a:r>
+            <a:r>
+              <a:rPr lang="en-US" dirty="0" smtClean="0"/>
+              <a:t> du client (1/2)</a:t>
+            </a:r>
+            <a:endParaRPr lang="en-US" dirty="0"/>
+          </a:p>
+        </p:txBody>
+      </p:sp>
+      <p:sp>
+        <p:nvSpPr>
+          <p:cNvPr id="3" name="Content Placeholder 2"/>
+          <p:cNvSpPr>
+            <a:spLocks noGrp="1"/>
+          </p:cNvSpPr>
+          <p:nvPr>
+            <p:ph idx="1"/>
+          </p:nvPr>
+        </p:nvSpPr>
+        <p:spPr>
+          <a:xfrm>
+            <a:off x="677334" y="1801726"/>
+            <a:ext cx="10811388" cy="5419942"/>
+          </a:xfrm>
+        </p:spPr>
+        <p:txBody>
+          <a:bodyPr>
+            <a:normAutofit/>
+          </a:bodyPr>
+          <a:lstStyle/>
+          <a:p>
+            <a:r>
+              <a:rPr lang="fr-FR" sz="2000" dirty="0"/>
+              <a:t>Modéliser une cellule de base d'un onduleur triphasé à 3 niveaux de type NPC</a:t>
+            </a:r>
+          </a:p>
+          <a:p>
+            <a:r>
+              <a:rPr lang="fr-FR" sz="2000" dirty="0"/>
+              <a:t>Modéliser la commande dans le cas de l'onduleur de type AFE.</a:t>
+            </a:r>
+          </a:p>
+          <a:p>
+            <a:r>
+              <a:rPr lang="fr-FR" sz="2000" dirty="0"/>
+              <a:t>Implanter le modèle de la configuration de base d'un onduleur triphasé à 3 niveaux NPC dans un simulateur</a:t>
+            </a:r>
+          </a:p>
+          <a:p>
+            <a:r>
+              <a:rPr lang="fr-FR" sz="2000" dirty="0"/>
+              <a:t>Implanter le modèle de la commande dans le cas de l'onduleur de type AFE dans un simulateur</a:t>
+            </a:r>
+          </a:p>
+          <a:p>
+            <a:r>
+              <a:rPr lang="fr-FR" sz="2000" dirty="0"/>
+              <a:t>Fournir un outil de </a:t>
+            </a:r>
+            <a:r>
+              <a:rPr lang="fr-FR" sz="2000" dirty="0" smtClean="0"/>
+              <a:t>dimensionnement </a:t>
+            </a:r>
+            <a:r>
+              <a:rPr lang="fr-FR" sz="2000" dirty="0"/>
+              <a:t>pour l'onduleur de type AFE</a:t>
+            </a:r>
+          </a:p>
+          <a:p>
+            <a:r>
+              <a:rPr lang="fr-FR" sz="2000" dirty="0"/>
+              <a:t>Modéliser un convertisseur CC-CC à 4 quadrants à l'aide de plusieurs cellules de type onduleur NPC</a:t>
+            </a:r>
+          </a:p>
+          <a:p>
+            <a:r>
+              <a:rPr lang="fr-FR" sz="2000" dirty="0"/>
+              <a:t>Modéliser la commande d'un convertisseur CC-CC à 4 quadrants </a:t>
+            </a:r>
+          </a:p>
+        </p:txBody>
+      </p:sp>
     </p:spTree>
     <p:extLst>
       <p:ext uri="{BB962C8B-B14F-4D97-AF65-F5344CB8AC3E}">
@@ -6615,6 +7284,733 @@
       </p:par>
     </p:tnLst>
   </p:timing>
+</p:sld>
+</file>
+
+<file path=ppt/slides/slide5.xml><?xml version="1.0" encoding="utf-8"?>
+<p:sld xmlns:a="http://schemas.openxmlformats.org/drawingml/2006/main" xmlns:r="http://schemas.openxmlformats.org/officeDocument/2006/relationships" xmlns:p="http://schemas.openxmlformats.org/presentationml/2006/main">
+  <p:cSld>
+    <p:spTree>
+      <p:nvGrpSpPr>
+        <p:cNvPr id="1" name=""/>
+        <p:cNvGrpSpPr/>
+        <p:nvPr/>
+      </p:nvGrpSpPr>
+      <p:grpSpPr>
+        <a:xfrm>
+          <a:off x="0" y="0"/>
+          <a:ext cx="0" cy="0"/>
+          <a:chOff x="0" y="0"/>
+          <a:chExt cx="0" cy="0"/>
+        </a:xfrm>
+      </p:grpSpPr>
+      <p:sp>
+        <p:nvSpPr>
+          <p:cNvPr id="2" name="Title 1"/>
+          <p:cNvSpPr>
+            <a:spLocks noGrp="1"/>
+          </p:cNvSpPr>
+          <p:nvPr>
+            <p:ph type="title"/>
+          </p:nvPr>
+        </p:nvSpPr>
+        <p:spPr/>
+        <p:txBody>
+          <a:bodyPr/>
+          <a:lstStyle/>
+          <a:p>
+            <a:r>
+              <a:rPr lang="en-US" dirty="0" err="1" smtClean="0"/>
+              <a:t>Exigences</a:t>
+            </a:r>
+            <a:r>
+              <a:rPr lang="en-US" dirty="0" smtClean="0"/>
+              <a:t> du client (2/2)</a:t>
+            </a:r>
+            <a:endParaRPr lang="en-US" dirty="0"/>
+          </a:p>
+        </p:txBody>
+      </p:sp>
+      <p:sp>
+        <p:nvSpPr>
+          <p:cNvPr id="3" name="Content Placeholder 2"/>
+          <p:cNvSpPr>
+            <a:spLocks noGrp="1"/>
+          </p:cNvSpPr>
+          <p:nvPr>
+            <p:ph idx="1"/>
+          </p:nvPr>
+        </p:nvSpPr>
+        <p:spPr>
+          <a:xfrm>
+            <a:off x="677333" y="1683575"/>
+            <a:ext cx="9378989" cy="4932595"/>
+          </a:xfrm>
+        </p:spPr>
+        <p:txBody>
+          <a:bodyPr>
+            <a:normAutofit/>
+          </a:bodyPr>
+          <a:lstStyle/>
+          <a:p>
+            <a:r>
+              <a:rPr lang="fr-FR" sz="2000" dirty="0"/>
+              <a:t>Implanter le modèle d'un convertisseur CC-CC à 4 quadrants à l'aide de plusieurs cellules de type onduleur NPC avec des inductances de découplage dans un simulateur</a:t>
+            </a:r>
+          </a:p>
+          <a:p>
+            <a:r>
+              <a:rPr lang="fr-FR" sz="2000" dirty="0"/>
+              <a:t>Implanter le modèle de la commande d'un convertisseur CC-CC à 4 quadrants alimentant la charge spécifiée dans un simulateur</a:t>
+            </a:r>
+          </a:p>
+          <a:p>
+            <a:r>
+              <a:rPr lang="fr-FR" sz="2000" dirty="0"/>
+              <a:t>Fournir un outil de </a:t>
+            </a:r>
+            <a:r>
+              <a:rPr lang="fr-FR" sz="2000" dirty="0" smtClean="0"/>
+              <a:t>dimensionnement </a:t>
+            </a:r>
+            <a:r>
+              <a:rPr lang="fr-FR" sz="2000" dirty="0"/>
+              <a:t>pour le convertisseur CC-CC  à 4 quadrants</a:t>
+            </a:r>
+          </a:p>
+          <a:p>
+            <a:r>
+              <a:rPr lang="fr-FR" sz="2000" dirty="0"/>
+              <a:t>Implanter le modèle complet de l'alimentation du Booster</a:t>
+            </a:r>
+          </a:p>
+          <a:p>
+            <a:r>
+              <a:rPr lang="fr-FR" sz="2000" dirty="0"/>
+              <a:t>Effectuer la validation croisée des configurations implantées à l'aide de 3 simulateurs (PSIM, </a:t>
+            </a:r>
+            <a:r>
+              <a:rPr lang="fr-FR" sz="2000" dirty="0" err="1"/>
+              <a:t>SimPowerSystems</a:t>
+            </a:r>
+            <a:r>
+              <a:rPr lang="fr-FR" sz="2000" dirty="0"/>
+              <a:t>, </a:t>
+            </a:r>
+            <a:r>
+              <a:rPr lang="fr-FR" sz="2000" dirty="0" err="1"/>
+              <a:t>Opal</a:t>
+            </a:r>
+            <a:r>
+              <a:rPr lang="fr-FR" sz="2000" dirty="0"/>
+              <a:t>-RT)</a:t>
+            </a:r>
+          </a:p>
+          <a:p>
+            <a:r>
+              <a:rPr lang="fr-FR" sz="2000" dirty="0"/>
+              <a:t>Livrer une documentation pédagogique pour les divers outils de dimensionnement et de simulation</a:t>
+            </a:r>
+            <a:endParaRPr lang="en-US" sz="2000" dirty="0"/>
+          </a:p>
+          <a:p>
+            <a:endParaRPr lang="en-US" sz="1600" dirty="0"/>
+          </a:p>
+        </p:txBody>
+      </p:sp>
+    </p:spTree>
+    <p:extLst>
+      <p:ext uri="{BB962C8B-B14F-4D97-AF65-F5344CB8AC3E}">
+        <p14:creationId xmlns:p14="http://schemas.microsoft.com/office/powerpoint/2010/main" val="2996529324"/>
+      </p:ext>
+    </p:extLst>
+  </p:cSld>
+  <p:clrMapOvr>
+    <a:masterClrMapping/>
+  </p:clrMapOvr>
+</p:sld>
+</file>
+
+<file path=ppt/slides/slide6.xml><?xml version="1.0" encoding="utf-8"?>
+<p:sld xmlns:a="http://schemas.openxmlformats.org/drawingml/2006/main" xmlns:r="http://schemas.openxmlformats.org/officeDocument/2006/relationships" xmlns:p="http://schemas.openxmlformats.org/presentationml/2006/main">
+  <p:cSld>
+    <p:spTree>
+      <p:nvGrpSpPr>
+        <p:cNvPr id="1" name=""/>
+        <p:cNvGrpSpPr/>
+        <p:nvPr/>
+      </p:nvGrpSpPr>
+      <p:grpSpPr>
+        <a:xfrm>
+          <a:off x="0" y="0"/>
+          <a:ext cx="0" cy="0"/>
+          <a:chOff x="0" y="0"/>
+          <a:chExt cx="0" cy="0"/>
+        </a:xfrm>
+      </p:grpSpPr>
+      <p:sp>
+        <p:nvSpPr>
+          <p:cNvPr id="2" name="Title 1"/>
+          <p:cNvSpPr>
+            <a:spLocks noGrp="1"/>
+          </p:cNvSpPr>
+          <p:nvPr>
+            <p:ph type="title"/>
+          </p:nvPr>
+        </p:nvSpPr>
+        <p:spPr/>
+        <p:txBody>
+          <a:bodyPr/>
+          <a:lstStyle/>
+          <a:p>
+            <a:r>
+              <a:rPr lang="en-US" dirty="0" err="1" smtClean="0"/>
+              <a:t>Méthodologie</a:t>
+            </a:r>
+            <a:r>
+              <a:rPr lang="en-US" dirty="0" smtClean="0"/>
+              <a:t> </a:t>
+            </a:r>
+            <a:r>
+              <a:rPr lang="en-US" dirty="0" err="1" smtClean="0"/>
+              <a:t>planifiée</a:t>
+            </a:r>
+            <a:r>
+              <a:rPr lang="en-US" dirty="0" smtClean="0"/>
+              <a:t> (1/3)</a:t>
+            </a:r>
+            <a:endParaRPr lang="en-US" dirty="0"/>
+          </a:p>
+        </p:txBody>
+      </p:sp>
+      <p:sp>
+        <p:nvSpPr>
+          <p:cNvPr id="3" name="Content Placeholder 2"/>
+          <p:cNvSpPr>
+            <a:spLocks noGrp="1"/>
+          </p:cNvSpPr>
+          <p:nvPr>
+            <p:ph idx="1"/>
+          </p:nvPr>
+        </p:nvSpPr>
+        <p:spPr/>
+        <p:txBody>
+          <a:bodyPr>
+            <a:normAutofit fontScale="92500" lnSpcReduction="10000"/>
+          </a:bodyPr>
+          <a:lstStyle/>
+          <a:p>
+            <a:pPr marL="0" indent="0">
+              <a:buNone/>
+            </a:pPr>
+            <a:r>
+              <a:rPr lang="en-US" sz="2800" dirty="0" err="1" smtClean="0"/>
+              <a:t>Gestion</a:t>
+            </a:r>
+            <a:endParaRPr lang="en-US" sz="2800" dirty="0" smtClean="0"/>
+          </a:p>
+          <a:p>
+            <a:r>
+              <a:rPr lang="en-US" dirty="0" err="1" smtClean="0"/>
+              <a:t>Réunions</a:t>
+            </a:r>
+            <a:r>
+              <a:rPr lang="en-US" dirty="0" smtClean="0"/>
+              <a:t> </a:t>
+            </a:r>
+            <a:r>
+              <a:rPr lang="en-US" dirty="0" err="1" smtClean="0"/>
+              <a:t>hebdomadaires</a:t>
+            </a:r>
+            <a:endParaRPr lang="en-US" dirty="0"/>
+          </a:p>
+          <a:p>
+            <a:r>
+              <a:rPr lang="fr-FR" dirty="0"/>
+              <a:t>T</a:t>
+            </a:r>
+            <a:r>
+              <a:rPr lang="fr-FR" dirty="0" smtClean="0"/>
+              <a:t>âches de chacun des membres sont tenues à jour au moyen d’un fichier </a:t>
+            </a:r>
+            <a:r>
+              <a:rPr lang="fr-FR" dirty="0" err="1" smtClean="0"/>
+              <a:t>excel</a:t>
+            </a:r>
+            <a:r>
+              <a:rPr lang="fr-FR" dirty="0" smtClean="0"/>
+              <a:t> de gestion hebdomadaire</a:t>
+            </a:r>
+          </a:p>
+          <a:p>
+            <a:pPr lvl="1"/>
+            <a:r>
+              <a:rPr lang="fr-FR" dirty="0" smtClean="0"/>
+              <a:t>Gain en souplesse et en efficacité de gestion</a:t>
+            </a:r>
+          </a:p>
+          <a:p>
+            <a:pPr lvl="1"/>
+            <a:r>
+              <a:rPr lang="fr-FR" dirty="0" smtClean="0"/>
+              <a:t>Adapté pour la taille de l’équipe</a:t>
+            </a:r>
+          </a:p>
+          <a:p>
+            <a:pPr lvl="1"/>
+            <a:r>
+              <a:rPr lang="fr-FR" dirty="0" smtClean="0"/>
+              <a:t>Maximise l’efficacité des réunions</a:t>
+            </a:r>
+          </a:p>
+          <a:p>
+            <a:r>
+              <a:rPr lang="fr-FR" dirty="0" smtClean="0"/>
+              <a:t>Mise à jour de révision et suivi effectué au moyen de la plateforme </a:t>
+            </a:r>
+            <a:r>
+              <a:rPr lang="fr-FR" dirty="0" err="1" smtClean="0"/>
+              <a:t>GitHub</a:t>
+            </a:r>
+            <a:endParaRPr lang="fr-FR" dirty="0" smtClean="0"/>
+          </a:p>
+          <a:p>
+            <a:pPr lvl="1"/>
+            <a:r>
+              <a:rPr lang="fr-FR" dirty="0" smtClean="0"/>
+              <a:t>Données sécurisées sur un serveur privé</a:t>
+            </a:r>
+          </a:p>
+          <a:p>
+            <a:pPr lvl="1"/>
+            <a:r>
+              <a:rPr lang="fr-FR" dirty="0" smtClean="0"/>
+              <a:t>Permet le travail collaboratif</a:t>
+            </a:r>
+          </a:p>
+          <a:p>
+            <a:pPr lvl="1"/>
+            <a:r>
+              <a:rPr lang="fr-FR" dirty="0" err="1" smtClean="0"/>
+              <a:t>Multi-plateforme</a:t>
+            </a:r>
+            <a:endParaRPr lang="fr-FR" dirty="0" smtClean="0"/>
+          </a:p>
+          <a:p>
+            <a:pPr lvl="1"/>
+            <a:endParaRPr lang="fr-FR" dirty="0" smtClean="0"/>
+          </a:p>
+          <a:p>
+            <a:pPr marL="457200" lvl="1" indent="0">
+              <a:buNone/>
+            </a:pPr>
+            <a:endParaRPr lang="en-US" dirty="0" smtClean="0"/>
+          </a:p>
+        </p:txBody>
+      </p:sp>
+    </p:spTree>
+    <p:extLst>
+      <p:ext uri="{BB962C8B-B14F-4D97-AF65-F5344CB8AC3E}">
+        <p14:creationId xmlns:p14="http://schemas.microsoft.com/office/powerpoint/2010/main" val="483988721"/>
+      </p:ext>
+    </p:extLst>
+  </p:cSld>
+  <p:clrMapOvr>
+    <a:masterClrMapping/>
+  </p:clrMapOvr>
+</p:sld>
+</file>
+
+<file path=ppt/slides/slide7.xml><?xml version="1.0" encoding="utf-8"?>
+<p:sld xmlns:a="http://schemas.openxmlformats.org/drawingml/2006/main" xmlns:r="http://schemas.openxmlformats.org/officeDocument/2006/relationships" xmlns:p="http://schemas.openxmlformats.org/presentationml/2006/main">
+  <p:cSld>
+    <p:spTree>
+      <p:nvGrpSpPr>
+        <p:cNvPr id="1" name=""/>
+        <p:cNvGrpSpPr/>
+        <p:nvPr/>
+      </p:nvGrpSpPr>
+      <p:grpSpPr>
+        <a:xfrm>
+          <a:off x="0" y="0"/>
+          <a:ext cx="0" cy="0"/>
+          <a:chOff x="0" y="0"/>
+          <a:chExt cx="0" cy="0"/>
+        </a:xfrm>
+      </p:grpSpPr>
+      <p:sp>
+        <p:nvSpPr>
+          <p:cNvPr id="4" name="Title 3"/>
+          <p:cNvSpPr>
+            <a:spLocks noGrp="1"/>
+          </p:cNvSpPr>
+          <p:nvPr>
+            <p:ph type="title"/>
+          </p:nvPr>
+        </p:nvSpPr>
+        <p:spPr/>
+        <p:txBody>
+          <a:bodyPr/>
+          <a:lstStyle/>
+          <a:p>
+            <a:r>
+              <a:rPr lang="fr-FR" dirty="0" smtClean="0"/>
+              <a:t>Méthodologie planifiée (2/3)</a:t>
+            </a:r>
+            <a:endParaRPr lang="fr-FR" dirty="0"/>
+          </a:p>
+        </p:txBody>
+      </p:sp>
+      <p:sp>
+        <p:nvSpPr>
+          <p:cNvPr id="5" name="Content Placeholder 4"/>
+          <p:cNvSpPr>
+            <a:spLocks noGrp="1"/>
+          </p:cNvSpPr>
+          <p:nvPr>
+            <p:ph idx="1"/>
+          </p:nvPr>
+        </p:nvSpPr>
+        <p:spPr>
+          <a:xfrm>
+            <a:off x="573965" y="1314373"/>
+            <a:ext cx="9925368" cy="5543627"/>
+          </a:xfrm>
+        </p:spPr>
+        <p:txBody>
+          <a:bodyPr>
+            <a:normAutofit lnSpcReduction="10000"/>
+          </a:bodyPr>
+          <a:lstStyle/>
+          <a:p>
+            <a:pPr marL="0" indent="0">
+              <a:buNone/>
+            </a:pPr>
+            <a:r>
+              <a:rPr lang="fr-FR" sz="2800" dirty="0" smtClean="0"/>
+              <a:t>Réalisation pratique</a:t>
+            </a:r>
+          </a:p>
+          <a:p>
+            <a:r>
+              <a:rPr lang="fr-FR" sz="2200" dirty="0" smtClean="0"/>
+              <a:t>Modélisation de chacune des composantes en employant d’abord les modèles idéaux, puis en y ajoutant des caractéristiques linéaires et non linéaires jusqu’à représenter, de manière la plus exacte possible (en prenant en compte les limitations techniques liées à l’exécution du simulation), le comportement de la composante en question</a:t>
+            </a:r>
+          </a:p>
+          <a:p>
+            <a:r>
+              <a:rPr lang="fr-FR" sz="2200" dirty="0" smtClean="0"/>
+              <a:t>Intégration du modèle de composante dans un sous-bloc paramétrable et aisément </a:t>
+            </a:r>
+            <a:r>
+              <a:rPr lang="fr-FR" sz="2200" dirty="0" err="1" smtClean="0"/>
+              <a:t>duplicable</a:t>
+            </a:r>
+            <a:endParaRPr lang="fr-FR" sz="2200" dirty="0" smtClean="0"/>
+          </a:p>
+          <a:p>
+            <a:pPr lvl="1"/>
+            <a:r>
+              <a:rPr lang="fr-FR" sz="2200" dirty="0" smtClean="0"/>
+              <a:t>Essais sur les différents simulateurs pour valider le comportement</a:t>
+            </a:r>
+          </a:p>
+          <a:p>
+            <a:r>
+              <a:rPr lang="fr-FR" sz="2200" dirty="0" smtClean="0"/>
+              <a:t>Intégration des différents </a:t>
+            </a:r>
+            <a:r>
+              <a:rPr lang="fr-FR" sz="2200" dirty="0" err="1" smtClean="0"/>
+              <a:t>modèl</a:t>
+            </a:r>
+            <a:r>
+              <a:rPr lang="fr-FR" sz="2200" dirty="0" smtClean="0"/>
+              <a:t> es de composantes de manière à réaliser le redresseur NPC</a:t>
+            </a:r>
+          </a:p>
+          <a:p>
+            <a:r>
+              <a:rPr lang="fr-FR" sz="2200" dirty="0" smtClean="0"/>
+              <a:t>Modélisation d’une commande “</a:t>
+            </a:r>
+            <a:r>
+              <a:rPr lang="fr-FR" sz="2200" dirty="0" err="1" smtClean="0"/>
+              <a:t>Multilevel</a:t>
+            </a:r>
+            <a:r>
+              <a:rPr lang="fr-FR" sz="2200" dirty="0" smtClean="0"/>
+              <a:t> </a:t>
+            </a:r>
+            <a:r>
+              <a:rPr lang="fr-FR" sz="2200" dirty="0" err="1" smtClean="0"/>
+              <a:t>Space</a:t>
+            </a:r>
+            <a:r>
+              <a:rPr lang="fr-FR" sz="2200" dirty="0" smtClean="0"/>
+              <a:t> </a:t>
+            </a:r>
+            <a:r>
+              <a:rPr lang="fr-FR" sz="2200" dirty="0" err="1" smtClean="0"/>
+              <a:t>Vector</a:t>
+            </a:r>
+            <a:r>
+              <a:rPr lang="fr-FR" sz="2200" dirty="0" smtClean="0"/>
+              <a:t> PWM” et intégration au redresseur NPC</a:t>
+            </a:r>
+          </a:p>
+          <a:p>
+            <a:pPr marL="742950" lvl="2" indent="-342900"/>
+            <a:r>
+              <a:rPr lang="fr-FR" sz="2000" dirty="0" smtClean="0"/>
+              <a:t>Essais sur les différents simulateurs pour valider le comportement</a:t>
+            </a:r>
+          </a:p>
+          <a:p>
+            <a:endParaRPr lang="en-US" dirty="0"/>
+          </a:p>
+          <a:p>
+            <a:pPr lvl="1"/>
+            <a:endParaRPr lang="fr-FR" dirty="0"/>
+          </a:p>
+          <a:p>
+            <a:pPr marL="457200" lvl="1" indent="0">
+              <a:buNone/>
+            </a:pPr>
+            <a:endParaRPr lang="en-US" dirty="0"/>
+          </a:p>
+          <a:p>
+            <a:endParaRPr lang="en-US" dirty="0"/>
+          </a:p>
+        </p:txBody>
+      </p:sp>
+    </p:spTree>
+    <p:extLst>
+      <p:ext uri="{BB962C8B-B14F-4D97-AF65-F5344CB8AC3E}">
+        <p14:creationId xmlns:p14="http://schemas.microsoft.com/office/powerpoint/2010/main" val="1125282991"/>
+      </p:ext>
+    </p:extLst>
+  </p:cSld>
+  <p:clrMapOvr>
+    <a:masterClrMapping/>
+  </p:clrMapOvr>
+</p:sld>
+</file>
+
+<file path=ppt/slides/slide8.xml><?xml version="1.0" encoding="utf-8"?>
+<p:sld xmlns:a="http://schemas.openxmlformats.org/drawingml/2006/main" xmlns:r="http://schemas.openxmlformats.org/officeDocument/2006/relationships" xmlns:p="http://schemas.openxmlformats.org/presentationml/2006/main">
+  <p:cSld>
+    <p:spTree>
+      <p:nvGrpSpPr>
+        <p:cNvPr id="1" name=""/>
+        <p:cNvGrpSpPr/>
+        <p:nvPr/>
+      </p:nvGrpSpPr>
+      <p:grpSpPr>
+        <a:xfrm>
+          <a:off x="0" y="0"/>
+          <a:ext cx="0" cy="0"/>
+          <a:chOff x="0" y="0"/>
+          <a:chExt cx="0" cy="0"/>
+        </a:xfrm>
+      </p:grpSpPr>
+      <p:sp>
+        <p:nvSpPr>
+          <p:cNvPr id="2" name="Title 1"/>
+          <p:cNvSpPr>
+            <a:spLocks noGrp="1"/>
+          </p:cNvSpPr>
+          <p:nvPr>
+            <p:ph type="title"/>
+          </p:nvPr>
+        </p:nvSpPr>
+        <p:spPr/>
+        <p:txBody>
+          <a:bodyPr/>
+          <a:lstStyle/>
+          <a:p>
+            <a:r>
+              <a:rPr lang="fr-FR" dirty="0"/>
+              <a:t>Méthodologie planifiée </a:t>
+            </a:r>
+            <a:r>
+              <a:rPr lang="fr-FR" dirty="0" smtClean="0"/>
+              <a:t>(3/</a:t>
+            </a:r>
+            <a:r>
+              <a:rPr lang="fr-FR" dirty="0"/>
+              <a:t>3)</a:t>
+            </a:r>
+            <a:endParaRPr lang="en-US" dirty="0"/>
+          </a:p>
+        </p:txBody>
+      </p:sp>
+      <p:sp>
+        <p:nvSpPr>
+          <p:cNvPr id="3" name="Content Placeholder 2"/>
+          <p:cNvSpPr>
+            <a:spLocks noGrp="1"/>
+          </p:cNvSpPr>
+          <p:nvPr>
+            <p:ph idx="1"/>
+          </p:nvPr>
+        </p:nvSpPr>
+        <p:spPr/>
+        <p:txBody>
+          <a:bodyPr>
+            <a:normAutofit lnSpcReduction="10000"/>
+          </a:bodyPr>
+          <a:lstStyle/>
+          <a:p>
+            <a:r>
+              <a:rPr lang="fr-FR" sz="2200" dirty="0"/>
+              <a:t>Réalisation d’une boucle de contrôle permettant de maintenir la tension aux bornes de la banque de condensateurs constante selon l’appel de puissance</a:t>
+            </a:r>
+          </a:p>
+          <a:p>
+            <a:pPr marL="800100" lvl="3" indent="-342900"/>
+            <a:r>
+              <a:rPr lang="fr-FR" sz="1800" dirty="0"/>
+              <a:t>Essais sur les différents simulateurs pour valider le comportement</a:t>
+            </a:r>
+          </a:p>
+          <a:p>
+            <a:r>
+              <a:rPr lang="fr-FR" sz="2200" dirty="0"/>
+              <a:t>Adaptation du redresseur de manière à le convertir en onduleur pour le convertisseur 4 cadrans</a:t>
+            </a:r>
+          </a:p>
+          <a:p>
+            <a:r>
+              <a:rPr lang="fr-FR" sz="2200" dirty="0"/>
+              <a:t>Adaptation de la commande pour le convertisseur 4 cadrans</a:t>
+            </a:r>
+          </a:p>
+          <a:p>
+            <a:r>
+              <a:rPr lang="fr-FR" sz="2200" dirty="0"/>
+              <a:t>Réalisation d’une boucle de contrôle globale permettant de réinjecter la puissance des électroaimants dans le réseau</a:t>
+            </a:r>
+          </a:p>
+          <a:p>
+            <a:pPr marL="800100" lvl="3" indent="-342900"/>
+            <a:r>
+              <a:rPr lang="fr-FR" sz="1800" dirty="0"/>
+              <a:t>Essais sur les différents simulateurs pour valider le comportement</a:t>
+            </a:r>
+          </a:p>
+          <a:p>
+            <a:endParaRPr lang="en-US" dirty="0"/>
+          </a:p>
+        </p:txBody>
+      </p:sp>
+    </p:spTree>
+    <p:extLst>
+      <p:ext uri="{BB962C8B-B14F-4D97-AF65-F5344CB8AC3E}">
+        <p14:creationId xmlns:p14="http://schemas.microsoft.com/office/powerpoint/2010/main" val="2026603226"/>
+      </p:ext>
+    </p:extLst>
+  </p:cSld>
+  <p:clrMapOvr>
+    <a:masterClrMapping/>
+  </p:clrMapOvr>
+</p:sld>
+</file>
+
+<file path=ppt/slides/slide9.xml><?xml version="1.0" encoding="utf-8"?>
+<p:sld xmlns:a="http://schemas.openxmlformats.org/drawingml/2006/main" xmlns:r="http://schemas.openxmlformats.org/officeDocument/2006/relationships" xmlns:p="http://schemas.openxmlformats.org/presentationml/2006/main">
+  <p:cSld>
+    <p:spTree>
+      <p:nvGrpSpPr>
+        <p:cNvPr id="1" name=""/>
+        <p:cNvGrpSpPr/>
+        <p:nvPr/>
+      </p:nvGrpSpPr>
+      <p:grpSpPr>
+        <a:xfrm>
+          <a:off x="0" y="0"/>
+          <a:ext cx="0" cy="0"/>
+          <a:chOff x="0" y="0"/>
+          <a:chExt cx="0" cy="0"/>
+        </a:xfrm>
+      </p:grpSpPr>
+      <p:sp>
+        <p:nvSpPr>
+          <p:cNvPr id="2" name="Title 1"/>
+          <p:cNvSpPr>
+            <a:spLocks noGrp="1"/>
+          </p:cNvSpPr>
+          <p:nvPr>
+            <p:ph type="title"/>
+          </p:nvPr>
+        </p:nvSpPr>
+        <p:spPr/>
+        <p:txBody>
+          <a:bodyPr/>
+          <a:lstStyle/>
+          <a:p>
+            <a:r>
+              <a:rPr lang="en-US" dirty="0" err="1" smtClean="0"/>
+              <a:t>État</a:t>
+            </a:r>
+            <a:r>
+              <a:rPr lang="en-US" dirty="0" smtClean="0"/>
+              <a:t> de la situation (1/2)</a:t>
+            </a:r>
+            <a:endParaRPr lang="en-US" dirty="0"/>
+          </a:p>
+        </p:txBody>
+      </p:sp>
+      <p:sp>
+        <p:nvSpPr>
+          <p:cNvPr id="3" name="Content Placeholder 2"/>
+          <p:cNvSpPr>
+            <a:spLocks noGrp="1"/>
+          </p:cNvSpPr>
+          <p:nvPr>
+            <p:ph idx="1"/>
+          </p:nvPr>
+        </p:nvSpPr>
+        <p:spPr/>
+        <p:txBody>
+          <a:bodyPr>
+            <a:normAutofit/>
+          </a:bodyPr>
+          <a:lstStyle/>
+          <a:p>
+            <a:pPr marL="0" indent="0">
+              <a:buNone/>
+            </a:pPr>
+            <a:r>
+              <a:rPr lang="en-US" sz="2800" dirty="0" smtClean="0"/>
+              <a:t>Revue de </a:t>
+            </a:r>
+            <a:r>
+              <a:rPr lang="en-US" sz="2800" dirty="0" err="1" smtClean="0"/>
+              <a:t>l’état</a:t>
+            </a:r>
+            <a:r>
+              <a:rPr lang="en-US" sz="2800" dirty="0" smtClean="0"/>
+              <a:t> de </a:t>
+            </a:r>
+            <a:r>
+              <a:rPr lang="en-US" sz="2800" dirty="0" err="1" smtClean="0"/>
+              <a:t>l’art</a:t>
+            </a:r>
+            <a:endParaRPr lang="en-US" sz="2800" dirty="0"/>
+          </a:p>
+        </p:txBody>
+      </p:sp>
+    </p:spTree>
+    <p:extLst>
+      <p:ext uri="{BB962C8B-B14F-4D97-AF65-F5344CB8AC3E}">
+        <p14:creationId xmlns:p14="http://schemas.microsoft.com/office/powerpoint/2010/main" val="3915706220"/>
+      </p:ext>
+    </p:extLst>
+  </p:cSld>
+  <p:clrMapOvr>
+    <a:masterClrMapping/>
+  </p:clrMapOvr>
 </p:sld>
 </file>
 
@@ -6869,7 +8265,7 @@
   <a:extraClrSchemeLst/>
   <a:extLst>
     <a:ext uri="{05A4C25C-085E-4340-85A3-A5531E510DB2}">
-      <thm15:themeFamily xmlns:thm15="http://schemas.microsoft.com/office/thememl/2012/main" xmlns="" name="Facet" id="{C0C680CD-088A-49FC-A102-D699147F32B2}" vid="{CFBC31BA-B70F-4F30-BCAA-4F3011E16C4D}"/>
+      <thm15:themeFamily xmlns="" xmlns:thm15="http://schemas.microsoft.com/office/thememl/2012/main" name="Facet" id="{C0C680CD-088A-49FC-A102-D699147F32B2}" vid="{CFBC31BA-B70F-4F30-BCAA-4F3011E16C4D}"/>
     </a:ext>
   </a:extLst>
 </a:theme>

</xml_diff>

<commit_message>
Mise à jour présentation ppt, reste le Gantt à y mettre
</commit_message>
<xml_diff>
--- a/Remise/Remise 1/Presentation_Remise_1.pptx
+++ b/Remise/Remise 1/Presentation_Remise_1.pptx
@@ -17,6 +17,13 @@
     <p:sldId id="265" r:id="rId11"/>
     <p:sldId id="266" r:id="rId12"/>
     <p:sldId id="267" r:id="rId13"/>
+    <p:sldId id="271" r:id="rId14"/>
+    <p:sldId id="272" r:id="rId15"/>
+    <p:sldId id="273" r:id="rId16"/>
+    <p:sldId id="274" r:id="rId17"/>
+    <p:sldId id="268" r:id="rId18"/>
+    <p:sldId id="269" r:id="rId19"/>
+    <p:sldId id="270" r:id="rId20"/>
   </p:sldIdLst>
   <p:sldSz cx="12192000" cy="6858000"/>
   <p:notesSz cx="6858000" cy="9144000"/>
@@ -6526,7 +6533,6 @@
               <a:rPr lang="en-US" dirty="0"/>
               <a:t> </a:t>
             </a:r>
-            <a:endParaRPr lang="en-US" dirty="0"/>
           </a:p>
         </p:txBody>
       </p:sp>
@@ -6828,27 +6834,115 @@
           <a:bodyPr/>
           <a:lstStyle/>
           <a:p>
-            <a:r>
-              <a:rPr lang="en-US" dirty="0" err="1" smtClean="0"/>
-              <a:t>Diagramme</a:t>
-            </a:r>
-            <a:r>
-              <a:rPr lang="en-US" dirty="0" smtClean="0"/>
-              <a:t> des </a:t>
-            </a:r>
-            <a:r>
-              <a:rPr lang="en-US" dirty="0" err="1" smtClean="0"/>
-              <a:t>propriétés</a:t>
-            </a:r>
-            <a:r>
-              <a:rPr lang="en-US" dirty="0" smtClean="0"/>
-              <a:t> </a:t>
-            </a:r>
-            <a:r>
-              <a:rPr lang="en-US" dirty="0" err="1" smtClean="0"/>
-              <a:t>fonctionnelles</a:t>
-            </a:r>
-            <a:endParaRPr lang="en-US" dirty="0"/>
+            <a:pPr algn="r"/>
+            <a:r>
+              <a:rPr lang="fr-CA" dirty="0" smtClean="0"/>
+              <a:t>Diagramme des propriétés fonctionnelles</a:t>
+            </a:r>
+            <a:br>
+              <a:rPr lang="fr-CA" dirty="0" smtClean="0"/>
+            </a:br>
+            <a:r>
+              <a:rPr lang="fr-CA" sz="1800" i="1" dirty="0" smtClean="0"/>
+              <a:t>*Version complète à la fin</a:t>
+            </a:r>
+            <a:endParaRPr lang="fr-CA" sz="1800" i="1" dirty="0"/>
+          </a:p>
+        </p:txBody>
+      </p:sp>
+      <p:sp>
+        <p:nvSpPr>
+          <p:cNvPr id="3" name="Content Placeholder 2"/>
+          <p:cNvSpPr>
+            <a:spLocks noGrp="1"/>
+          </p:cNvSpPr>
+          <p:nvPr>
+            <p:ph idx="1"/>
+          </p:nvPr>
+        </p:nvSpPr>
+        <p:spPr>
+          <a:xfrm>
+            <a:off x="618265" y="1835687"/>
+            <a:ext cx="10087805" cy="4810020"/>
+          </a:xfrm>
+        </p:spPr>
+        <p:txBody>
+          <a:bodyPr>
+            <a:normAutofit lnSpcReduction="10000"/>
+          </a:bodyPr>
+          <a:lstStyle/>
+          <a:p>
+            <a:r>
+              <a:rPr lang="fr-FR" sz="2800" dirty="0" smtClean="0"/>
+              <a:t>Fonctionnalités rattachées au simulateur (1/2)</a:t>
+            </a:r>
+          </a:p>
+          <a:p>
+            <a:pPr lvl="1"/>
+            <a:r>
+              <a:rPr lang="fr-FR" sz="2600" dirty="0" smtClean="0"/>
+              <a:t>Accepter des paramètres de modélisation</a:t>
+            </a:r>
+          </a:p>
+          <a:p>
+            <a:pPr lvl="1"/>
+            <a:r>
+              <a:rPr lang="fr-FR" sz="2600" dirty="0" smtClean="0"/>
+              <a:t>Abaisser la tension du réseau alternatif</a:t>
+            </a:r>
+          </a:p>
+          <a:p>
+            <a:pPr lvl="2"/>
+            <a:r>
+              <a:rPr lang="fr-FR" sz="2400" dirty="0" smtClean="0"/>
+              <a:t>Rendement (%), Ratio (%)</a:t>
+            </a:r>
+          </a:p>
+          <a:p>
+            <a:pPr lvl="1"/>
+            <a:r>
+              <a:rPr lang="fr-FR" sz="2600" dirty="0" smtClean="0"/>
+              <a:t>Redresser le signal d’entrée à la sortie du transformateur</a:t>
+            </a:r>
+          </a:p>
+          <a:p>
+            <a:pPr lvl="2"/>
+            <a:r>
+              <a:rPr lang="fr-FR" sz="2400" dirty="0" smtClean="0"/>
+              <a:t>Ondulation de tension (%)</a:t>
+            </a:r>
+          </a:p>
+          <a:p>
+            <a:pPr lvl="2"/>
+            <a:r>
+              <a:rPr lang="fr-FR" sz="2400" dirty="0" smtClean="0"/>
+              <a:t>Niveau moyen (kV)</a:t>
+            </a:r>
+          </a:p>
+          <a:p>
+            <a:pPr lvl="2"/>
+            <a:r>
+              <a:rPr lang="fr-FR" sz="2400" dirty="0" smtClean="0"/>
+              <a:t>Rendement (%)</a:t>
+            </a:r>
+          </a:p>
+          <a:p>
+            <a:pPr lvl="2"/>
+            <a:r>
+              <a:rPr lang="fr-FR" sz="2400" dirty="0" smtClean="0"/>
+              <a:t>Puissance moyenne (MW)</a:t>
+            </a:r>
+          </a:p>
+          <a:p>
+            <a:pPr lvl="2"/>
+            <a:r>
+              <a:rPr lang="fr-FR" sz="2400" dirty="0" smtClean="0"/>
+              <a:t>Puissance cr</a:t>
+            </a:r>
+            <a:r>
+              <a:rPr lang="fr-FR" sz="2400" dirty="0" smtClean="0"/>
+              <a:t>ête (MW)</a:t>
+            </a:r>
           </a:p>
         </p:txBody>
       </p:sp>
@@ -6856,6 +6950,2857 @@
     <p:extLst>
       <p:ext uri="{BB962C8B-B14F-4D97-AF65-F5344CB8AC3E}">
         <p14:creationId xmlns:p14="http://schemas.microsoft.com/office/powerpoint/2010/main" val="261770818"/>
+      </p:ext>
+    </p:extLst>
+  </p:cSld>
+  <p:clrMapOvr>
+    <a:masterClrMapping/>
+  </p:clrMapOvr>
+</p:sld>
+</file>
+
+<file path=ppt/slides/slide13.xml><?xml version="1.0" encoding="utf-8"?>
+<p:sld xmlns:a="http://schemas.openxmlformats.org/drawingml/2006/main" xmlns:r="http://schemas.openxmlformats.org/officeDocument/2006/relationships" xmlns:p="http://schemas.openxmlformats.org/presentationml/2006/main">
+  <p:cSld>
+    <p:spTree>
+      <p:nvGrpSpPr>
+        <p:cNvPr id="1" name=""/>
+        <p:cNvGrpSpPr/>
+        <p:nvPr/>
+      </p:nvGrpSpPr>
+      <p:grpSpPr>
+        <a:xfrm>
+          <a:off x="0" y="0"/>
+          <a:ext cx="0" cy="0"/>
+          <a:chOff x="0" y="0"/>
+          <a:chExt cx="0" cy="0"/>
+        </a:xfrm>
+      </p:grpSpPr>
+      <p:sp>
+        <p:nvSpPr>
+          <p:cNvPr id="2" name="Title 1"/>
+          <p:cNvSpPr>
+            <a:spLocks noGrp="1"/>
+          </p:cNvSpPr>
+          <p:nvPr>
+            <p:ph type="title"/>
+          </p:nvPr>
+        </p:nvSpPr>
+        <p:spPr/>
+        <p:txBody>
+          <a:bodyPr/>
+          <a:lstStyle/>
+          <a:p>
+            <a:pPr algn="r"/>
+            <a:r>
+              <a:rPr lang="fr-CA" dirty="0" smtClean="0"/>
+              <a:t>Diagramme des propriétés fonctionnelles</a:t>
+            </a:r>
+            <a:br>
+              <a:rPr lang="fr-CA" dirty="0" smtClean="0"/>
+            </a:br>
+            <a:r>
+              <a:rPr lang="fr-CA" sz="1800" i="1" dirty="0" smtClean="0"/>
+              <a:t>*Version complète à la fin</a:t>
+            </a:r>
+            <a:endParaRPr lang="fr-CA" sz="1800" i="1" dirty="0"/>
+          </a:p>
+        </p:txBody>
+      </p:sp>
+      <p:sp>
+        <p:nvSpPr>
+          <p:cNvPr id="3" name="Content Placeholder 2"/>
+          <p:cNvSpPr>
+            <a:spLocks noGrp="1"/>
+          </p:cNvSpPr>
+          <p:nvPr>
+            <p:ph idx="1"/>
+          </p:nvPr>
+        </p:nvSpPr>
+        <p:spPr>
+          <a:xfrm>
+            <a:off x="618265" y="1835687"/>
+            <a:ext cx="10087805" cy="4810020"/>
+          </a:xfrm>
+        </p:spPr>
+        <p:txBody>
+          <a:bodyPr>
+            <a:normAutofit fontScale="62500" lnSpcReduction="20000"/>
+          </a:bodyPr>
+          <a:lstStyle/>
+          <a:p>
+            <a:r>
+              <a:rPr lang="fr-FR" sz="2800" dirty="0" smtClean="0"/>
+              <a:t>Fonctionnalités rattachées au simulateur (2/2)</a:t>
+            </a:r>
+          </a:p>
+          <a:p>
+            <a:pPr lvl="1"/>
+            <a:r>
+              <a:rPr lang="fr-FR" sz="2600" dirty="0" smtClean="0"/>
+              <a:t>Commander un onduleur triphasé de type NPC</a:t>
+            </a:r>
+          </a:p>
+          <a:p>
+            <a:pPr lvl="2"/>
+            <a:r>
+              <a:rPr lang="fr-FR" sz="2400" dirty="0" smtClean="0"/>
+              <a:t>Effort du contr</a:t>
+            </a:r>
+            <a:r>
+              <a:rPr lang="fr-FR" sz="2400" dirty="0" smtClean="0"/>
+              <a:t>ôleur (% par seconde de la variation de la commande)</a:t>
+            </a:r>
+          </a:p>
+          <a:p>
+            <a:pPr lvl="1"/>
+            <a:r>
+              <a:rPr lang="fr-FR" sz="2600" dirty="0" smtClean="0"/>
+              <a:t>Charger un banc de condensateur</a:t>
+            </a:r>
+          </a:p>
+          <a:p>
+            <a:pPr lvl="2"/>
+            <a:r>
+              <a:rPr lang="fr-FR" sz="2400" dirty="0" smtClean="0"/>
+              <a:t>Temps de charge (s)</a:t>
+            </a:r>
+          </a:p>
+          <a:p>
+            <a:pPr lvl="1"/>
+            <a:r>
+              <a:rPr lang="fr-FR" sz="2600" dirty="0" smtClean="0"/>
+              <a:t>Commander un convertisseur CC-CC à quatre quadrants </a:t>
+            </a:r>
+            <a:r>
+              <a:rPr lang="fr-FR" sz="2600" dirty="0" err="1" smtClean="0"/>
+              <a:t>multicellules</a:t>
+            </a:r>
+            <a:endParaRPr lang="fr-FR" sz="2600" dirty="0" smtClean="0"/>
+          </a:p>
+          <a:p>
+            <a:pPr lvl="2"/>
+            <a:r>
+              <a:rPr lang="fr-FR" sz="2400" dirty="0"/>
+              <a:t>Effort du contrôleur (% par seconde de la variation de la commande</a:t>
+            </a:r>
+            <a:r>
+              <a:rPr lang="fr-FR" sz="2400" dirty="0" smtClean="0"/>
+              <a:t>)</a:t>
+            </a:r>
+          </a:p>
+          <a:p>
+            <a:pPr lvl="1"/>
+            <a:r>
+              <a:rPr lang="fr-FR" sz="2600" dirty="0" smtClean="0"/>
+              <a:t>Alimenter les électroaimants de l’accélérateur de particules</a:t>
+            </a:r>
+          </a:p>
+          <a:p>
+            <a:pPr lvl="2"/>
+            <a:r>
+              <a:rPr lang="fr-FR" sz="2400" dirty="0" smtClean="0"/>
+              <a:t>Rendement (%)</a:t>
+            </a:r>
+          </a:p>
+          <a:p>
+            <a:pPr lvl="2"/>
+            <a:r>
+              <a:rPr lang="fr-FR" sz="2400" dirty="0" smtClean="0"/>
+              <a:t>Ondulation de courant (%)</a:t>
+            </a:r>
+          </a:p>
+          <a:p>
+            <a:pPr lvl="2"/>
+            <a:r>
+              <a:rPr lang="fr-FR" sz="2400" dirty="0" smtClean="0"/>
+              <a:t>Ondulation de tension (%)</a:t>
+            </a:r>
+          </a:p>
+          <a:p>
+            <a:pPr lvl="2"/>
+            <a:r>
+              <a:rPr lang="fr-FR" sz="2400" dirty="0" smtClean="0"/>
+              <a:t>Puissance moyenne (MW)</a:t>
+            </a:r>
+          </a:p>
+          <a:p>
+            <a:pPr lvl="2"/>
+            <a:r>
+              <a:rPr lang="fr-FR" sz="2400" dirty="0" smtClean="0"/>
+              <a:t>Puissance cr</a:t>
+            </a:r>
+            <a:r>
+              <a:rPr lang="fr-FR" sz="2400" dirty="0" smtClean="0"/>
+              <a:t>ête (MW)</a:t>
+            </a:r>
+          </a:p>
+          <a:p>
+            <a:pPr lvl="1"/>
+            <a:r>
+              <a:rPr lang="fr-FR" sz="2600" dirty="0" smtClean="0"/>
+              <a:t>Afficher les résultats de simulation </a:t>
+            </a:r>
+            <a:r>
+              <a:rPr lang="fr-FR" sz="2600" dirty="0" err="1" smtClean="0"/>
+              <a:t>personalisés</a:t>
+            </a:r>
+            <a:endParaRPr lang="fr-FR" sz="2600" dirty="0" smtClean="0"/>
+          </a:p>
+          <a:p>
+            <a:pPr lvl="2"/>
+            <a:r>
+              <a:rPr lang="fr-FR" sz="2400" dirty="0" smtClean="0"/>
+              <a:t>Convivialité (1 à 5)</a:t>
+            </a:r>
+            <a:endParaRPr lang="fr-FR" sz="2400" dirty="0"/>
+          </a:p>
+          <a:p>
+            <a:pPr lvl="2"/>
+            <a:endParaRPr lang="fr-FR" sz="2400" dirty="0" smtClean="0"/>
+          </a:p>
+        </p:txBody>
+      </p:sp>
+    </p:spTree>
+    <p:extLst>
+      <p:ext uri="{BB962C8B-B14F-4D97-AF65-F5344CB8AC3E}">
+        <p14:creationId xmlns:p14="http://schemas.microsoft.com/office/powerpoint/2010/main" val="1009669938"/>
+      </p:ext>
+    </p:extLst>
+  </p:cSld>
+  <p:clrMapOvr>
+    <a:masterClrMapping/>
+  </p:clrMapOvr>
+</p:sld>
+</file>
+
+<file path=ppt/slides/slide14.xml><?xml version="1.0" encoding="utf-8"?>
+<p:sld xmlns:a="http://schemas.openxmlformats.org/drawingml/2006/main" xmlns:r="http://schemas.openxmlformats.org/officeDocument/2006/relationships" xmlns:p="http://schemas.openxmlformats.org/presentationml/2006/main">
+  <p:cSld>
+    <p:spTree>
+      <p:nvGrpSpPr>
+        <p:cNvPr id="1" name=""/>
+        <p:cNvGrpSpPr/>
+        <p:nvPr/>
+      </p:nvGrpSpPr>
+      <p:grpSpPr>
+        <a:xfrm>
+          <a:off x="0" y="0"/>
+          <a:ext cx="0" cy="0"/>
+          <a:chOff x="0" y="0"/>
+          <a:chExt cx="0" cy="0"/>
+        </a:xfrm>
+      </p:grpSpPr>
+      <p:sp>
+        <p:nvSpPr>
+          <p:cNvPr id="2" name="Title 1"/>
+          <p:cNvSpPr>
+            <a:spLocks noGrp="1"/>
+          </p:cNvSpPr>
+          <p:nvPr>
+            <p:ph type="title"/>
+          </p:nvPr>
+        </p:nvSpPr>
+        <p:spPr/>
+        <p:txBody>
+          <a:bodyPr/>
+          <a:lstStyle/>
+          <a:p>
+            <a:pPr algn="r"/>
+            <a:r>
+              <a:rPr lang="fr-CA" dirty="0" smtClean="0"/>
+              <a:t>Diagramme des propriétés fonctionnelles</a:t>
+            </a:r>
+            <a:br>
+              <a:rPr lang="fr-CA" dirty="0" smtClean="0"/>
+            </a:br>
+            <a:r>
+              <a:rPr lang="fr-CA" sz="1800" i="1" dirty="0" smtClean="0"/>
+              <a:t>*Version complète à la fin</a:t>
+            </a:r>
+            <a:endParaRPr lang="fr-CA" sz="1800" i="1" dirty="0"/>
+          </a:p>
+        </p:txBody>
+      </p:sp>
+      <p:sp>
+        <p:nvSpPr>
+          <p:cNvPr id="3" name="Content Placeholder 2"/>
+          <p:cNvSpPr>
+            <a:spLocks noGrp="1"/>
+          </p:cNvSpPr>
+          <p:nvPr>
+            <p:ph idx="1"/>
+          </p:nvPr>
+        </p:nvSpPr>
+        <p:spPr>
+          <a:xfrm>
+            <a:off x="618265" y="1835687"/>
+            <a:ext cx="10087805" cy="4810020"/>
+          </a:xfrm>
+        </p:spPr>
+        <p:txBody>
+          <a:bodyPr>
+            <a:normAutofit lnSpcReduction="10000"/>
+          </a:bodyPr>
+          <a:lstStyle/>
+          <a:p>
+            <a:r>
+              <a:rPr lang="fr-FR" sz="2800" dirty="0" smtClean="0"/>
+              <a:t>Outil de dimensionnement </a:t>
+            </a:r>
+          </a:p>
+          <a:p>
+            <a:pPr lvl="1"/>
+            <a:r>
+              <a:rPr lang="fr-FR" sz="2200" dirty="0" smtClean="0"/>
+              <a:t>Accepter des paramètres de dimensionnement usuels</a:t>
+            </a:r>
+          </a:p>
+          <a:p>
+            <a:pPr lvl="2"/>
+            <a:r>
+              <a:rPr lang="fr-FR" sz="2200" dirty="0" smtClean="0"/>
+              <a:t>Choix disponibles (1 à 5)</a:t>
+            </a:r>
+          </a:p>
+          <a:p>
+            <a:pPr lvl="1"/>
+            <a:r>
+              <a:rPr lang="fr-FR" sz="2400" dirty="0" smtClean="0"/>
+              <a:t>Déterminer le nombre de composantes nécessaires dans les cellules de type NPC</a:t>
+            </a:r>
+          </a:p>
+          <a:p>
+            <a:pPr lvl="1"/>
+            <a:r>
+              <a:rPr lang="fr-FR" sz="2400" dirty="0" smtClean="0"/>
+              <a:t>Déterminer les valeurs des condensateurs utilisés dans les cellules de type NPC</a:t>
+            </a:r>
+          </a:p>
+          <a:p>
+            <a:pPr lvl="1"/>
+            <a:r>
+              <a:rPr lang="fr-FR" sz="2400" dirty="0" smtClean="0"/>
+              <a:t>Déterminer les valeurs des inductances de découplage</a:t>
+            </a:r>
+          </a:p>
+          <a:p>
+            <a:pPr lvl="1"/>
+            <a:r>
+              <a:rPr lang="fr-FR" sz="2400" dirty="0" smtClean="0"/>
+              <a:t>Déterminer le nombre de cellules de type NPC nécessaire</a:t>
+            </a:r>
+          </a:p>
+          <a:p>
+            <a:pPr lvl="1"/>
+            <a:r>
+              <a:rPr lang="fr-FR" sz="2400" dirty="0" smtClean="0"/>
+              <a:t>Fournir les paramètres de modélisation utilisé par le simulateur</a:t>
+            </a:r>
+          </a:p>
+          <a:p>
+            <a:pPr lvl="2"/>
+            <a:r>
+              <a:rPr lang="fr-FR" sz="2200" dirty="0" smtClean="0"/>
+              <a:t>Convivialité et choix disponibles (1 à 5)</a:t>
+            </a:r>
+          </a:p>
+        </p:txBody>
+      </p:sp>
+    </p:spTree>
+    <p:extLst>
+      <p:ext uri="{BB962C8B-B14F-4D97-AF65-F5344CB8AC3E}">
+        <p14:creationId xmlns:p14="http://schemas.microsoft.com/office/powerpoint/2010/main" val="4073286745"/>
+      </p:ext>
+    </p:extLst>
+  </p:cSld>
+  <p:clrMapOvr>
+    <a:masterClrMapping/>
+  </p:clrMapOvr>
+</p:sld>
+</file>
+
+<file path=ppt/slides/slide15.xml><?xml version="1.0" encoding="utf-8"?>
+<p:sld xmlns:a="http://schemas.openxmlformats.org/drawingml/2006/main" xmlns:r="http://schemas.openxmlformats.org/officeDocument/2006/relationships" xmlns:p="http://schemas.openxmlformats.org/presentationml/2006/main">
+  <p:cSld>
+    <p:spTree>
+      <p:nvGrpSpPr>
+        <p:cNvPr id="1" name=""/>
+        <p:cNvGrpSpPr/>
+        <p:nvPr/>
+      </p:nvGrpSpPr>
+      <p:grpSpPr>
+        <a:xfrm>
+          <a:off x="0" y="0"/>
+          <a:ext cx="0" cy="0"/>
+          <a:chOff x="0" y="0"/>
+          <a:chExt cx="0" cy="0"/>
+        </a:xfrm>
+      </p:grpSpPr>
+      <p:sp>
+        <p:nvSpPr>
+          <p:cNvPr id="2" name="Title 1"/>
+          <p:cNvSpPr>
+            <a:spLocks noGrp="1"/>
+          </p:cNvSpPr>
+          <p:nvPr>
+            <p:ph type="title"/>
+          </p:nvPr>
+        </p:nvSpPr>
+        <p:spPr/>
+        <p:txBody>
+          <a:bodyPr/>
+          <a:lstStyle/>
+          <a:p>
+            <a:pPr algn="r"/>
+            <a:r>
+              <a:rPr lang="fr-CA" dirty="0" smtClean="0"/>
+              <a:t>Diagramme des propriétés fonctionnelles</a:t>
+            </a:r>
+            <a:br>
+              <a:rPr lang="fr-CA" dirty="0" smtClean="0"/>
+            </a:br>
+            <a:r>
+              <a:rPr lang="fr-CA" sz="1800" i="1" dirty="0" smtClean="0"/>
+              <a:t>*Version complète à la fin</a:t>
+            </a:r>
+            <a:endParaRPr lang="fr-CA" sz="1800" i="1" dirty="0"/>
+          </a:p>
+        </p:txBody>
+      </p:sp>
+      <p:sp>
+        <p:nvSpPr>
+          <p:cNvPr id="3" name="Content Placeholder 2"/>
+          <p:cNvSpPr>
+            <a:spLocks noGrp="1"/>
+          </p:cNvSpPr>
+          <p:nvPr>
+            <p:ph idx="1"/>
+          </p:nvPr>
+        </p:nvSpPr>
+        <p:spPr>
+          <a:xfrm>
+            <a:off x="618265" y="1835687"/>
+            <a:ext cx="10087805" cy="4810020"/>
+          </a:xfrm>
+        </p:spPr>
+        <p:txBody>
+          <a:bodyPr>
+            <a:normAutofit lnSpcReduction="10000"/>
+          </a:bodyPr>
+          <a:lstStyle/>
+          <a:p>
+            <a:r>
+              <a:rPr lang="fr-FR" sz="2800" dirty="0" smtClean="0"/>
+              <a:t>Documentation</a:t>
+            </a:r>
+          </a:p>
+          <a:p>
+            <a:pPr lvl="1"/>
+            <a:r>
+              <a:rPr lang="fr-FR" sz="2200" dirty="0" smtClean="0"/>
+              <a:t>Présenter le fonctionnement de l’outil de dimensionnement de chacun des simulateurs</a:t>
+            </a:r>
+          </a:p>
+          <a:p>
+            <a:pPr lvl="2"/>
+            <a:r>
+              <a:rPr lang="fr-FR" sz="2200" dirty="0" smtClean="0"/>
+              <a:t>Précision de l’information et convivialité (1 à 5)</a:t>
+            </a:r>
+          </a:p>
+          <a:p>
+            <a:pPr lvl="1"/>
+            <a:r>
+              <a:rPr lang="fr-FR" sz="2400" dirty="0" smtClean="0"/>
+              <a:t>Présenter les modèles mathématiques utilisés dans chacun des simulateurs</a:t>
+            </a:r>
+          </a:p>
+          <a:p>
+            <a:pPr lvl="1"/>
+            <a:r>
+              <a:rPr lang="fr-FR" sz="2400" dirty="0" smtClean="0"/>
+              <a:t>Présenter l’utilisation de chacun des simulateurs</a:t>
+            </a:r>
+          </a:p>
+          <a:p>
+            <a:pPr lvl="2"/>
+            <a:r>
+              <a:rPr lang="fr-FR" sz="2200" dirty="0" smtClean="0"/>
+              <a:t>Précision de l’information et convivialité (1 à 5)</a:t>
+            </a:r>
+          </a:p>
+          <a:p>
+            <a:pPr lvl="1"/>
+            <a:r>
+              <a:rPr lang="fr-FR" sz="2400" dirty="0" smtClean="0"/>
+              <a:t>Présenter les procédures de validation croisées de chacun des simulateurs</a:t>
+            </a:r>
+          </a:p>
+          <a:p>
+            <a:pPr lvl="2"/>
+            <a:r>
+              <a:rPr lang="fr-FR" sz="2200" dirty="0" smtClean="0"/>
+              <a:t>Présentation de l’information et convivialité (1 à 5)</a:t>
+            </a:r>
+          </a:p>
+        </p:txBody>
+      </p:sp>
+    </p:spTree>
+    <p:extLst>
+      <p:ext uri="{BB962C8B-B14F-4D97-AF65-F5344CB8AC3E}">
+        <p14:creationId xmlns:p14="http://schemas.microsoft.com/office/powerpoint/2010/main" val="2852438436"/>
+      </p:ext>
+    </p:extLst>
+  </p:cSld>
+  <p:clrMapOvr>
+    <a:masterClrMapping/>
+  </p:clrMapOvr>
+</p:sld>
+</file>
+
+<file path=ppt/slides/slide16.xml><?xml version="1.0" encoding="utf-8"?>
+<p:sld xmlns:a="http://schemas.openxmlformats.org/drawingml/2006/main" xmlns:r="http://schemas.openxmlformats.org/officeDocument/2006/relationships" xmlns:p="http://schemas.openxmlformats.org/presentationml/2006/main">
+  <p:cSld>
+    <p:spTree>
+      <p:nvGrpSpPr>
+        <p:cNvPr id="1" name=""/>
+        <p:cNvGrpSpPr/>
+        <p:nvPr/>
+      </p:nvGrpSpPr>
+      <p:grpSpPr>
+        <a:xfrm>
+          <a:off x="0" y="0"/>
+          <a:ext cx="0" cy="0"/>
+          <a:chOff x="0" y="0"/>
+          <a:chExt cx="0" cy="0"/>
+        </a:xfrm>
+      </p:grpSpPr>
+      <p:sp>
+        <p:nvSpPr>
+          <p:cNvPr id="4" name="Title 3"/>
+          <p:cNvSpPr>
+            <a:spLocks noGrp="1"/>
+          </p:cNvSpPr>
+          <p:nvPr>
+            <p:ph type="title"/>
+          </p:nvPr>
+        </p:nvSpPr>
+        <p:spPr/>
+        <p:txBody>
+          <a:bodyPr/>
+          <a:lstStyle/>
+          <a:p>
+            <a:r>
+              <a:rPr lang="fr-CA" dirty="0"/>
+              <a:t>Diagramme des propriétés fonctionnelles</a:t>
+            </a:r>
+            <a:endParaRPr lang="en-US" dirty="0"/>
+          </a:p>
+        </p:txBody>
+      </p:sp>
+      <p:sp>
+        <p:nvSpPr>
+          <p:cNvPr id="5" name="Content Placeholder 4"/>
+          <p:cNvSpPr>
+            <a:spLocks noGrp="1"/>
+          </p:cNvSpPr>
+          <p:nvPr>
+            <p:ph idx="1"/>
+          </p:nvPr>
+        </p:nvSpPr>
+        <p:spPr/>
+        <p:txBody>
+          <a:bodyPr>
+            <a:normAutofit/>
+          </a:bodyPr>
+          <a:lstStyle/>
+          <a:p>
+            <a:r>
+              <a:rPr lang="fr-FR" sz="2800" dirty="0" smtClean="0"/>
+              <a:t>Objectifs de performances</a:t>
+            </a:r>
+          </a:p>
+          <a:p>
+            <a:pPr lvl="1"/>
+            <a:r>
+              <a:rPr lang="fr-FR" sz="2600" dirty="0" smtClean="0"/>
+              <a:t>Minimiser le temps de simulation</a:t>
+            </a:r>
+          </a:p>
+          <a:p>
+            <a:pPr lvl="1"/>
+            <a:r>
+              <a:rPr lang="fr-FR" sz="2600" dirty="0" smtClean="0"/>
+              <a:t>Maximiser la précision des simulations</a:t>
+            </a:r>
+          </a:p>
+          <a:p>
+            <a:pPr lvl="1"/>
+            <a:r>
+              <a:rPr lang="fr-FR" sz="2600" dirty="0" smtClean="0"/>
+              <a:t>Minimiser la complexité d’utilisation du simulateur et de l’outil de dimensionnement</a:t>
+            </a:r>
+          </a:p>
+          <a:p>
+            <a:pPr lvl="1"/>
+            <a:r>
+              <a:rPr lang="fr-FR" sz="2600" dirty="0" smtClean="0"/>
+              <a:t>Maximiser la qualité et la précision de la documentation</a:t>
+            </a:r>
+          </a:p>
+          <a:p>
+            <a:pPr lvl="1"/>
+            <a:endParaRPr lang="fr-FR" sz="2600" dirty="0"/>
+          </a:p>
+        </p:txBody>
+      </p:sp>
+    </p:spTree>
+    <p:extLst>
+      <p:ext uri="{BB962C8B-B14F-4D97-AF65-F5344CB8AC3E}">
+        <p14:creationId xmlns:p14="http://schemas.microsoft.com/office/powerpoint/2010/main" val="3256449772"/>
+      </p:ext>
+    </p:extLst>
+  </p:cSld>
+  <p:clrMapOvr>
+    <a:masterClrMapping/>
+  </p:clrMapOvr>
+</p:sld>
+</file>
+
+<file path=ppt/slides/slide17.xml><?xml version="1.0" encoding="utf-8"?>
+<p:sld xmlns:a="http://schemas.openxmlformats.org/drawingml/2006/main" xmlns:r="http://schemas.openxmlformats.org/officeDocument/2006/relationships" xmlns:p="http://schemas.openxmlformats.org/presentationml/2006/main">
+  <p:cSld>
+    <p:spTree>
+      <p:nvGrpSpPr>
+        <p:cNvPr id="1" name=""/>
+        <p:cNvGrpSpPr/>
+        <p:nvPr/>
+      </p:nvGrpSpPr>
+      <p:grpSpPr>
+        <a:xfrm>
+          <a:off x="0" y="0"/>
+          <a:ext cx="0" cy="0"/>
+          <a:chOff x="0" y="0"/>
+          <a:chExt cx="0" cy="0"/>
+        </a:xfrm>
+      </p:grpSpPr>
+      <p:sp>
+        <p:nvSpPr>
+          <p:cNvPr id="2" name="Title 1"/>
+          <p:cNvSpPr>
+            <a:spLocks noGrp="1"/>
+          </p:cNvSpPr>
+          <p:nvPr>
+            <p:ph type="title"/>
+          </p:nvPr>
+        </p:nvSpPr>
+        <p:spPr/>
+        <p:txBody>
+          <a:bodyPr/>
+          <a:lstStyle/>
+          <a:p>
+            <a:r>
+              <a:rPr lang="en-US" dirty="0" err="1" smtClean="0"/>
+              <a:t>Registre</a:t>
+            </a:r>
+            <a:r>
+              <a:rPr lang="en-US" dirty="0" smtClean="0"/>
+              <a:t> des </a:t>
+            </a:r>
+            <a:r>
+              <a:rPr lang="en-US" dirty="0" err="1" smtClean="0"/>
+              <a:t>risques</a:t>
+            </a:r>
+            <a:r>
+              <a:rPr lang="en-US" dirty="0" smtClean="0"/>
+              <a:t> (1/3)</a:t>
+            </a:r>
+            <a:endParaRPr lang="en-US" dirty="0"/>
+          </a:p>
+        </p:txBody>
+      </p:sp>
+      <p:graphicFrame>
+        <p:nvGraphicFramePr>
+          <p:cNvPr id="4" name="Content Placeholder 3"/>
+          <p:cNvGraphicFramePr>
+            <a:graphicFrameLocks noGrp="1"/>
+          </p:cNvGraphicFramePr>
+          <p:nvPr>
+            <p:ph idx="1"/>
+            <p:extLst>
+              <p:ext uri="{D42A27DB-BD31-4B8C-83A1-F6EECF244321}">
+                <p14:modId xmlns:p14="http://schemas.microsoft.com/office/powerpoint/2010/main" val="1921849713"/>
+              </p:ext>
+            </p:extLst>
+          </p:nvPr>
+        </p:nvGraphicFramePr>
+        <p:xfrm>
+          <a:off x="677863" y="1314373"/>
+          <a:ext cx="10382617" cy="5360871"/>
+        </p:xfrm>
+        <a:graphic>
+          <a:graphicData uri="http://schemas.openxmlformats.org/drawingml/2006/table">
+            <a:tbl>
+              <a:tblPr firstRow="1" bandRow="1">
+                <a:tableStyleId>{5C22544A-7EE6-4342-B048-85BDC9FD1C3A}</a:tableStyleId>
+              </a:tblPr>
+              <a:tblGrid>
+                <a:gridCol w="1483231"/>
+                <a:gridCol w="1483231"/>
+                <a:gridCol w="1483231"/>
+                <a:gridCol w="1483231"/>
+                <a:gridCol w="1483231"/>
+                <a:gridCol w="1483231"/>
+                <a:gridCol w="1483231"/>
+              </a:tblGrid>
+              <a:tr h="906127">
+                <a:tc>
+                  <a:txBody>
+                    <a:bodyPr/>
+                    <a:lstStyle/>
+                    <a:p>
+                      <a:pPr algn="ctr" fontAlgn="ctr"/>
+                      <a:r>
+                        <a:rPr lang="fr-FR" sz="1100" b="1" i="0" u="none" strike="noStrike" dirty="0">
+                          <a:solidFill>
+                            <a:srgbClr val="000000"/>
+                          </a:solidFill>
+                          <a:effectLst/>
+                          <a:latin typeface="Calibri"/>
+                        </a:rPr>
+                        <a:t>Type de risque</a:t>
+                      </a:r>
+                    </a:p>
+                  </a:txBody>
+                  <a:tcPr marL="12700" marR="12700" marT="12700" marB="0" anchor="ctr"/>
+                </a:tc>
+                <a:tc>
+                  <a:txBody>
+                    <a:bodyPr/>
+                    <a:lstStyle/>
+                    <a:p>
+                      <a:pPr algn="ctr" fontAlgn="ctr"/>
+                      <a:r>
+                        <a:rPr lang="fr-FR" sz="1100" b="1" i="0" u="none" strike="noStrike" dirty="0">
+                          <a:solidFill>
+                            <a:srgbClr val="000000"/>
+                          </a:solidFill>
+                          <a:effectLst/>
+                          <a:latin typeface="Calibri"/>
+                        </a:rPr>
+                        <a:t>Niveau de priorité</a:t>
+                      </a:r>
+                      <a:br>
+                        <a:rPr lang="fr-FR" sz="1100" b="1" i="0" u="none" strike="noStrike" dirty="0">
+                          <a:solidFill>
+                            <a:srgbClr val="000000"/>
+                          </a:solidFill>
+                          <a:effectLst/>
+                          <a:latin typeface="Calibri"/>
+                        </a:rPr>
+                      </a:br>
+                      <a:r>
+                        <a:rPr lang="fr-FR" sz="1100" b="1" i="0" u="none" strike="noStrike" dirty="0">
+                          <a:solidFill>
+                            <a:srgbClr val="000000"/>
+                          </a:solidFill>
+                          <a:effectLst/>
+                          <a:latin typeface="Calibri"/>
+                        </a:rPr>
+                        <a:t>(1 faible, 5 élevé)</a:t>
+                      </a:r>
+                    </a:p>
+                  </a:txBody>
+                  <a:tcPr marL="12700" marR="12700" marT="12700" marB="0" anchor="ctr"/>
+                </a:tc>
+                <a:tc>
+                  <a:txBody>
+                    <a:bodyPr/>
+                    <a:lstStyle/>
+                    <a:p>
+                      <a:pPr algn="ctr" fontAlgn="ctr"/>
+                      <a:r>
+                        <a:rPr lang="fr-FR" sz="1100" b="1" i="0" u="none" strike="noStrike" dirty="0">
+                          <a:solidFill>
+                            <a:srgbClr val="000000"/>
+                          </a:solidFill>
+                          <a:effectLst/>
+                          <a:latin typeface="Calibri"/>
+                        </a:rPr>
+                        <a:t>Conséquence de</a:t>
+                      </a:r>
+                      <a:br>
+                        <a:rPr lang="fr-FR" sz="1100" b="1" i="0" u="none" strike="noStrike" dirty="0">
+                          <a:solidFill>
+                            <a:srgbClr val="000000"/>
+                          </a:solidFill>
+                          <a:effectLst/>
+                          <a:latin typeface="Calibri"/>
+                        </a:rPr>
+                      </a:br>
+                      <a:r>
+                        <a:rPr lang="fr-FR" sz="1100" b="1" i="0" u="none" strike="noStrike" dirty="0">
+                          <a:solidFill>
+                            <a:srgbClr val="000000"/>
+                          </a:solidFill>
+                          <a:effectLst/>
+                          <a:latin typeface="Calibri"/>
+                        </a:rPr>
+                        <a:t> l'occurrence du risque</a:t>
+                      </a:r>
+                    </a:p>
+                  </a:txBody>
+                  <a:tcPr marL="12700" marR="12700" marT="12700" marB="0" anchor="ctr"/>
+                </a:tc>
+                <a:tc>
+                  <a:txBody>
+                    <a:bodyPr/>
+                    <a:lstStyle/>
+                    <a:p>
+                      <a:pPr algn="ctr" fontAlgn="ctr"/>
+                      <a:r>
+                        <a:rPr lang="fr-FR" sz="1100" b="1" i="0" u="none" strike="noStrike" dirty="0">
+                          <a:solidFill>
+                            <a:srgbClr val="000000"/>
+                          </a:solidFill>
+                          <a:effectLst/>
+                          <a:latin typeface="Calibri"/>
+                        </a:rPr>
+                        <a:t>Coût en performance</a:t>
+                      </a:r>
+                      <a:br>
+                        <a:rPr lang="fr-FR" sz="1100" b="1" i="0" u="none" strike="noStrike" dirty="0">
+                          <a:solidFill>
+                            <a:srgbClr val="000000"/>
+                          </a:solidFill>
+                          <a:effectLst/>
+                          <a:latin typeface="Calibri"/>
+                        </a:rPr>
+                      </a:br>
+                      <a:r>
+                        <a:rPr lang="fr-FR" sz="1100" b="1" i="0" u="none" strike="noStrike" dirty="0">
+                          <a:solidFill>
+                            <a:srgbClr val="000000"/>
+                          </a:solidFill>
+                          <a:effectLst/>
+                          <a:latin typeface="Calibri"/>
+                        </a:rPr>
+                        <a:t> associé au risque</a:t>
+                      </a:r>
+                    </a:p>
+                  </a:txBody>
+                  <a:tcPr marL="12700" marR="12700" marT="12700" marB="0" anchor="ctr"/>
+                </a:tc>
+                <a:tc>
+                  <a:txBody>
+                    <a:bodyPr/>
+                    <a:lstStyle/>
+                    <a:p>
+                      <a:pPr algn="ctr" fontAlgn="ctr"/>
+                      <a:r>
+                        <a:rPr lang="fr-FR" sz="1100" b="1" i="0" u="none" strike="noStrike" dirty="0">
+                          <a:solidFill>
+                            <a:srgbClr val="000000"/>
+                          </a:solidFill>
+                          <a:effectLst/>
+                          <a:latin typeface="Calibri"/>
+                        </a:rPr>
+                        <a:t>Probabilité d'occurrence</a:t>
+                      </a:r>
+                    </a:p>
+                  </a:txBody>
+                  <a:tcPr marL="12700" marR="12700" marT="12700" marB="0" anchor="ctr"/>
+                </a:tc>
+                <a:tc>
+                  <a:txBody>
+                    <a:bodyPr/>
+                    <a:lstStyle/>
+                    <a:p>
+                      <a:pPr algn="ctr" fontAlgn="ctr"/>
+                      <a:r>
+                        <a:rPr lang="fr-FR" sz="1100" b="1" i="0" u="none" strike="noStrike" dirty="0">
+                          <a:solidFill>
+                            <a:srgbClr val="000000"/>
+                          </a:solidFill>
+                          <a:effectLst/>
+                          <a:latin typeface="Calibri"/>
+                        </a:rPr>
+                        <a:t>Plan de réduction</a:t>
+                      </a:r>
+                      <a:br>
+                        <a:rPr lang="fr-FR" sz="1100" b="1" i="0" u="none" strike="noStrike" dirty="0">
+                          <a:solidFill>
+                            <a:srgbClr val="000000"/>
+                          </a:solidFill>
+                          <a:effectLst/>
+                          <a:latin typeface="Calibri"/>
+                        </a:rPr>
+                      </a:br>
+                      <a:r>
+                        <a:rPr lang="fr-FR" sz="1100" b="1" i="0" u="none" strike="noStrike" dirty="0">
+                          <a:solidFill>
+                            <a:srgbClr val="000000"/>
+                          </a:solidFill>
+                          <a:effectLst/>
+                          <a:latin typeface="Calibri"/>
+                        </a:rPr>
+                        <a:t> du risque</a:t>
+                      </a:r>
+                    </a:p>
+                  </a:txBody>
+                  <a:tcPr marL="12700" marR="12700" marT="12700" marB="0" anchor="ctr"/>
+                </a:tc>
+                <a:tc>
+                  <a:txBody>
+                    <a:bodyPr/>
+                    <a:lstStyle/>
+                    <a:p>
+                      <a:pPr algn="ctr" fontAlgn="ctr"/>
+                      <a:r>
+                        <a:rPr lang="fr-FR" sz="1100" b="1" i="0" u="none" strike="noStrike" dirty="0">
+                          <a:solidFill>
+                            <a:srgbClr val="000000"/>
+                          </a:solidFill>
+                          <a:effectLst/>
+                          <a:latin typeface="Calibri"/>
+                        </a:rPr>
+                        <a:t>Responsable du risque</a:t>
+                      </a:r>
+                    </a:p>
+                  </a:txBody>
+                  <a:tcPr marL="12700" marR="12700" marT="12700" marB="0" anchor="ctr"/>
+                </a:tc>
+              </a:tr>
+              <a:tr h="906127">
+                <a:tc>
+                  <a:txBody>
+                    <a:bodyPr/>
+                    <a:lstStyle/>
+                    <a:p>
+                      <a:pPr algn="ctr" fontAlgn="ctr"/>
+                      <a:r>
+                        <a:rPr lang="fr-FR" sz="1100" b="0" i="0" u="none" strike="noStrike">
+                          <a:solidFill>
+                            <a:srgbClr val="000000"/>
+                          </a:solidFill>
+                          <a:effectLst/>
+                          <a:latin typeface="Calibri"/>
+                        </a:rPr>
+                        <a:t>Maladies ou </a:t>
+                      </a:r>
+                      <a:br>
+                        <a:rPr lang="fr-FR" sz="1100" b="0" i="0" u="none" strike="noStrike">
+                          <a:solidFill>
+                            <a:srgbClr val="000000"/>
+                          </a:solidFill>
+                          <a:effectLst/>
+                          <a:latin typeface="Calibri"/>
+                        </a:rPr>
+                      </a:br>
+                      <a:r>
+                        <a:rPr lang="fr-FR" sz="1100" b="0" i="0" u="none" strike="noStrike">
+                          <a:solidFill>
+                            <a:srgbClr val="000000"/>
+                          </a:solidFill>
+                          <a:effectLst/>
+                          <a:latin typeface="Calibri"/>
+                        </a:rPr>
+                        <a:t>incapacité d'un membre à continuer le projet</a:t>
+                      </a:r>
+                    </a:p>
+                  </a:txBody>
+                  <a:tcPr marL="12700" marR="12700" marT="12700" marB="0" anchor="ctr"/>
+                </a:tc>
+                <a:tc>
+                  <a:txBody>
+                    <a:bodyPr/>
+                    <a:lstStyle/>
+                    <a:p>
+                      <a:pPr algn="ctr" fontAlgn="ctr"/>
+                      <a:r>
+                        <a:rPr lang="en-US" sz="1100" b="0" i="0" u="none" strike="noStrike">
+                          <a:solidFill>
+                            <a:srgbClr val="000000"/>
+                          </a:solidFill>
+                          <a:effectLst/>
+                          <a:latin typeface="Calibri"/>
+                        </a:rPr>
+                        <a:t>1</a:t>
+                      </a:r>
+                    </a:p>
+                  </a:txBody>
+                  <a:tcPr marL="12700" marR="12700" marT="12700" marB="0" anchor="ctr"/>
+                </a:tc>
+                <a:tc>
+                  <a:txBody>
+                    <a:bodyPr/>
+                    <a:lstStyle/>
+                    <a:p>
+                      <a:pPr algn="ctr" fontAlgn="ctr"/>
+                      <a:r>
+                        <a:rPr lang="fr-FR" sz="1100" b="0" i="0" u="none" strike="noStrike">
+                          <a:solidFill>
+                            <a:srgbClr val="000000"/>
+                          </a:solidFill>
+                          <a:effectLst/>
+                          <a:latin typeface="Calibri"/>
+                        </a:rPr>
+                        <a:t>Travail en surplus</a:t>
+                      </a:r>
+                      <a:br>
+                        <a:rPr lang="fr-FR" sz="1100" b="0" i="0" u="none" strike="noStrike">
+                          <a:solidFill>
+                            <a:srgbClr val="000000"/>
+                          </a:solidFill>
+                          <a:effectLst/>
+                          <a:latin typeface="Calibri"/>
+                        </a:rPr>
+                      </a:br>
+                      <a:r>
+                        <a:rPr lang="fr-FR" sz="1100" b="0" i="0" u="none" strike="noStrike">
+                          <a:solidFill>
+                            <a:srgbClr val="000000"/>
+                          </a:solidFill>
+                          <a:effectLst/>
+                          <a:latin typeface="Calibri"/>
+                        </a:rPr>
+                        <a:t> à exécuter</a:t>
+                      </a:r>
+                    </a:p>
+                  </a:txBody>
+                  <a:tcPr marL="12700" marR="12700" marT="12700" marB="0" anchor="ctr"/>
+                </a:tc>
+                <a:tc>
+                  <a:txBody>
+                    <a:bodyPr/>
+                    <a:lstStyle/>
+                    <a:p>
+                      <a:pPr algn="ctr" fontAlgn="ctr"/>
+                      <a:r>
+                        <a:rPr lang="fr-FR" sz="1100" b="0" i="0" u="none" strike="noStrike">
+                          <a:solidFill>
+                            <a:srgbClr val="000000"/>
+                          </a:solidFill>
+                          <a:effectLst/>
+                          <a:latin typeface="Calibri"/>
+                        </a:rPr>
+                        <a:t>Retard sur le projet</a:t>
+                      </a:r>
+                    </a:p>
+                  </a:txBody>
+                  <a:tcPr marL="12700" marR="12700" marT="12700" marB="0" anchor="ctr"/>
+                </a:tc>
+                <a:tc>
+                  <a:txBody>
+                    <a:bodyPr/>
+                    <a:lstStyle/>
+                    <a:p>
+                      <a:pPr algn="ctr" fontAlgn="ctr"/>
+                      <a:r>
+                        <a:rPr lang="en-US" sz="1100" b="0" i="0" u="none" strike="noStrike">
+                          <a:solidFill>
+                            <a:srgbClr val="000000"/>
+                          </a:solidFill>
+                          <a:effectLst/>
+                          <a:latin typeface="Calibri"/>
+                        </a:rPr>
+                        <a:t>10%</a:t>
+                      </a:r>
+                    </a:p>
+                  </a:txBody>
+                  <a:tcPr marL="12700" marR="12700" marT="12700" marB="0" anchor="ctr"/>
+                </a:tc>
+                <a:tc>
+                  <a:txBody>
+                    <a:bodyPr/>
+                    <a:lstStyle/>
+                    <a:p>
+                      <a:pPr algn="ctr" fontAlgn="ctr"/>
+                      <a:r>
+                        <a:rPr lang="fr-FR" sz="1100" b="0" i="0" u="none" strike="noStrike">
+                          <a:solidFill>
+                            <a:srgbClr val="000000"/>
+                          </a:solidFill>
+                          <a:effectLst/>
+                          <a:latin typeface="Calibri"/>
+                        </a:rPr>
+                        <a:t>Répartir le travail</a:t>
+                      </a:r>
+                      <a:br>
+                        <a:rPr lang="fr-FR" sz="1100" b="0" i="0" u="none" strike="noStrike">
+                          <a:solidFill>
+                            <a:srgbClr val="000000"/>
+                          </a:solidFill>
+                          <a:effectLst/>
+                          <a:latin typeface="Calibri"/>
+                        </a:rPr>
+                      </a:br>
+                      <a:r>
+                        <a:rPr lang="fr-FR" sz="1100" b="0" i="0" u="none" strike="noStrike">
+                          <a:solidFill>
+                            <a:srgbClr val="000000"/>
+                          </a:solidFill>
+                          <a:effectLst/>
+                          <a:latin typeface="Calibri"/>
+                        </a:rPr>
+                        <a:t> dans l'équipe</a:t>
+                      </a:r>
+                    </a:p>
+                  </a:txBody>
+                  <a:tcPr marL="12700" marR="12700" marT="12700" marB="0" anchor="ctr"/>
+                </a:tc>
+                <a:tc>
+                  <a:txBody>
+                    <a:bodyPr/>
+                    <a:lstStyle/>
+                    <a:p>
+                      <a:pPr algn="ctr" fontAlgn="ctr"/>
+                      <a:r>
+                        <a:rPr lang="en-US" sz="1100" b="0" i="0" u="none" strike="noStrike">
+                          <a:solidFill>
+                            <a:srgbClr val="000000"/>
+                          </a:solidFill>
+                          <a:effectLst/>
+                          <a:latin typeface="Calibri"/>
+                        </a:rPr>
+                        <a:t>Daniel Thibodeau</a:t>
+                      </a:r>
+                    </a:p>
+                  </a:txBody>
+                  <a:tcPr marL="12700" marR="12700" marT="12700" marB="0" anchor="ctr"/>
+                </a:tc>
+              </a:tr>
+              <a:tr h="1257063">
+                <a:tc>
+                  <a:txBody>
+                    <a:bodyPr/>
+                    <a:lstStyle/>
+                    <a:p>
+                      <a:pPr algn="ctr" fontAlgn="ctr"/>
+                      <a:r>
+                        <a:rPr lang="fr-FR" sz="1100" b="0" i="0" u="none" strike="noStrike">
+                          <a:solidFill>
+                            <a:srgbClr val="000000"/>
+                          </a:solidFill>
+                          <a:effectLst/>
+                          <a:latin typeface="Calibri"/>
+                        </a:rPr>
+                        <a:t>Délai de livraison</a:t>
+                      </a:r>
+                      <a:br>
+                        <a:rPr lang="fr-FR" sz="1100" b="0" i="0" u="none" strike="noStrike">
+                          <a:solidFill>
+                            <a:srgbClr val="000000"/>
+                          </a:solidFill>
+                          <a:effectLst/>
+                          <a:latin typeface="Calibri"/>
+                        </a:rPr>
+                      </a:br>
+                      <a:r>
+                        <a:rPr lang="fr-FR" sz="1100" b="0" i="0" u="none" strike="noStrike">
+                          <a:solidFill>
+                            <a:srgbClr val="000000"/>
+                          </a:solidFill>
+                          <a:effectLst/>
+                          <a:latin typeface="Calibri"/>
+                        </a:rPr>
+                        <a:t> du simulateur en temps réel non respecté</a:t>
+                      </a:r>
+                    </a:p>
+                  </a:txBody>
+                  <a:tcPr marL="12700" marR="12700" marT="12700" marB="0" anchor="ctr"/>
+                </a:tc>
+                <a:tc>
+                  <a:txBody>
+                    <a:bodyPr/>
+                    <a:lstStyle/>
+                    <a:p>
+                      <a:pPr algn="ctr" fontAlgn="ctr"/>
+                      <a:r>
+                        <a:rPr lang="en-US" sz="1100" b="0" i="0" u="none" strike="noStrike">
+                          <a:solidFill>
+                            <a:srgbClr val="000000"/>
+                          </a:solidFill>
+                          <a:effectLst/>
+                          <a:latin typeface="Calibri"/>
+                        </a:rPr>
+                        <a:t>5</a:t>
+                      </a:r>
+                    </a:p>
+                  </a:txBody>
+                  <a:tcPr marL="12700" marR="12700" marT="12700" marB="0" anchor="ctr"/>
+                </a:tc>
+                <a:tc>
+                  <a:txBody>
+                    <a:bodyPr/>
+                    <a:lstStyle/>
+                    <a:p>
+                      <a:pPr algn="ctr" fontAlgn="ctr"/>
+                      <a:r>
+                        <a:rPr lang="fr-FR" sz="1100" b="0" i="0" u="none" strike="noStrike">
+                          <a:solidFill>
+                            <a:srgbClr val="000000"/>
+                          </a:solidFill>
+                          <a:effectLst/>
+                          <a:latin typeface="Calibri"/>
+                        </a:rPr>
+                        <a:t>Impossibilité de</a:t>
+                      </a:r>
+                      <a:br>
+                        <a:rPr lang="fr-FR" sz="1100" b="0" i="0" u="none" strike="noStrike">
+                          <a:solidFill>
+                            <a:srgbClr val="000000"/>
+                          </a:solidFill>
+                          <a:effectLst/>
+                          <a:latin typeface="Calibri"/>
+                        </a:rPr>
+                      </a:br>
+                      <a:r>
+                        <a:rPr lang="fr-FR" sz="1100" b="0" i="0" u="none" strike="noStrike">
+                          <a:solidFill>
+                            <a:srgbClr val="000000"/>
+                          </a:solidFill>
+                          <a:effectLst/>
+                          <a:latin typeface="Calibri"/>
+                        </a:rPr>
+                        <a:t> faire la simulation en temps réel</a:t>
+                      </a:r>
+                    </a:p>
+                  </a:txBody>
+                  <a:tcPr marL="12700" marR="12700" marT="12700" marB="0" anchor="ctr"/>
+                </a:tc>
+                <a:tc>
+                  <a:txBody>
+                    <a:bodyPr/>
+                    <a:lstStyle/>
+                    <a:p>
+                      <a:pPr algn="ctr" fontAlgn="ctr"/>
+                      <a:r>
+                        <a:rPr lang="fr-FR" sz="1100" b="0" i="0" u="none" strike="noStrike">
+                          <a:solidFill>
+                            <a:srgbClr val="000000"/>
+                          </a:solidFill>
+                          <a:effectLst/>
+                          <a:latin typeface="Calibri"/>
+                        </a:rPr>
+                        <a:t>Échéancier du projet</a:t>
+                      </a:r>
+                      <a:br>
+                        <a:rPr lang="fr-FR" sz="1100" b="0" i="0" u="none" strike="noStrike">
+                          <a:solidFill>
+                            <a:srgbClr val="000000"/>
+                          </a:solidFill>
+                          <a:effectLst/>
+                          <a:latin typeface="Calibri"/>
+                        </a:rPr>
+                      </a:br>
+                      <a:r>
+                        <a:rPr lang="fr-FR" sz="1100" b="0" i="0" u="none" strike="noStrike">
+                          <a:solidFill>
+                            <a:srgbClr val="000000"/>
+                          </a:solidFill>
+                          <a:effectLst/>
+                          <a:latin typeface="Calibri"/>
+                        </a:rPr>
+                        <a:t> non respecté</a:t>
+                      </a:r>
+                    </a:p>
+                  </a:txBody>
+                  <a:tcPr marL="12700" marR="12700" marT="12700" marB="0" anchor="ctr"/>
+                </a:tc>
+                <a:tc>
+                  <a:txBody>
+                    <a:bodyPr/>
+                    <a:lstStyle/>
+                    <a:p>
+                      <a:pPr algn="ctr" fontAlgn="ctr"/>
+                      <a:r>
+                        <a:rPr lang="en-US" sz="1100" b="0" i="0" u="none" strike="noStrike">
+                          <a:solidFill>
+                            <a:srgbClr val="000000"/>
+                          </a:solidFill>
+                          <a:effectLst/>
+                          <a:latin typeface="Calibri"/>
+                        </a:rPr>
+                        <a:t>10%</a:t>
+                      </a:r>
+                    </a:p>
+                  </a:txBody>
+                  <a:tcPr marL="12700" marR="12700" marT="12700" marB="0" anchor="ctr"/>
+                </a:tc>
+                <a:tc>
+                  <a:txBody>
+                    <a:bodyPr/>
+                    <a:lstStyle/>
+                    <a:p>
+                      <a:pPr algn="ctr" fontAlgn="ctr"/>
+                      <a:r>
+                        <a:rPr lang="fr-FR" sz="1100" b="0" i="0" u="none" strike="noStrike">
+                          <a:solidFill>
+                            <a:srgbClr val="000000"/>
+                          </a:solidFill>
+                          <a:effectLst/>
+                          <a:latin typeface="Calibri"/>
+                        </a:rPr>
+                        <a:t>Maintenir une communication efficace avec le LEEPCI dans l'optique de se servir du simulateur dès son arrivée</a:t>
+                      </a:r>
+                    </a:p>
+                  </a:txBody>
+                  <a:tcPr marL="12700" marR="12700" marT="12700" marB="0" anchor="ctr"/>
+                </a:tc>
+                <a:tc>
+                  <a:txBody>
+                    <a:bodyPr/>
+                    <a:lstStyle/>
+                    <a:p>
+                      <a:pPr algn="ctr" fontAlgn="ctr"/>
+                      <a:r>
+                        <a:rPr lang="fi-FI" sz="1100" b="0" i="0" u="none" strike="noStrike">
+                          <a:solidFill>
+                            <a:srgbClr val="000000"/>
+                          </a:solidFill>
+                          <a:effectLst/>
+                          <a:latin typeface="Calibri"/>
+                        </a:rPr>
+                        <a:t>Gabriel Boivin</a:t>
+                      </a:r>
+                    </a:p>
+                  </a:txBody>
+                  <a:tcPr marL="12700" marR="12700" marT="12700" marB="0" anchor="ctr"/>
+                </a:tc>
+              </a:tr>
+              <a:tr h="2291554">
+                <a:tc>
+                  <a:txBody>
+                    <a:bodyPr/>
+                    <a:lstStyle/>
+                    <a:p>
+                      <a:pPr algn="ctr" fontAlgn="ctr"/>
+                      <a:r>
+                        <a:rPr lang="fr-FR" sz="1100" b="0" i="0" u="none" strike="noStrike">
+                          <a:solidFill>
+                            <a:srgbClr val="000000"/>
+                          </a:solidFill>
+                          <a:effectLst/>
+                          <a:latin typeface="Calibri"/>
+                        </a:rPr>
+                        <a:t>Pertes des données liées aux simulateurs</a:t>
+                      </a:r>
+                    </a:p>
+                  </a:txBody>
+                  <a:tcPr marL="12700" marR="12700" marT="12700" marB="0" anchor="ctr"/>
+                </a:tc>
+                <a:tc>
+                  <a:txBody>
+                    <a:bodyPr/>
+                    <a:lstStyle/>
+                    <a:p>
+                      <a:pPr algn="ctr" fontAlgn="ctr"/>
+                      <a:r>
+                        <a:rPr lang="en-US" sz="1100" b="0" i="0" u="none" strike="noStrike">
+                          <a:solidFill>
+                            <a:srgbClr val="000000"/>
+                          </a:solidFill>
+                          <a:effectLst/>
+                          <a:latin typeface="Calibri"/>
+                        </a:rPr>
+                        <a:t>5</a:t>
+                      </a:r>
+                    </a:p>
+                  </a:txBody>
+                  <a:tcPr marL="12700" marR="12700" marT="12700" marB="0" anchor="ctr"/>
+                </a:tc>
+                <a:tc>
+                  <a:txBody>
+                    <a:bodyPr/>
+                    <a:lstStyle/>
+                    <a:p>
+                      <a:pPr algn="ctr" fontAlgn="ctr"/>
+                      <a:r>
+                        <a:rPr lang="fr-FR" sz="1100" b="0" i="0" u="none" strike="noStrike">
+                          <a:solidFill>
+                            <a:srgbClr val="000000"/>
+                          </a:solidFill>
+                          <a:effectLst/>
+                          <a:latin typeface="Calibri"/>
+                        </a:rPr>
+                        <a:t>Retard sur le projet mineur s'il existe une révision récente et retards majeurs dans le cas échéant</a:t>
+                      </a:r>
+                    </a:p>
+                  </a:txBody>
+                  <a:tcPr marL="12700" marR="12700" marT="12700" marB="0" anchor="ctr"/>
+                </a:tc>
+                <a:tc>
+                  <a:txBody>
+                    <a:bodyPr/>
+                    <a:lstStyle/>
+                    <a:p>
+                      <a:pPr algn="ctr" fontAlgn="ctr"/>
+                      <a:r>
+                        <a:rPr lang="fr-FR" sz="1100" b="0" i="0" u="none" strike="noStrike">
+                          <a:solidFill>
+                            <a:srgbClr val="000000"/>
+                          </a:solidFill>
+                          <a:effectLst/>
+                          <a:latin typeface="Calibri"/>
+                        </a:rPr>
+                        <a:t>Certains objectifs ne seront pas atteints dans les temps initiaux prescrits</a:t>
+                      </a:r>
+                    </a:p>
+                  </a:txBody>
+                  <a:tcPr marL="12700" marR="12700" marT="12700" marB="0" anchor="ctr"/>
+                </a:tc>
+                <a:tc>
+                  <a:txBody>
+                    <a:bodyPr/>
+                    <a:lstStyle/>
+                    <a:p>
+                      <a:pPr algn="ctr" fontAlgn="ctr"/>
+                      <a:r>
+                        <a:rPr lang="en-US" sz="1100" b="0" i="0" u="none" strike="noStrike">
+                          <a:solidFill>
+                            <a:srgbClr val="000000"/>
+                          </a:solidFill>
+                          <a:effectLst/>
+                          <a:latin typeface="Calibri"/>
+                        </a:rPr>
+                        <a:t>20%</a:t>
+                      </a:r>
+                    </a:p>
+                  </a:txBody>
+                  <a:tcPr marL="12700" marR="12700" marT="12700" marB="0" anchor="ctr"/>
+                </a:tc>
+                <a:tc>
+                  <a:txBody>
+                    <a:bodyPr/>
+                    <a:lstStyle/>
+                    <a:p>
+                      <a:pPr algn="ctr" fontAlgn="ctr"/>
+                      <a:r>
+                        <a:rPr lang="fr-FR" sz="1100" b="0" i="0" u="none" strike="noStrike" dirty="0">
+                          <a:solidFill>
+                            <a:srgbClr val="000000"/>
+                          </a:solidFill>
+                          <a:effectLst/>
+                          <a:latin typeface="Calibri"/>
+                        </a:rPr>
+                        <a:t>S'assurer de bien maintenir les révisions à jour, travaille collaboratif mis fréquemment à jour et dont les changements sont réversibles au moyen d'une synchronisation sur un serveur web protégé (</a:t>
+                      </a:r>
+                      <a:r>
+                        <a:rPr lang="fr-FR" sz="1100" b="0" i="0" u="none" strike="noStrike" dirty="0" err="1">
+                          <a:solidFill>
+                            <a:srgbClr val="000000"/>
+                          </a:solidFill>
+                          <a:effectLst/>
+                          <a:latin typeface="Calibri"/>
+                        </a:rPr>
+                        <a:t>GitHub</a:t>
+                      </a:r>
+                      <a:r>
+                        <a:rPr lang="fr-FR" sz="1100" b="0" i="0" u="none" strike="noStrike" dirty="0">
+                          <a:solidFill>
+                            <a:srgbClr val="000000"/>
+                          </a:solidFill>
+                          <a:effectLst/>
+                          <a:latin typeface="Calibri"/>
+                        </a:rPr>
+                        <a:t>)</a:t>
+                      </a:r>
+                    </a:p>
+                  </a:txBody>
+                  <a:tcPr marL="12700" marR="12700" marT="12700" marB="0" anchor="ctr"/>
+                </a:tc>
+                <a:tc>
+                  <a:txBody>
+                    <a:bodyPr/>
+                    <a:lstStyle/>
+                    <a:p>
+                      <a:pPr algn="ctr" fontAlgn="ctr"/>
+                      <a:r>
+                        <a:rPr lang="fi-FI" sz="1100" b="0" i="0" u="none" strike="noStrike" dirty="0">
+                          <a:solidFill>
+                            <a:srgbClr val="000000"/>
+                          </a:solidFill>
+                          <a:effectLst/>
+                          <a:latin typeface="Calibri"/>
+                        </a:rPr>
+                        <a:t>Francis </a:t>
+                      </a:r>
+                      <a:r>
+                        <a:rPr lang="fi-FI" sz="1100" b="0" i="0" u="none" strike="noStrike" dirty="0" err="1">
+                          <a:solidFill>
+                            <a:srgbClr val="000000"/>
+                          </a:solidFill>
+                          <a:effectLst/>
+                          <a:latin typeface="Calibri"/>
+                        </a:rPr>
+                        <a:t>Valois</a:t>
+                      </a:r>
+                      <a:endParaRPr lang="fi-FI" sz="1100" b="0" i="0" u="none" strike="noStrike" dirty="0">
+                        <a:solidFill>
+                          <a:srgbClr val="000000"/>
+                        </a:solidFill>
+                        <a:effectLst/>
+                        <a:latin typeface="Calibri"/>
+                      </a:endParaRPr>
+                    </a:p>
+                  </a:txBody>
+                  <a:tcPr marL="12700" marR="12700" marT="12700" marB="0" anchor="ctr"/>
+                </a:tc>
+              </a:tr>
+            </a:tbl>
+          </a:graphicData>
+        </a:graphic>
+      </p:graphicFrame>
+    </p:spTree>
+    <p:extLst>
+      <p:ext uri="{BB962C8B-B14F-4D97-AF65-F5344CB8AC3E}">
+        <p14:creationId xmlns:p14="http://schemas.microsoft.com/office/powerpoint/2010/main" val="3181824677"/>
+      </p:ext>
+    </p:extLst>
+  </p:cSld>
+  <p:clrMapOvr>
+    <a:masterClrMapping/>
+  </p:clrMapOvr>
+</p:sld>
+</file>
+
+<file path=ppt/slides/slide18.xml><?xml version="1.0" encoding="utf-8"?>
+<p:sld xmlns:a="http://schemas.openxmlformats.org/drawingml/2006/main" xmlns:r="http://schemas.openxmlformats.org/officeDocument/2006/relationships" xmlns:p="http://schemas.openxmlformats.org/presentationml/2006/main">
+  <p:cSld>
+    <p:spTree>
+      <p:nvGrpSpPr>
+        <p:cNvPr id="1" name=""/>
+        <p:cNvGrpSpPr/>
+        <p:nvPr/>
+      </p:nvGrpSpPr>
+      <p:grpSpPr>
+        <a:xfrm>
+          <a:off x="0" y="0"/>
+          <a:ext cx="0" cy="0"/>
+          <a:chOff x="0" y="0"/>
+          <a:chExt cx="0" cy="0"/>
+        </a:xfrm>
+      </p:grpSpPr>
+      <p:sp>
+        <p:nvSpPr>
+          <p:cNvPr id="2" name="Title 1"/>
+          <p:cNvSpPr>
+            <a:spLocks noGrp="1"/>
+          </p:cNvSpPr>
+          <p:nvPr>
+            <p:ph type="title"/>
+          </p:nvPr>
+        </p:nvSpPr>
+        <p:spPr/>
+        <p:txBody>
+          <a:bodyPr/>
+          <a:lstStyle/>
+          <a:p>
+            <a:r>
+              <a:rPr lang="en-US" dirty="0" err="1"/>
+              <a:t>Registre</a:t>
+            </a:r>
+            <a:r>
+              <a:rPr lang="en-US" dirty="0"/>
+              <a:t> des </a:t>
+            </a:r>
+            <a:r>
+              <a:rPr lang="en-US" dirty="0" err="1"/>
+              <a:t>risques</a:t>
+            </a:r>
+            <a:r>
+              <a:rPr lang="en-US" dirty="0"/>
+              <a:t> </a:t>
+            </a:r>
+            <a:r>
+              <a:rPr lang="en-US" dirty="0" smtClean="0"/>
+              <a:t>(2/3)</a:t>
+            </a:r>
+            <a:endParaRPr lang="en-US" dirty="0"/>
+          </a:p>
+        </p:txBody>
+      </p:sp>
+      <p:graphicFrame>
+        <p:nvGraphicFramePr>
+          <p:cNvPr id="4" name="Content Placeholder 3"/>
+          <p:cNvGraphicFramePr>
+            <a:graphicFrameLocks noGrp="1"/>
+          </p:cNvGraphicFramePr>
+          <p:nvPr>
+            <p:ph idx="1"/>
+            <p:extLst>
+              <p:ext uri="{D42A27DB-BD31-4B8C-83A1-F6EECF244321}">
+                <p14:modId xmlns:p14="http://schemas.microsoft.com/office/powerpoint/2010/main" val="4126102908"/>
+              </p:ext>
+            </p:extLst>
+          </p:nvPr>
+        </p:nvGraphicFramePr>
+        <p:xfrm>
+          <a:off x="677863" y="1373443"/>
+          <a:ext cx="10766560" cy="5257496"/>
+        </p:xfrm>
+        <a:graphic>
+          <a:graphicData uri="http://schemas.openxmlformats.org/drawingml/2006/table">
+            <a:tbl>
+              <a:tblPr firstRow="1" bandRow="1">
+                <a:tableStyleId>{5C22544A-7EE6-4342-B048-85BDC9FD1C3A}</a:tableStyleId>
+              </a:tblPr>
+              <a:tblGrid>
+                <a:gridCol w="1538080"/>
+                <a:gridCol w="1538080"/>
+                <a:gridCol w="1538080"/>
+                <a:gridCol w="1538080"/>
+                <a:gridCol w="1538080"/>
+                <a:gridCol w="1538080"/>
+                <a:gridCol w="1538080"/>
+              </a:tblGrid>
+              <a:tr h="1125374">
+                <a:tc>
+                  <a:txBody>
+                    <a:bodyPr/>
+                    <a:lstStyle/>
+                    <a:p>
+                      <a:pPr algn="ctr" fontAlgn="ctr"/>
+                      <a:r>
+                        <a:rPr lang="fr-FR" sz="1100" b="1" i="0" u="none" strike="noStrike" dirty="0">
+                          <a:solidFill>
+                            <a:srgbClr val="000000"/>
+                          </a:solidFill>
+                          <a:effectLst/>
+                          <a:latin typeface="Calibri"/>
+                        </a:rPr>
+                        <a:t>Type de risque</a:t>
+                      </a:r>
+                    </a:p>
+                  </a:txBody>
+                  <a:tcPr marL="12700" marR="12700" marT="12700" marB="0" anchor="ctr"/>
+                </a:tc>
+                <a:tc>
+                  <a:txBody>
+                    <a:bodyPr/>
+                    <a:lstStyle/>
+                    <a:p>
+                      <a:pPr algn="ctr" fontAlgn="ctr"/>
+                      <a:r>
+                        <a:rPr lang="fr-FR" sz="1100" b="1" i="0" u="none" strike="noStrike">
+                          <a:solidFill>
+                            <a:srgbClr val="000000"/>
+                          </a:solidFill>
+                          <a:effectLst/>
+                          <a:latin typeface="Calibri"/>
+                        </a:rPr>
+                        <a:t>Niveau de priorité</a:t>
+                      </a:r>
+                      <a:br>
+                        <a:rPr lang="fr-FR" sz="1100" b="1" i="0" u="none" strike="noStrike">
+                          <a:solidFill>
+                            <a:srgbClr val="000000"/>
+                          </a:solidFill>
+                          <a:effectLst/>
+                          <a:latin typeface="Calibri"/>
+                        </a:rPr>
+                      </a:br>
+                      <a:r>
+                        <a:rPr lang="fr-FR" sz="1100" b="1" i="0" u="none" strike="noStrike">
+                          <a:solidFill>
+                            <a:srgbClr val="000000"/>
+                          </a:solidFill>
+                          <a:effectLst/>
+                          <a:latin typeface="Calibri"/>
+                        </a:rPr>
+                        <a:t>(1 faible, 5 élevé)</a:t>
+                      </a:r>
+                    </a:p>
+                  </a:txBody>
+                  <a:tcPr marL="12700" marR="12700" marT="12700" marB="0" anchor="ctr"/>
+                </a:tc>
+                <a:tc>
+                  <a:txBody>
+                    <a:bodyPr/>
+                    <a:lstStyle/>
+                    <a:p>
+                      <a:pPr algn="ctr" fontAlgn="ctr"/>
+                      <a:r>
+                        <a:rPr lang="fr-FR" sz="1100" b="1" i="0" u="none" strike="noStrike">
+                          <a:solidFill>
+                            <a:srgbClr val="000000"/>
+                          </a:solidFill>
+                          <a:effectLst/>
+                          <a:latin typeface="Calibri"/>
+                        </a:rPr>
+                        <a:t>Conséquence de</a:t>
+                      </a:r>
+                      <a:br>
+                        <a:rPr lang="fr-FR" sz="1100" b="1" i="0" u="none" strike="noStrike">
+                          <a:solidFill>
+                            <a:srgbClr val="000000"/>
+                          </a:solidFill>
+                          <a:effectLst/>
+                          <a:latin typeface="Calibri"/>
+                        </a:rPr>
+                      </a:br>
+                      <a:r>
+                        <a:rPr lang="fr-FR" sz="1100" b="1" i="0" u="none" strike="noStrike">
+                          <a:solidFill>
+                            <a:srgbClr val="000000"/>
+                          </a:solidFill>
+                          <a:effectLst/>
+                          <a:latin typeface="Calibri"/>
+                        </a:rPr>
+                        <a:t> l'occurrence du risque</a:t>
+                      </a:r>
+                    </a:p>
+                  </a:txBody>
+                  <a:tcPr marL="12700" marR="12700" marT="12700" marB="0" anchor="ctr"/>
+                </a:tc>
+                <a:tc>
+                  <a:txBody>
+                    <a:bodyPr/>
+                    <a:lstStyle/>
+                    <a:p>
+                      <a:pPr algn="ctr" fontAlgn="ctr"/>
+                      <a:r>
+                        <a:rPr lang="fr-FR" sz="1100" b="1" i="0" u="none" strike="noStrike">
+                          <a:solidFill>
+                            <a:srgbClr val="000000"/>
+                          </a:solidFill>
+                          <a:effectLst/>
+                          <a:latin typeface="Calibri"/>
+                        </a:rPr>
+                        <a:t>Coût en performance</a:t>
+                      </a:r>
+                      <a:br>
+                        <a:rPr lang="fr-FR" sz="1100" b="1" i="0" u="none" strike="noStrike">
+                          <a:solidFill>
+                            <a:srgbClr val="000000"/>
+                          </a:solidFill>
+                          <a:effectLst/>
+                          <a:latin typeface="Calibri"/>
+                        </a:rPr>
+                      </a:br>
+                      <a:r>
+                        <a:rPr lang="fr-FR" sz="1100" b="1" i="0" u="none" strike="noStrike">
+                          <a:solidFill>
+                            <a:srgbClr val="000000"/>
+                          </a:solidFill>
+                          <a:effectLst/>
+                          <a:latin typeface="Calibri"/>
+                        </a:rPr>
+                        <a:t> associé au risque</a:t>
+                      </a:r>
+                    </a:p>
+                  </a:txBody>
+                  <a:tcPr marL="12700" marR="12700" marT="12700" marB="0" anchor="ctr"/>
+                </a:tc>
+                <a:tc>
+                  <a:txBody>
+                    <a:bodyPr/>
+                    <a:lstStyle/>
+                    <a:p>
+                      <a:pPr algn="ctr" fontAlgn="ctr"/>
+                      <a:r>
+                        <a:rPr lang="fr-FR" sz="1100" b="1" i="0" u="none" strike="noStrike">
+                          <a:solidFill>
+                            <a:srgbClr val="000000"/>
+                          </a:solidFill>
+                          <a:effectLst/>
+                          <a:latin typeface="Calibri"/>
+                        </a:rPr>
+                        <a:t>Probabilité d'occurrence</a:t>
+                      </a:r>
+                    </a:p>
+                  </a:txBody>
+                  <a:tcPr marL="12700" marR="12700" marT="12700" marB="0" anchor="ctr"/>
+                </a:tc>
+                <a:tc>
+                  <a:txBody>
+                    <a:bodyPr/>
+                    <a:lstStyle/>
+                    <a:p>
+                      <a:pPr algn="ctr" fontAlgn="ctr"/>
+                      <a:r>
+                        <a:rPr lang="fr-FR" sz="1100" b="1" i="0" u="none" strike="noStrike">
+                          <a:solidFill>
+                            <a:srgbClr val="000000"/>
+                          </a:solidFill>
+                          <a:effectLst/>
+                          <a:latin typeface="Calibri"/>
+                        </a:rPr>
+                        <a:t>Plan de réduction</a:t>
+                      </a:r>
+                      <a:br>
+                        <a:rPr lang="fr-FR" sz="1100" b="1" i="0" u="none" strike="noStrike">
+                          <a:solidFill>
+                            <a:srgbClr val="000000"/>
+                          </a:solidFill>
+                          <a:effectLst/>
+                          <a:latin typeface="Calibri"/>
+                        </a:rPr>
+                      </a:br>
+                      <a:r>
+                        <a:rPr lang="fr-FR" sz="1100" b="1" i="0" u="none" strike="noStrike">
+                          <a:solidFill>
+                            <a:srgbClr val="000000"/>
+                          </a:solidFill>
+                          <a:effectLst/>
+                          <a:latin typeface="Calibri"/>
+                        </a:rPr>
+                        <a:t> du risque</a:t>
+                      </a:r>
+                    </a:p>
+                  </a:txBody>
+                  <a:tcPr marL="12700" marR="12700" marT="12700" marB="0" anchor="ctr"/>
+                </a:tc>
+                <a:tc>
+                  <a:txBody>
+                    <a:bodyPr/>
+                    <a:lstStyle/>
+                    <a:p>
+                      <a:pPr algn="ctr" fontAlgn="ctr"/>
+                      <a:r>
+                        <a:rPr lang="fr-FR" sz="1100" b="1" i="0" u="none" strike="noStrike" dirty="0">
+                          <a:solidFill>
+                            <a:srgbClr val="000000"/>
+                          </a:solidFill>
+                          <a:effectLst/>
+                          <a:latin typeface="Calibri"/>
+                        </a:rPr>
+                        <a:t>Responsable du risque</a:t>
+                      </a:r>
+                    </a:p>
+                  </a:txBody>
+                  <a:tcPr marL="12700" marR="12700" marT="12700" marB="0" anchor="ctr"/>
+                </a:tc>
+              </a:tr>
+              <a:tr h="1879522">
+                <a:tc>
+                  <a:txBody>
+                    <a:bodyPr/>
+                    <a:lstStyle/>
+                    <a:p>
+                      <a:pPr algn="ctr" fontAlgn="ctr"/>
+                      <a:r>
+                        <a:rPr lang="fr-FR" sz="1100" b="0" i="0" u="none" strike="noStrike">
+                          <a:solidFill>
+                            <a:srgbClr val="000000"/>
+                          </a:solidFill>
+                          <a:effectLst/>
+                          <a:latin typeface="Calibri"/>
+                        </a:rPr>
+                        <a:t>Pertes des données liées aux simulateurs</a:t>
+                      </a:r>
+                    </a:p>
+                  </a:txBody>
+                  <a:tcPr marL="12700" marR="12700" marT="12700" marB="0" anchor="ctr"/>
+                </a:tc>
+                <a:tc>
+                  <a:txBody>
+                    <a:bodyPr/>
+                    <a:lstStyle/>
+                    <a:p>
+                      <a:pPr algn="ctr" fontAlgn="ctr"/>
+                      <a:r>
+                        <a:rPr lang="en-US" sz="1100" b="0" i="0" u="none" strike="noStrike">
+                          <a:solidFill>
+                            <a:srgbClr val="000000"/>
+                          </a:solidFill>
+                          <a:effectLst/>
+                          <a:latin typeface="Calibri"/>
+                        </a:rPr>
+                        <a:t>5</a:t>
+                      </a:r>
+                    </a:p>
+                  </a:txBody>
+                  <a:tcPr marL="12700" marR="12700" marT="12700" marB="0" anchor="ctr"/>
+                </a:tc>
+                <a:tc>
+                  <a:txBody>
+                    <a:bodyPr/>
+                    <a:lstStyle/>
+                    <a:p>
+                      <a:pPr algn="ctr" fontAlgn="ctr"/>
+                      <a:r>
+                        <a:rPr lang="fr-FR" sz="1100" b="0" i="0" u="none" strike="noStrike">
+                          <a:solidFill>
+                            <a:srgbClr val="000000"/>
+                          </a:solidFill>
+                          <a:effectLst/>
+                          <a:latin typeface="Calibri"/>
+                        </a:rPr>
+                        <a:t>Retard sur le projet mineur s'il existe une révision récente et retards majeurs dans le cas échéant</a:t>
+                      </a:r>
+                    </a:p>
+                  </a:txBody>
+                  <a:tcPr marL="12700" marR="12700" marT="12700" marB="0" anchor="ctr"/>
+                </a:tc>
+                <a:tc>
+                  <a:txBody>
+                    <a:bodyPr/>
+                    <a:lstStyle/>
+                    <a:p>
+                      <a:pPr algn="ctr" fontAlgn="ctr"/>
+                      <a:r>
+                        <a:rPr lang="fr-FR" sz="1100" b="0" i="0" u="none" strike="noStrike">
+                          <a:solidFill>
+                            <a:srgbClr val="000000"/>
+                          </a:solidFill>
+                          <a:effectLst/>
+                          <a:latin typeface="Calibri"/>
+                        </a:rPr>
+                        <a:t>Certains objectifs ne seront pas atteints dans les temps initiaux prescrits</a:t>
+                      </a:r>
+                    </a:p>
+                  </a:txBody>
+                  <a:tcPr marL="12700" marR="12700" marT="12700" marB="0" anchor="ctr"/>
+                </a:tc>
+                <a:tc>
+                  <a:txBody>
+                    <a:bodyPr/>
+                    <a:lstStyle/>
+                    <a:p>
+                      <a:pPr algn="ctr" fontAlgn="ctr"/>
+                      <a:r>
+                        <a:rPr lang="en-US" sz="1100" b="0" i="0" u="none" strike="noStrike">
+                          <a:solidFill>
+                            <a:srgbClr val="000000"/>
+                          </a:solidFill>
+                          <a:effectLst/>
+                          <a:latin typeface="Calibri"/>
+                        </a:rPr>
+                        <a:t>20%</a:t>
+                      </a:r>
+                    </a:p>
+                  </a:txBody>
+                  <a:tcPr marL="12700" marR="12700" marT="12700" marB="0" anchor="ctr"/>
+                </a:tc>
+                <a:tc>
+                  <a:txBody>
+                    <a:bodyPr/>
+                    <a:lstStyle/>
+                    <a:p>
+                      <a:pPr algn="ctr" fontAlgn="ctr"/>
+                      <a:r>
+                        <a:rPr lang="fr-FR" sz="1100" b="0" i="0" u="none" strike="noStrike">
+                          <a:solidFill>
+                            <a:srgbClr val="000000"/>
+                          </a:solidFill>
+                          <a:effectLst/>
+                          <a:latin typeface="Calibri"/>
+                        </a:rPr>
+                        <a:t>S'assurer de bien maintenir les révisions à jour, travaille collaboratif mis fréquemment à jour et dont les changements sont réversibles au moyen d'une synchronisation sur un serveur web protégé (GitHub)</a:t>
+                      </a:r>
+                    </a:p>
+                  </a:txBody>
+                  <a:tcPr marL="12700" marR="12700" marT="12700" marB="0" anchor="ctr"/>
+                </a:tc>
+                <a:tc>
+                  <a:txBody>
+                    <a:bodyPr/>
+                    <a:lstStyle/>
+                    <a:p>
+                      <a:pPr algn="ctr" fontAlgn="ctr"/>
+                      <a:r>
+                        <a:rPr lang="fi-FI" sz="1100" b="0" i="0" u="none" strike="noStrike" dirty="0">
+                          <a:solidFill>
+                            <a:srgbClr val="000000"/>
+                          </a:solidFill>
+                          <a:effectLst/>
+                          <a:latin typeface="Calibri"/>
+                        </a:rPr>
+                        <a:t>Francis </a:t>
+                      </a:r>
+                      <a:r>
+                        <a:rPr lang="fi-FI" sz="1100" b="0" i="0" u="none" strike="noStrike" dirty="0" err="1">
+                          <a:solidFill>
+                            <a:srgbClr val="000000"/>
+                          </a:solidFill>
+                          <a:effectLst/>
+                          <a:latin typeface="Calibri"/>
+                        </a:rPr>
+                        <a:t>Valois</a:t>
+                      </a:r>
+                      <a:endParaRPr lang="fi-FI" sz="1100" b="0" i="0" u="none" strike="noStrike" dirty="0">
+                        <a:solidFill>
+                          <a:srgbClr val="000000"/>
+                        </a:solidFill>
+                        <a:effectLst/>
+                        <a:latin typeface="Calibri"/>
+                      </a:endParaRPr>
+                    </a:p>
+                  </a:txBody>
+                  <a:tcPr marL="12700" marR="12700" marT="12700" marB="0" anchor="ctr"/>
+                </a:tc>
+              </a:tr>
+              <a:tr h="2252600">
+                <a:tc>
+                  <a:txBody>
+                    <a:bodyPr/>
+                    <a:lstStyle/>
+                    <a:p>
+                      <a:pPr algn="ctr" fontAlgn="ctr"/>
+                      <a:r>
+                        <a:rPr lang="fr-FR" sz="1100" b="0" i="0" u="none" strike="noStrike">
+                          <a:solidFill>
+                            <a:srgbClr val="000000"/>
+                          </a:solidFill>
+                          <a:effectLst/>
+                          <a:latin typeface="Calibri"/>
+                        </a:rPr>
+                        <a:t>Versions  de développement et d'utilisation différentes de Matlab </a:t>
+                      </a:r>
+                    </a:p>
+                  </a:txBody>
+                  <a:tcPr marL="12700" marR="12700" marT="12700" marB="0" anchor="ctr"/>
+                </a:tc>
+                <a:tc>
+                  <a:txBody>
+                    <a:bodyPr/>
+                    <a:lstStyle/>
+                    <a:p>
+                      <a:pPr algn="ctr" fontAlgn="ctr"/>
+                      <a:r>
+                        <a:rPr lang="en-US" sz="1100" b="0" i="0" u="none" strike="noStrike">
+                          <a:solidFill>
+                            <a:srgbClr val="000000"/>
+                          </a:solidFill>
+                          <a:effectLst/>
+                          <a:latin typeface="Calibri"/>
+                        </a:rPr>
+                        <a:t>4</a:t>
+                      </a:r>
+                    </a:p>
+                  </a:txBody>
+                  <a:tcPr marL="12700" marR="12700" marT="12700" marB="0" anchor="ctr"/>
+                </a:tc>
+                <a:tc>
+                  <a:txBody>
+                    <a:bodyPr/>
+                    <a:lstStyle/>
+                    <a:p>
+                      <a:pPr algn="ctr" fontAlgn="ctr"/>
+                      <a:r>
+                        <a:rPr lang="fr-FR" sz="1100" b="0" i="0" u="none" strike="noStrike">
+                          <a:solidFill>
+                            <a:srgbClr val="000000"/>
+                          </a:solidFill>
+                          <a:effectLst/>
+                          <a:latin typeface="Calibri"/>
+                        </a:rPr>
+                        <a:t>Certaines fonctionnalités du simulateur en temps réel ne pourraient pas concorder, certains modules de simulink ou certaines fonctionnalités de Matlab pourraient ne pas être compatibles</a:t>
+                      </a:r>
+                      <a:br>
+                        <a:rPr lang="fr-FR" sz="1100" b="0" i="0" u="none" strike="noStrike">
+                          <a:solidFill>
+                            <a:srgbClr val="000000"/>
+                          </a:solidFill>
+                          <a:effectLst/>
+                          <a:latin typeface="Calibri"/>
+                        </a:rPr>
+                      </a:br>
+                      <a:endParaRPr lang="fr-FR" sz="1100" b="0" i="0" u="none" strike="noStrike">
+                        <a:solidFill>
+                          <a:srgbClr val="000000"/>
+                        </a:solidFill>
+                        <a:effectLst/>
+                        <a:latin typeface="Calibri"/>
+                      </a:endParaRPr>
+                    </a:p>
+                  </a:txBody>
+                  <a:tcPr marL="12700" marR="12700" marT="12700" marB="0" anchor="ctr"/>
+                </a:tc>
+                <a:tc>
+                  <a:txBody>
+                    <a:bodyPr/>
+                    <a:lstStyle/>
+                    <a:p>
+                      <a:pPr algn="ctr" fontAlgn="ctr"/>
+                      <a:r>
+                        <a:rPr lang="fr-FR" sz="1100" b="0" i="0" u="none" strike="noStrike">
+                          <a:solidFill>
+                            <a:srgbClr val="000000"/>
+                          </a:solidFill>
+                          <a:effectLst/>
+                          <a:latin typeface="Calibri"/>
+                        </a:rPr>
+                        <a:t>Incapacité de fournir un simulateur fonctionnant explicitement comme décrit dans la documentation, besoin d'effectuer des modifications internes importantes, du côté du client, pour maintenir le fonctionnement désiré du simulateur</a:t>
+                      </a:r>
+                      <a:br>
+                        <a:rPr lang="fr-FR" sz="1100" b="0" i="0" u="none" strike="noStrike">
+                          <a:solidFill>
+                            <a:srgbClr val="000000"/>
+                          </a:solidFill>
+                          <a:effectLst/>
+                          <a:latin typeface="Calibri"/>
+                        </a:rPr>
+                      </a:br>
+                      <a:endParaRPr lang="fr-FR" sz="1100" b="0" i="0" u="none" strike="noStrike">
+                        <a:solidFill>
+                          <a:srgbClr val="000000"/>
+                        </a:solidFill>
+                        <a:effectLst/>
+                        <a:latin typeface="Calibri"/>
+                      </a:endParaRPr>
+                    </a:p>
+                  </a:txBody>
+                  <a:tcPr marL="12700" marR="12700" marT="12700" marB="0" anchor="ctr"/>
+                </a:tc>
+                <a:tc>
+                  <a:txBody>
+                    <a:bodyPr/>
+                    <a:lstStyle/>
+                    <a:p>
+                      <a:pPr algn="ctr" fontAlgn="ctr"/>
+                      <a:r>
+                        <a:rPr lang="en-US" sz="1100" b="0" i="0" u="none" strike="noStrike" dirty="0">
+                          <a:solidFill>
+                            <a:srgbClr val="000000"/>
+                          </a:solidFill>
+                          <a:effectLst/>
+                          <a:latin typeface="Calibri"/>
+                        </a:rPr>
+                        <a:t>15%</a:t>
+                      </a:r>
+                    </a:p>
+                  </a:txBody>
+                  <a:tcPr marL="12700" marR="12700" marT="12700" marB="0" anchor="ctr"/>
+                </a:tc>
+                <a:tc>
+                  <a:txBody>
+                    <a:bodyPr/>
+                    <a:lstStyle/>
+                    <a:p>
+                      <a:pPr algn="ctr" fontAlgn="ctr"/>
+                      <a:r>
+                        <a:rPr lang="fr-FR" sz="1100" b="0" i="0" u="none" strike="noStrike">
+                          <a:solidFill>
+                            <a:srgbClr val="000000"/>
+                          </a:solidFill>
+                          <a:effectLst/>
+                          <a:latin typeface="Calibri"/>
+                        </a:rPr>
+                        <a:t>Faire des tests à partir de différentes plateformes et à partir de différents systèmes d'exploitation de manière à s'assurer l'homogénéité dans le fonctionnement de Matlab</a:t>
+                      </a:r>
+                    </a:p>
+                  </a:txBody>
+                  <a:tcPr marL="12700" marR="12700" marT="12700" marB="0" anchor="ctr"/>
+                </a:tc>
+                <a:tc>
+                  <a:txBody>
+                    <a:bodyPr/>
+                    <a:lstStyle/>
+                    <a:p>
+                      <a:pPr algn="ctr" fontAlgn="ctr"/>
+                      <a:r>
+                        <a:rPr lang="fi-FI" sz="1100" b="0" i="0" u="none" strike="noStrike" dirty="0">
+                          <a:solidFill>
+                            <a:srgbClr val="000000"/>
+                          </a:solidFill>
+                          <a:effectLst/>
+                          <a:latin typeface="Calibri"/>
+                        </a:rPr>
+                        <a:t>Francis </a:t>
+                      </a:r>
+                      <a:r>
+                        <a:rPr lang="fi-FI" sz="1100" b="0" i="0" u="none" strike="noStrike" dirty="0" err="1">
+                          <a:solidFill>
+                            <a:srgbClr val="000000"/>
+                          </a:solidFill>
+                          <a:effectLst/>
+                          <a:latin typeface="Calibri"/>
+                        </a:rPr>
+                        <a:t>Valois</a:t>
+                      </a:r>
+                      <a:endParaRPr lang="fi-FI" sz="1100" b="0" i="0" u="none" strike="noStrike" dirty="0">
+                        <a:solidFill>
+                          <a:srgbClr val="000000"/>
+                        </a:solidFill>
+                        <a:effectLst/>
+                        <a:latin typeface="Calibri"/>
+                      </a:endParaRPr>
+                    </a:p>
+                  </a:txBody>
+                  <a:tcPr marL="12700" marR="12700" marT="12700" marB="0" anchor="ctr"/>
+                </a:tc>
+              </a:tr>
+            </a:tbl>
+          </a:graphicData>
+        </a:graphic>
+      </p:graphicFrame>
+    </p:spTree>
+    <p:extLst>
+      <p:ext uri="{BB962C8B-B14F-4D97-AF65-F5344CB8AC3E}">
+        <p14:creationId xmlns:p14="http://schemas.microsoft.com/office/powerpoint/2010/main" val="299696814"/>
+      </p:ext>
+    </p:extLst>
+  </p:cSld>
+  <p:clrMapOvr>
+    <a:masterClrMapping/>
+  </p:clrMapOvr>
+</p:sld>
+</file>
+
+<file path=ppt/slides/slide19.xml><?xml version="1.0" encoding="utf-8"?>
+<p:sld xmlns:a="http://schemas.openxmlformats.org/drawingml/2006/main" xmlns:r="http://schemas.openxmlformats.org/officeDocument/2006/relationships" xmlns:p="http://schemas.openxmlformats.org/presentationml/2006/main">
+  <p:cSld>
+    <p:spTree>
+      <p:nvGrpSpPr>
+        <p:cNvPr id="1" name=""/>
+        <p:cNvGrpSpPr/>
+        <p:nvPr/>
+      </p:nvGrpSpPr>
+      <p:grpSpPr>
+        <a:xfrm>
+          <a:off x="0" y="0"/>
+          <a:ext cx="0" cy="0"/>
+          <a:chOff x="0" y="0"/>
+          <a:chExt cx="0" cy="0"/>
+        </a:xfrm>
+      </p:grpSpPr>
+      <p:sp>
+        <p:nvSpPr>
+          <p:cNvPr id="2" name="Title 1"/>
+          <p:cNvSpPr>
+            <a:spLocks noGrp="1"/>
+          </p:cNvSpPr>
+          <p:nvPr>
+            <p:ph type="title"/>
+          </p:nvPr>
+        </p:nvSpPr>
+        <p:spPr/>
+        <p:txBody>
+          <a:bodyPr/>
+          <a:lstStyle/>
+          <a:p>
+            <a:r>
+              <a:rPr lang="en-US" dirty="0" err="1" smtClean="0"/>
+              <a:t>Registre</a:t>
+            </a:r>
+            <a:r>
+              <a:rPr lang="en-US" dirty="0" smtClean="0"/>
+              <a:t> des </a:t>
+            </a:r>
+            <a:r>
+              <a:rPr lang="en-US" dirty="0" err="1" smtClean="0"/>
+              <a:t>risques</a:t>
+            </a:r>
+            <a:r>
+              <a:rPr lang="en-US" dirty="0" smtClean="0"/>
+              <a:t> (3/3)</a:t>
+            </a:r>
+            <a:endParaRPr lang="en-US" dirty="0"/>
+          </a:p>
+        </p:txBody>
+      </p:sp>
+      <p:graphicFrame>
+        <p:nvGraphicFramePr>
+          <p:cNvPr id="4" name="Content Placeholder 3"/>
+          <p:cNvGraphicFramePr>
+            <a:graphicFrameLocks noGrp="1"/>
+          </p:cNvGraphicFramePr>
+          <p:nvPr>
+            <p:ph idx="1"/>
+            <p:extLst>
+              <p:ext uri="{D42A27DB-BD31-4B8C-83A1-F6EECF244321}">
+                <p14:modId xmlns:p14="http://schemas.microsoft.com/office/powerpoint/2010/main" val="317251936"/>
+              </p:ext>
+            </p:extLst>
+          </p:nvPr>
+        </p:nvGraphicFramePr>
+        <p:xfrm>
+          <a:off x="677863" y="1314373"/>
+          <a:ext cx="11091430" cy="5331333"/>
+        </p:xfrm>
+        <a:graphic>
+          <a:graphicData uri="http://schemas.openxmlformats.org/drawingml/2006/table">
+            <a:tbl>
+              <a:tblPr firstRow="1" bandRow="1">
+                <a:tableStyleId>{5C22544A-7EE6-4342-B048-85BDC9FD1C3A}</a:tableStyleId>
+              </a:tblPr>
+              <a:tblGrid>
+                <a:gridCol w="1584490"/>
+                <a:gridCol w="1584490"/>
+                <a:gridCol w="1584490"/>
+                <a:gridCol w="1584490"/>
+                <a:gridCol w="1584490"/>
+                <a:gridCol w="1584490"/>
+                <a:gridCol w="1584490"/>
+              </a:tblGrid>
+              <a:tr h="650006">
+                <a:tc>
+                  <a:txBody>
+                    <a:bodyPr/>
+                    <a:lstStyle/>
+                    <a:p>
+                      <a:pPr algn="ctr" fontAlgn="ctr"/>
+                      <a:r>
+                        <a:rPr lang="fr-FR" sz="1100" b="1" i="0" u="none" strike="noStrike" dirty="0">
+                          <a:solidFill>
+                            <a:srgbClr val="000000"/>
+                          </a:solidFill>
+                          <a:effectLst/>
+                          <a:latin typeface="Calibri"/>
+                        </a:rPr>
+                        <a:t>Type de risque</a:t>
+                      </a:r>
+                    </a:p>
+                  </a:txBody>
+                  <a:tcPr marL="12700" marR="12700" marT="12700" marB="0" anchor="ctr"/>
+                </a:tc>
+                <a:tc>
+                  <a:txBody>
+                    <a:bodyPr/>
+                    <a:lstStyle/>
+                    <a:p>
+                      <a:pPr algn="ctr" fontAlgn="ctr"/>
+                      <a:r>
+                        <a:rPr lang="fr-FR" sz="1100" b="1" i="0" u="none" strike="noStrike">
+                          <a:solidFill>
+                            <a:srgbClr val="000000"/>
+                          </a:solidFill>
+                          <a:effectLst/>
+                          <a:latin typeface="Calibri"/>
+                        </a:rPr>
+                        <a:t>Niveau de priorité</a:t>
+                      </a:r>
+                      <a:br>
+                        <a:rPr lang="fr-FR" sz="1100" b="1" i="0" u="none" strike="noStrike">
+                          <a:solidFill>
+                            <a:srgbClr val="000000"/>
+                          </a:solidFill>
+                          <a:effectLst/>
+                          <a:latin typeface="Calibri"/>
+                        </a:rPr>
+                      </a:br>
+                      <a:r>
+                        <a:rPr lang="fr-FR" sz="1100" b="1" i="0" u="none" strike="noStrike">
+                          <a:solidFill>
+                            <a:srgbClr val="000000"/>
+                          </a:solidFill>
+                          <a:effectLst/>
+                          <a:latin typeface="Calibri"/>
+                        </a:rPr>
+                        <a:t>(1 faible, 5 élevé)</a:t>
+                      </a:r>
+                    </a:p>
+                  </a:txBody>
+                  <a:tcPr marL="12700" marR="12700" marT="12700" marB="0" anchor="ctr"/>
+                </a:tc>
+                <a:tc>
+                  <a:txBody>
+                    <a:bodyPr/>
+                    <a:lstStyle/>
+                    <a:p>
+                      <a:pPr algn="ctr" fontAlgn="ctr"/>
+                      <a:r>
+                        <a:rPr lang="fr-FR" sz="1100" b="1" i="0" u="none" strike="noStrike">
+                          <a:solidFill>
+                            <a:srgbClr val="000000"/>
+                          </a:solidFill>
+                          <a:effectLst/>
+                          <a:latin typeface="Calibri"/>
+                        </a:rPr>
+                        <a:t>Conséquence de</a:t>
+                      </a:r>
+                      <a:br>
+                        <a:rPr lang="fr-FR" sz="1100" b="1" i="0" u="none" strike="noStrike">
+                          <a:solidFill>
+                            <a:srgbClr val="000000"/>
+                          </a:solidFill>
+                          <a:effectLst/>
+                          <a:latin typeface="Calibri"/>
+                        </a:rPr>
+                      </a:br>
+                      <a:r>
+                        <a:rPr lang="fr-FR" sz="1100" b="1" i="0" u="none" strike="noStrike">
+                          <a:solidFill>
+                            <a:srgbClr val="000000"/>
+                          </a:solidFill>
+                          <a:effectLst/>
+                          <a:latin typeface="Calibri"/>
+                        </a:rPr>
+                        <a:t> l'occurrence du risque</a:t>
+                      </a:r>
+                    </a:p>
+                  </a:txBody>
+                  <a:tcPr marL="12700" marR="12700" marT="12700" marB="0" anchor="ctr"/>
+                </a:tc>
+                <a:tc>
+                  <a:txBody>
+                    <a:bodyPr/>
+                    <a:lstStyle/>
+                    <a:p>
+                      <a:pPr algn="ctr" fontAlgn="ctr"/>
+                      <a:r>
+                        <a:rPr lang="fr-FR" sz="1100" b="1" i="0" u="none" strike="noStrike">
+                          <a:solidFill>
+                            <a:srgbClr val="000000"/>
+                          </a:solidFill>
+                          <a:effectLst/>
+                          <a:latin typeface="Calibri"/>
+                        </a:rPr>
+                        <a:t>Coût en performance</a:t>
+                      </a:r>
+                      <a:br>
+                        <a:rPr lang="fr-FR" sz="1100" b="1" i="0" u="none" strike="noStrike">
+                          <a:solidFill>
+                            <a:srgbClr val="000000"/>
+                          </a:solidFill>
+                          <a:effectLst/>
+                          <a:latin typeface="Calibri"/>
+                        </a:rPr>
+                      </a:br>
+                      <a:r>
+                        <a:rPr lang="fr-FR" sz="1100" b="1" i="0" u="none" strike="noStrike">
+                          <a:solidFill>
+                            <a:srgbClr val="000000"/>
+                          </a:solidFill>
+                          <a:effectLst/>
+                          <a:latin typeface="Calibri"/>
+                        </a:rPr>
+                        <a:t> associé au risque</a:t>
+                      </a:r>
+                    </a:p>
+                  </a:txBody>
+                  <a:tcPr marL="12700" marR="12700" marT="12700" marB="0" anchor="ctr"/>
+                </a:tc>
+                <a:tc>
+                  <a:txBody>
+                    <a:bodyPr/>
+                    <a:lstStyle/>
+                    <a:p>
+                      <a:pPr algn="ctr" fontAlgn="ctr"/>
+                      <a:r>
+                        <a:rPr lang="fr-FR" sz="1100" b="1" i="0" u="none" strike="noStrike">
+                          <a:solidFill>
+                            <a:srgbClr val="000000"/>
+                          </a:solidFill>
+                          <a:effectLst/>
+                          <a:latin typeface="Calibri"/>
+                        </a:rPr>
+                        <a:t>Probabilité d'occurrence</a:t>
+                      </a:r>
+                    </a:p>
+                  </a:txBody>
+                  <a:tcPr marL="12700" marR="12700" marT="12700" marB="0" anchor="ctr"/>
+                </a:tc>
+                <a:tc>
+                  <a:txBody>
+                    <a:bodyPr/>
+                    <a:lstStyle/>
+                    <a:p>
+                      <a:pPr algn="ctr" fontAlgn="ctr"/>
+                      <a:r>
+                        <a:rPr lang="fr-FR" sz="1100" b="1" i="0" u="none" strike="noStrike">
+                          <a:solidFill>
+                            <a:srgbClr val="000000"/>
+                          </a:solidFill>
+                          <a:effectLst/>
+                          <a:latin typeface="Calibri"/>
+                        </a:rPr>
+                        <a:t>Plan de réduction</a:t>
+                      </a:r>
+                      <a:br>
+                        <a:rPr lang="fr-FR" sz="1100" b="1" i="0" u="none" strike="noStrike">
+                          <a:solidFill>
+                            <a:srgbClr val="000000"/>
+                          </a:solidFill>
+                          <a:effectLst/>
+                          <a:latin typeface="Calibri"/>
+                        </a:rPr>
+                      </a:br>
+                      <a:r>
+                        <a:rPr lang="fr-FR" sz="1100" b="1" i="0" u="none" strike="noStrike">
+                          <a:solidFill>
+                            <a:srgbClr val="000000"/>
+                          </a:solidFill>
+                          <a:effectLst/>
+                          <a:latin typeface="Calibri"/>
+                        </a:rPr>
+                        <a:t> du risque</a:t>
+                      </a:r>
+                    </a:p>
+                  </a:txBody>
+                  <a:tcPr marL="12700" marR="12700" marT="12700" marB="0" anchor="ctr"/>
+                </a:tc>
+                <a:tc>
+                  <a:txBody>
+                    <a:bodyPr/>
+                    <a:lstStyle/>
+                    <a:p>
+                      <a:pPr algn="ctr" fontAlgn="ctr"/>
+                      <a:r>
+                        <a:rPr lang="fr-FR" sz="1100" b="1" i="0" u="none" strike="noStrike" dirty="0">
+                          <a:solidFill>
+                            <a:srgbClr val="000000"/>
+                          </a:solidFill>
+                          <a:effectLst/>
+                          <a:latin typeface="Calibri"/>
+                        </a:rPr>
+                        <a:t>Responsable du risque</a:t>
+                      </a:r>
+                    </a:p>
+                  </a:txBody>
+                  <a:tcPr marL="12700" marR="12700" marT="12700" marB="0" anchor="ctr"/>
+                </a:tc>
+              </a:tr>
+              <a:tr h="1917999">
+                <a:tc>
+                  <a:txBody>
+                    <a:bodyPr/>
+                    <a:lstStyle/>
+                    <a:p>
+                      <a:pPr algn="ctr" fontAlgn="ctr"/>
+                      <a:r>
+                        <a:rPr lang="fr-FR" sz="1100" b="0" i="0" u="none" strike="noStrike" dirty="0" err="1">
+                          <a:solidFill>
+                            <a:srgbClr val="000000"/>
+                          </a:solidFill>
+                          <a:effectLst/>
+                          <a:latin typeface="Calibri"/>
+                        </a:rPr>
+                        <a:t>Disconcordance</a:t>
+                      </a:r>
+                      <a:r>
+                        <a:rPr lang="fr-FR" sz="1100" b="0" i="0" u="none" strike="noStrike" dirty="0">
+                          <a:solidFill>
+                            <a:srgbClr val="000000"/>
+                          </a:solidFill>
+                          <a:effectLst/>
+                          <a:latin typeface="Calibri"/>
+                        </a:rPr>
+                        <a:t> dans les versions de PSIM </a:t>
+                      </a:r>
+                    </a:p>
+                  </a:txBody>
+                  <a:tcPr marL="12700" marR="12700" marT="12700" marB="0" anchor="ctr"/>
+                </a:tc>
+                <a:tc>
+                  <a:txBody>
+                    <a:bodyPr/>
+                    <a:lstStyle/>
+                    <a:p>
+                      <a:pPr algn="ctr" fontAlgn="ctr"/>
+                      <a:r>
+                        <a:rPr lang="en-US" sz="1100" b="0" i="0" u="none" strike="noStrike">
+                          <a:solidFill>
+                            <a:srgbClr val="000000"/>
+                          </a:solidFill>
+                          <a:effectLst/>
+                          <a:latin typeface="Calibri"/>
+                        </a:rPr>
+                        <a:t>3</a:t>
+                      </a:r>
+                    </a:p>
+                  </a:txBody>
+                  <a:tcPr marL="12700" marR="12700" marT="12700" marB="0" anchor="ctr"/>
+                </a:tc>
+                <a:tc>
+                  <a:txBody>
+                    <a:bodyPr/>
+                    <a:lstStyle/>
+                    <a:p>
+                      <a:pPr algn="ctr" fontAlgn="ctr"/>
+                      <a:r>
+                        <a:rPr lang="fr-FR" sz="1100" b="0" i="0" u="none" strike="noStrike">
+                          <a:solidFill>
+                            <a:srgbClr val="000000"/>
+                          </a:solidFill>
+                          <a:effectLst/>
+                          <a:latin typeface="Calibri"/>
+                        </a:rPr>
+                        <a:t>Certaines fonctionnalités du simulateur implanté sur PSIM pourraient être différentes selon la version employée.</a:t>
+                      </a:r>
+                      <a:br>
+                        <a:rPr lang="fr-FR" sz="1100" b="0" i="0" u="none" strike="noStrike">
+                          <a:solidFill>
+                            <a:srgbClr val="000000"/>
+                          </a:solidFill>
+                          <a:effectLst/>
+                          <a:latin typeface="Calibri"/>
+                        </a:rPr>
+                      </a:br>
+                      <a:endParaRPr lang="fr-FR" sz="1100" b="0" i="0" u="none" strike="noStrike">
+                        <a:solidFill>
+                          <a:srgbClr val="000000"/>
+                        </a:solidFill>
+                        <a:effectLst/>
+                        <a:latin typeface="Calibri"/>
+                      </a:endParaRPr>
+                    </a:p>
+                  </a:txBody>
+                  <a:tcPr marL="12700" marR="12700" marT="12700" marB="0" anchor="ctr"/>
+                </a:tc>
+                <a:tc>
+                  <a:txBody>
+                    <a:bodyPr/>
+                    <a:lstStyle/>
+                    <a:p>
+                      <a:pPr algn="ctr" fontAlgn="ctr"/>
+                      <a:r>
+                        <a:rPr lang="fr-FR" sz="1100" b="0" i="0" u="none" strike="noStrike">
+                          <a:solidFill>
+                            <a:srgbClr val="000000"/>
+                          </a:solidFill>
+                          <a:effectLst/>
+                          <a:latin typeface="Calibri"/>
+                        </a:rPr>
+                        <a:t>Différence dans les résultats produits à partir du simulateur implanté sur PSIM, il se peut que les résultats ne concordent plus avec les autres simulateurs</a:t>
+                      </a:r>
+                    </a:p>
+                  </a:txBody>
+                  <a:tcPr marL="12700" marR="12700" marT="12700" marB="0" anchor="ctr"/>
+                </a:tc>
+                <a:tc>
+                  <a:txBody>
+                    <a:bodyPr/>
+                    <a:lstStyle/>
+                    <a:p>
+                      <a:pPr algn="ctr" fontAlgn="ctr"/>
+                      <a:r>
+                        <a:rPr lang="en-US" sz="1100" b="0" i="0" u="none" strike="noStrike">
+                          <a:solidFill>
+                            <a:srgbClr val="000000"/>
+                          </a:solidFill>
+                          <a:effectLst/>
+                          <a:latin typeface="Calibri"/>
+                        </a:rPr>
+                        <a:t>10%</a:t>
+                      </a:r>
+                    </a:p>
+                  </a:txBody>
+                  <a:tcPr marL="12700" marR="12700" marT="12700" marB="0" anchor="ctr"/>
+                </a:tc>
+                <a:tc>
+                  <a:txBody>
+                    <a:bodyPr/>
+                    <a:lstStyle/>
+                    <a:p>
+                      <a:pPr algn="ctr" fontAlgn="ctr"/>
+                      <a:r>
+                        <a:rPr lang="fr-FR" sz="1100" b="0" i="0" u="none" strike="noStrike">
+                          <a:solidFill>
+                            <a:srgbClr val="000000"/>
+                          </a:solidFill>
+                          <a:effectLst/>
+                          <a:latin typeface="Calibri"/>
+                        </a:rPr>
+                        <a:t>Tester le simulateur sur le plus de versions différentes de PSIM</a:t>
+                      </a:r>
+                    </a:p>
+                  </a:txBody>
+                  <a:tcPr marL="12700" marR="12700" marT="12700" marB="0" anchor="ctr"/>
+                </a:tc>
+                <a:tc>
+                  <a:txBody>
+                    <a:bodyPr/>
+                    <a:lstStyle/>
+                    <a:p>
+                      <a:pPr algn="ctr" fontAlgn="ctr"/>
+                      <a:r>
+                        <a:rPr lang="fi-FI" sz="1100" b="0" i="0" u="none" strike="noStrike">
+                          <a:solidFill>
+                            <a:srgbClr val="000000"/>
+                          </a:solidFill>
+                          <a:effectLst/>
+                          <a:latin typeface="Calibri"/>
+                        </a:rPr>
+                        <a:t>Gabriel Boivin</a:t>
+                      </a:r>
+                    </a:p>
+                  </a:txBody>
+                  <a:tcPr marL="12700" marR="12700" marT="12700" marB="0" anchor="ctr"/>
+                </a:tc>
+              </a:tr>
+              <a:tr h="2763328">
+                <a:tc>
+                  <a:txBody>
+                    <a:bodyPr/>
+                    <a:lstStyle/>
+                    <a:p>
+                      <a:pPr algn="ctr" fontAlgn="ctr"/>
+                      <a:r>
+                        <a:rPr lang="fr-FR" sz="1100" b="0" i="0" u="none" strike="noStrike">
+                          <a:solidFill>
+                            <a:srgbClr val="000000"/>
+                          </a:solidFill>
+                          <a:effectLst/>
+                          <a:latin typeface="Calibri"/>
+                        </a:rPr>
+                        <a:t>Utilisation </a:t>
+                      </a:r>
+                      <a:br>
+                        <a:rPr lang="fr-FR" sz="1100" b="0" i="0" u="none" strike="noStrike">
+                          <a:solidFill>
+                            <a:srgbClr val="000000"/>
+                          </a:solidFill>
+                          <a:effectLst/>
+                          <a:latin typeface="Calibri"/>
+                        </a:rPr>
+                      </a:br>
+                      <a:r>
+                        <a:rPr lang="fr-FR" sz="1100" b="0" i="0" u="none" strike="noStrike">
+                          <a:solidFill>
+                            <a:srgbClr val="000000"/>
+                          </a:solidFill>
+                          <a:effectLst/>
+                          <a:latin typeface="Calibri"/>
+                        </a:rPr>
+                        <a:t>entrainant une modification non désirée sur les simulateurs</a:t>
+                      </a:r>
+                    </a:p>
+                  </a:txBody>
+                  <a:tcPr marL="12700" marR="12700" marT="12700" marB="0" anchor="ctr"/>
+                </a:tc>
+                <a:tc>
+                  <a:txBody>
+                    <a:bodyPr/>
+                    <a:lstStyle/>
+                    <a:p>
+                      <a:pPr algn="ctr" fontAlgn="ctr"/>
+                      <a:r>
+                        <a:rPr lang="en-US" sz="1100" b="0" i="0" u="none" strike="noStrike">
+                          <a:solidFill>
+                            <a:srgbClr val="000000"/>
+                          </a:solidFill>
+                          <a:effectLst/>
+                          <a:latin typeface="Calibri"/>
+                        </a:rPr>
+                        <a:t>3</a:t>
+                      </a:r>
+                    </a:p>
+                  </a:txBody>
+                  <a:tcPr marL="12700" marR="12700" marT="12700" marB="0" anchor="ctr"/>
+                </a:tc>
+                <a:tc>
+                  <a:txBody>
+                    <a:bodyPr/>
+                    <a:lstStyle/>
+                    <a:p>
+                      <a:pPr algn="ctr" fontAlgn="ctr"/>
+                      <a:r>
+                        <a:rPr lang="fr-FR" sz="1100" b="0" i="0" u="none" strike="noStrike">
+                          <a:solidFill>
+                            <a:srgbClr val="000000"/>
+                          </a:solidFill>
+                          <a:effectLst/>
+                          <a:latin typeface="Calibri"/>
+                        </a:rPr>
+                        <a:t>Les simulations</a:t>
+                      </a:r>
+                      <a:br>
+                        <a:rPr lang="fr-FR" sz="1100" b="0" i="0" u="none" strike="noStrike">
+                          <a:solidFill>
+                            <a:srgbClr val="000000"/>
+                          </a:solidFill>
+                          <a:effectLst/>
+                          <a:latin typeface="Calibri"/>
+                        </a:rPr>
+                      </a:br>
+                      <a:r>
+                        <a:rPr lang="fr-FR" sz="1100" b="0" i="0" u="none" strike="noStrike">
+                          <a:solidFill>
+                            <a:srgbClr val="000000"/>
+                          </a:solidFill>
+                          <a:effectLst/>
+                          <a:latin typeface="Calibri"/>
+                        </a:rPr>
+                        <a:t>ne fonctionnent plus correctement </a:t>
+                      </a:r>
+                    </a:p>
+                  </a:txBody>
+                  <a:tcPr marL="12700" marR="12700" marT="12700" marB="0" anchor="ctr"/>
+                </a:tc>
+                <a:tc>
+                  <a:txBody>
+                    <a:bodyPr/>
+                    <a:lstStyle/>
+                    <a:p>
+                      <a:pPr algn="ctr" fontAlgn="ctr"/>
+                      <a:r>
+                        <a:rPr lang="fr-FR" sz="1100" b="0" i="0" u="none" strike="noStrike">
+                          <a:solidFill>
+                            <a:srgbClr val="000000"/>
+                          </a:solidFill>
+                          <a:effectLst/>
+                          <a:latin typeface="Calibri"/>
+                        </a:rPr>
+                        <a:t>Le simulateur ne s'amorçe plus correctement, les affichages ne sont plus fonctionnels, les données ne concordent plus</a:t>
+                      </a:r>
+                    </a:p>
+                  </a:txBody>
+                  <a:tcPr marL="12700" marR="12700" marT="12700" marB="0" anchor="ctr"/>
+                </a:tc>
+                <a:tc>
+                  <a:txBody>
+                    <a:bodyPr/>
+                    <a:lstStyle/>
+                    <a:p>
+                      <a:pPr algn="ctr" fontAlgn="ctr"/>
+                      <a:r>
+                        <a:rPr lang="en-US" sz="1100" b="0" i="0" u="none" strike="noStrike">
+                          <a:solidFill>
+                            <a:srgbClr val="000000"/>
+                          </a:solidFill>
+                          <a:effectLst/>
+                          <a:latin typeface="Calibri"/>
+                        </a:rPr>
+                        <a:t>20%</a:t>
+                      </a:r>
+                    </a:p>
+                  </a:txBody>
+                  <a:tcPr marL="12700" marR="12700" marT="12700" marB="0" anchor="ctr"/>
+                </a:tc>
+                <a:tc>
+                  <a:txBody>
+                    <a:bodyPr/>
+                    <a:lstStyle/>
+                    <a:p>
+                      <a:pPr algn="ctr" fontAlgn="ctr"/>
+                      <a:r>
+                        <a:rPr lang="fr-FR" sz="1100" b="0" i="0" u="none" strike="noStrike">
+                          <a:solidFill>
+                            <a:srgbClr val="000000"/>
+                          </a:solidFill>
+                          <a:effectLst/>
+                          <a:latin typeface="Calibri"/>
+                        </a:rPr>
+                        <a:t>Toujours garder plusieurs copies de la simulation à différentes étapes du projet et limiter l'utilisateur dans les manipulations potentiellement néfastes pour le fonctionnement du simulateur (avertissements dans la documentation)</a:t>
+                      </a:r>
+                    </a:p>
+                  </a:txBody>
+                  <a:tcPr marL="12700" marR="12700" marT="12700" marB="0" anchor="ctr"/>
+                </a:tc>
+                <a:tc>
+                  <a:txBody>
+                    <a:bodyPr/>
+                    <a:lstStyle/>
+                    <a:p>
+                      <a:pPr algn="ctr" fontAlgn="ctr"/>
+                      <a:r>
+                        <a:rPr lang="en-US" sz="1100" b="0" i="0" u="none" strike="noStrike" dirty="0">
+                          <a:solidFill>
+                            <a:srgbClr val="000000"/>
+                          </a:solidFill>
+                          <a:effectLst/>
+                          <a:latin typeface="Calibri"/>
+                        </a:rPr>
+                        <a:t>Daniel Thibodeau</a:t>
+                      </a:r>
+                    </a:p>
+                  </a:txBody>
+                  <a:tcPr marL="12700" marR="12700" marT="12700" marB="0" anchor="ctr"/>
+                </a:tc>
+              </a:tr>
+            </a:tbl>
+          </a:graphicData>
+        </a:graphic>
+      </p:graphicFrame>
+    </p:spTree>
+    <p:extLst>
+      <p:ext uri="{BB962C8B-B14F-4D97-AF65-F5344CB8AC3E}">
+        <p14:creationId xmlns:p14="http://schemas.microsoft.com/office/powerpoint/2010/main" val="1136454317"/>
       </p:ext>
     </p:extLst>
   </p:cSld>
@@ -8265,7 +11210,7 @@
   <a:extraClrSchemeLst/>
   <a:extLst>
     <a:ext uri="{05A4C25C-085E-4340-85A3-A5531E510DB2}">
-      <thm15:themeFamily xmlns="" xmlns:thm15="http://schemas.microsoft.com/office/thememl/2012/main" name="Facet" id="{C0C680CD-088A-49FC-A102-D699147F32B2}" vid="{CFBC31BA-B70F-4F30-BCAA-4F3011E16C4D}"/>
+      <thm15:themeFamily xmlns:thm15="http://schemas.microsoft.com/office/thememl/2012/main" xmlns="" name="Facet" id="{C0C680CD-088A-49FC-A102-D699147F32B2}" vid="{CFBC31BA-B70F-4F30-BCAA-4F3011E16C4D}"/>
     </a:ext>
   </a:extLst>
 </a:theme>

</xml_diff>

<commit_message>
Simulation et revue de l'art
J'ai pas réussie à faire fonctionner la simulation à un bras à cause de
la commande plus compliqué que je m'attendais. J'ia plutôt rajouter au
schéma levelnpc la commande pour triphasé se qui fonctionne plus ou
moins.
</commit_message>
<xml_diff>
--- a/Remise/Remise 1/Presentation_Remise_1.pptx
+++ b/Remise/Remise 1/Presentation_Remise_1.pptx
@@ -847,7 +847,7 @@
           <a:p>
             <a:fld id="{5C8908A9-1E53-4D85-A76B-A28D8BCB5503}" type="datetimeFigureOut">
               <a:rPr lang="en-US" smtClean="0"/>
-              <a:t>1/24/2014</a:t>
+              <a:t>1/25/2014</a:t>
             </a:fld>
             <a:endParaRPr lang="en-US"/>
           </a:p>
@@ -889,7 +889,7 @@
           <a:p>
             <a:fld id="{83CAF439-82BC-4083-ACA7-1FC901220AC7}" type="slidenum">
               <a:rPr lang="en-US" smtClean="0"/>
-              <a:t>‹#›</a:t>
+              <a:t>‹N°›</a:t>
             </a:fld>
             <a:endParaRPr lang="en-US"/>
           </a:p>
@@ -1110,7 +1110,7 @@
           <a:p>
             <a:fld id="{5C8908A9-1E53-4D85-A76B-A28D8BCB5503}" type="datetimeFigureOut">
               <a:rPr lang="en-US" smtClean="0"/>
-              <a:t>1/24/2014</a:t>
+              <a:t>1/25/2014</a:t>
             </a:fld>
             <a:endParaRPr lang="en-US"/>
           </a:p>
@@ -1152,7 +1152,7 @@
           <a:p>
             <a:fld id="{83CAF439-82BC-4083-ACA7-1FC901220AC7}" type="slidenum">
               <a:rPr lang="en-US" smtClean="0"/>
-              <a:t>‹#›</a:t>
+              <a:t>‹N°›</a:t>
             </a:fld>
             <a:endParaRPr lang="en-US"/>
           </a:p>
@@ -1361,7 +1361,7 @@
           <a:p>
             <a:fld id="{5C8908A9-1E53-4D85-A76B-A28D8BCB5503}" type="datetimeFigureOut">
               <a:rPr lang="en-US" smtClean="0"/>
-              <a:t>1/24/2014</a:t>
+              <a:t>1/25/2014</a:t>
             </a:fld>
             <a:endParaRPr lang="en-US"/>
           </a:p>
@@ -1403,7 +1403,7 @@
           <a:p>
             <a:fld id="{83CAF439-82BC-4083-ACA7-1FC901220AC7}" type="slidenum">
               <a:rPr lang="en-US" smtClean="0"/>
-              <a:t>‹#›</a:t>
+              <a:t>‹N°›</a:t>
             </a:fld>
             <a:endParaRPr lang="en-US"/>
           </a:p>
@@ -1675,7 +1675,7 @@
           <a:p>
             <a:fld id="{5C8908A9-1E53-4D85-A76B-A28D8BCB5503}" type="datetimeFigureOut">
               <a:rPr lang="en-US" smtClean="0"/>
-              <a:t>1/24/2014</a:t>
+              <a:t>1/25/2014</a:t>
             </a:fld>
             <a:endParaRPr lang="en-US"/>
           </a:p>
@@ -1717,7 +1717,7 @@
           <a:p>
             <a:fld id="{83CAF439-82BC-4083-ACA7-1FC901220AC7}" type="slidenum">
               <a:rPr lang="en-US" smtClean="0"/>
-              <a:t>‹#›</a:t>
+              <a:t>‹N°›</a:t>
             </a:fld>
             <a:endParaRPr lang="en-US"/>
           </a:p>
@@ -2016,7 +2016,7 @@
           <a:p>
             <a:fld id="{5C8908A9-1E53-4D85-A76B-A28D8BCB5503}" type="datetimeFigureOut">
               <a:rPr lang="en-US" smtClean="0"/>
-              <a:t>1/24/2014</a:t>
+              <a:t>1/25/2014</a:t>
             </a:fld>
             <a:endParaRPr lang="en-US"/>
           </a:p>
@@ -2058,7 +2058,7 @@
           <a:p>
             <a:fld id="{83CAF439-82BC-4083-ACA7-1FC901220AC7}" type="slidenum">
               <a:rPr lang="en-US" smtClean="0"/>
-              <a:t>‹#›</a:t>
+              <a:t>‹N°›</a:t>
             </a:fld>
             <a:endParaRPr lang="en-US"/>
           </a:p>
@@ -2330,7 +2330,7 @@
           <a:p>
             <a:fld id="{5C8908A9-1E53-4D85-A76B-A28D8BCB5503}" type="datetimeFigureOut">
               <a:rPr lang="en-US" smtClean="0"/>
-              <a:t>1/24/2014</a:t>
+              <a:t>1/25/2014</a:t>
             </a:fld>
             <a:endParaRPr lang="en-US"/>
           </a:p>
@@ -2372,7 +2372,7 @@
           <a:p>
             <a:fld id="{83CAF439-82BC-4083-ACA7-1FC901220AC7}" type="slidenum">
               <a:rPr lang="en-US" smtClean="0"/>
-              <a:t>‹#›</a:t>
+              <a:t>‹N°›</a:t>
             </a:fld>
             <a:endParaRPr lang="en-US"/>
           </a:p>
@@ -2723,7 +2723,7 @@
           <a:p>
             <a:fld id="{5C8908A9-1E53-4D85-A76B-A28D8BCB5503}" type="datetimeFigureOut">
               <a:rPr lang="en-US" smtClean="0"/>
-              <a:t>1/24/2014</a:t>
+              <a:t>1/25/2014</a:t>
             </a:fld>
             <a:endParaRPr lang="en-US"/>
           </a:p>
@@ -2765,7 +2765,7 @@
           <a:p>
             <a:fld id="{83CAF439-82BC-4083-ACA7-1FC901220AC7}" type="slidenum">
               <a:rPr lang="en-US" smtClean="0"/>
-              <a:t>‹#›</a:t>
+              <a:t>‹N°›</a:t>
             </a:fld>
             <a:endParaRPr lang="en-US"/>
           </a:p>
@@ -2893,7 +2893,7 @@
           <a:p>
             <a:fld id="{5C8908A9-1E53-4D85-A76B-A28D8BCB5503}" type="datetimeFigureOut">
               <a:rPr lang="en-US" smtClean="0"/>
-              <a:t>1/24/2014</a:t>
+              <a:t>1/25/2014</a:t>
             </a:fld>
             <a:endParaRPr lang="en-US"/>
           </a:p>
@@ -2935,7 +2935,7 @@
           <a:p>
             <a:fld id="{83CAF439-82BC-4083-ACA7-1FC901220AC7}" type="slidenum">
               <a:rPr lang="en-US" smtClean="0"/>
-              <a:t>‹#›</a:t>
+              <a:t>‹N°›</a:t>
             </a:fld>
             <a:endParaRPr lang="en-US"/>
           </a:p>
@@ -3073,7 +3073,7 @@
           <a:p>
             <a:fld id="{5C8908A9-1E53-4D85-A76B-A28D8BCB5503}" type="datetimeFigureOut">
               <a:rPr lang="en-US" smtClean="0"/>
-              <a:t>1/24/2014</a:t>
+              <a:t>1/25/2014</a:t>
             </a:fld>
             <a:endParaRPr lang="en-US"/>
           </a:p>
@@ -3115,7 +3115,7 @@
           <a:p>
             <a:fld id="{83CAF439-82BC-4083-ACA7-1FC901220AC7}" type="slidenum">
               <a:rPr lang="en-US" smtClean="0"/>
-              <a:t>‹#›</a:t>
+              <a:t>‹N°›</a:t>
             </a:fld>
             <a:endParaRPr lang="en-US"/>
           </a:p>
@@ -3249,7 +3249,7 @@
           <a:p>
             <a:fld id="{5C8908A9-1E53-4D85-A76B-A28D8BCB5503}" type="datetimeFigureOut">
               <a:rPr lang="en-US" smtClean="0"/>
-              <a:t>1/24/2014</a:t>
+              <a:t>1/25/2014</a:t>
             </a:fld>
             <a:endParaRPr lang="en-US"/>
           </a:p>
@@ -3291,7 +3291,7 @@
           <a:p>
             <a:fld id="{83CAF439-82BC-4083-ACA7-1FC901220AC7}" type="slidenum">
               <a:rPr lang="en-US" smtClean="0"/>
-              <a:t>‹#›</a:t>
+              <a:t>‹N°›</a:t>
             </a:fld>
             <a:endParaRPr lang="en-US"/>
           </a:p>
@@ -3496,7 +3496,7 @@
           <a:p>
             <a:fld id="{5C8908A9-1E53-4D85-A76B-A28D8BCB5503}" type="datetimeFigureOut">
               <a:rPr lang="en-US" smtClean="0"/>
-              <a:t>1/24/2014</a:t>
+              <a:t>1/25/2014</a:t>
             </a:fld>
             <a:endParaRPr lang="en-US"/>
           </a:p>
@@ -3538,7 +3538,7 @@
           <a:p>
             <a:fld id="{83CAF439-82BC-4083-ACA7-1FC901220AC7}" type="slidenum">
               <a:rPr lang="en-US" smtClean="0"/>
-              <a:t>‹#›</a:t>
+              <a:t>‹N°›</a:t>
             </a:fld>
             <a:endParaRPr lang="en-US"/>
           </a:p>
@@ -3728,7 +3728,7 @@
           <a:p>
             <a:fld id="{5C8908A9-1E53-4D85-A76B-A28D8BCB5503}" type="datetimeFigureOut">
               <a:rPr lang="en-US" smtClean="0"/>
-              <a:t>1/24/2014</a:t>
+              <a:t>1/25/2014</a:t>
             </a:fld>
             <a:endParaRPr lang="en-US"/>
           </a:p>
@@ -3770,7 +3770,7 @@
           <a:p>
             <a:fld id="{83CAF439-82BC-4083-ACA7-1FC901220AC7}" type="slidenum">
               <a:rPr lang="en-US" smtClean="0"/>
-              <a:t>‹#›</a:t>
+              <a:t>‹N°›</a:t>
             </a:fld>
             <a:endParaRPr lang="en-US"/>
           </a:p>
@@ -4102,7 +4102,7 @@
           <a:p>
             <a:fld id="{5C8908A9-1E53-4D85-A76B-A28D8BCB5503}" type="datetimeFigureOut">
               <a:rPr lang="en-US" smtClean="0"/>
-              <a:t>1/24/2014</a:t>
+              <a:t>1/25/2014</a:t>
             </a:fld>
             <a:endParaRPr lang="en-US"/>
           </a:p>
@@ -4144,7 +4144,7 @@
           <a:p>
             <a:fld id="{83CAF439-82BC-4083-ACA7-1FC901220AC7}" type="slidenum">
               <a:rPr lang="en-US" smtClean="0"/>
-              <a:t>‹#›</a:t>
+              <a:t>‹N°›</a:t>
             </a:fld>
             <a:endParaRPr lang="en-US"/>
           </a:p>
@@ -4225,7 +4225,7 @@
           <a:p>
             <a:fld id="{5C8908A9-1E53-4D85-A76B-A28D8BCB5503}" type="datetimeFigureOut">
               <a:rPr lang="en-US" smtClean="0"/>
-              <a:t>1/24/2014</a:t>
+              <a:t>1/25/2014</a:t>
             </a:fld>
             <a:endParaRPr lang="en-US"/>
           </a:p>
@@ -4267,7 +4267,7 @@
           <a:p>
             <a:fld id="{83CAF439-82BC-4083-ACA7-1FC901220AC7}" type="slidenum">
               <a:rPr lang="en-US" smtClean="0"/>
-              <a:t>‹#›</a:t>
+              <a:t>‹N°›</a:t>
             </a:fld>
             <a:endParaRPr lang="en-US"/>
           </a:p>
@@ -4320,7 +4320,7 @@
           <a:p>
             <a:fld id="{5C8908A9-1E53-4D85-A76B-A28D8BCB5503}" type="datetimeFigureOut">
               <a:rPr lang="en-US" smtClean="0"/>
-              <a:t>1/24/2014</a:t>
+              <a:t>1/25/2014</a:t>
             </a:fld>
             <a:endParaRPr lang="en-US"/>
           </a:p>
@@ -4362,7 +4362,7 @@
           <a:p>
             <a:fld id="{83CAF439-82BC-4083-ACA7-1FC901220AC7}" type="slidenum">
               <a:rPr lang="en-US" smtClean="0"/>
-              <a:t>‹#›</a:t>
+              <a:t>‹N°›</a:t>
             </a:fld>
             <a:endParaRPr lang="en-US"/>
           </a:p>
@@ -4420,7 +4420,7 @@
           <a:p>
             <a:fld id="{5C8908A9-1E53-4D85-A76B-A28D8BCB5503}" type="datetimeFigureOut">
               <a:rPr lang="en-US" smtClean="0"/>
-              <a:t>1/24/2014</a:t>
+              <a:t>1/25/2014</a:t>
             </a:fld>
             <a:endParaRPr lang="en-US" dirty="0"/>
           </a:p>
@@ -4472,7 +4472,7 @@
           <a:p>
             <a:fld id="{83CAF439-82BC-4083-ACA7-1FC901220AC7}" type="slidenum">
               <a:rPr lang="en-US" smtClean="0"/>
-              <a:t>‹#›</a:t>
+              <a:t>‹N°›</a:t>
             </a:fld>
             <a:endParaRPr lang="en-US"/>
           </a:p>
@@ -5215,7 +5215,7 @@
           <a:p>
             <a:fld id="{5C8908A9-1E53-4D85-A76B-A28D8BCB5503}" type="datetimeFigureOut">
               <a:rPr lang="en-US" smtClean="0"/>
-              <a:t>1/24/2014</a:t>
+              <a:t>1/25/2014</a:t>
             </a:fld>
             <a:endParaRPr lang="en-US"/>
           </a:p>
@@ -5257,7 +5257,7 @@
           <a:p>
             <a:fld id="{83CAF439-82BC-4083-ACA7-1FC901220AC7}" type="slidenum">
               <a:rPr lang="en-US" smtClean="0"/>
-              <a:t>‹#›</a:t>
+              <a:t>‹N°›</a:t>
             </a:fld>
             <a:endParaRPr lang="en-US"/>
           </a:p>
@@ -5977,7 +5977,7 @@
           <a:p>
             <a:fld id="{5C8908A9-1E53-4D85-A76B-A28D8BCB5503}" type="datetimeFigureOut">
               <a:rPr lang="en-US" smtClean="0"/>
-              <a:t>1/24/2014</a:t>
+              <a:t>1/25/2014</a:t>
             </a:fld>
             <a:endParaRPr lang="en-US"/>
           </a:p>
@@ -6053,7 +6053,7 @@
           <a:p>
             <a:fld id="{83CAF439-82BC-4083-ACA7-1FC901220AC7}" type="slidenum">
               <a:rPr lang="en-US" smtClean="0"/>
-              <a:t>‹#›</a:t>
+              <a:t>‹N°›</a:t>
             </a:fld>
             <a:endParaRPr lang="en-US"/>
           </a:p>
@@ -6576,7 +6576,7 @@
   <p:timing>
     <p:tnLst>
       <p:par>
-        <p:cTn xmlns:p14="http://schemas.microsoft.com/office/powerpoint/2010/main" id="1" dur="indefinite" restart="never" nodeType="tmRoot"/>
+        <p:cTn id="1" dur="indefinite" restart="never" nodeType="tmRoot"/>
       </p:par>
     </p:tnLst>
   </p:timing>
@@ -6657,18 +6657,92 @@
             <a:pPr marL="0" indent="0">
               <a:buNone/>
             </a:pPr>
-            <a:r>
-              <a:rPr lang="en-US" sz="2800" dirty="0" smtClean="0"/>
-              <a:t>Tests </a:t>
-            </a:r>
-            <a:r>
-              <a:rPr lang="en-US" sz="2800" dirty="0" err="1" smtClean="0"/>
-              <a:t>préliminaires</a:t>
-            </a:r>
             <a:endParaRPr lang="en-US" sz="2800" dirty="0"/>
           </a:p>
         </p:txBody>
       </p:sp>
+      <p:pic>
+        <p:nvPicPr>
+          <p:cNvPr id="2050" name="Picture 2" descr="D:\LiberT\Desktop\simu.png"/>
+          <p:cNvPicPr>
+            <a:picLocks noChangeAspect="1" noChangeArrowheads="1"/>
+          </p:cNvPicPr>
+          <p:nvPr/>
+        </p:nvPicPr>
+        <p:blipFill>
+          <a:blip r:embed="rId2">
+            <a:extLst>
+              <a:ext uri="{28A0092B-C50C-407E-A947-70E740481C1C}">
+                <a14:useLocalDpi xmlns:a14="http://schemas.microsoft.com/office/drawing/2010/main" val="0"/>
+              </a:ext>
+            </a:extLst>
+          </a:blip>
+          <a:srcRect/>
+          <a:stretch>
+            <a:fillRect/>
+          </a:stretch>
+        </p:blipFill>
+        <p:spPr bwMode="auto">
+          <a:xfrm>
+            <a:off x="304799" y="1473201"/>
+            <a:ext cx="6950628" cy="3589866"/>
+          </a:xfrm>
+          <a:prstGeom prst="rect">
+            <a:avLst/>
+          </a:prstGeom>
+          <a:noFill/>
+          <a:extLst>
+            <a:ext uri="{909E8E84-426E-40DD-AFC4-6F175D3DCCD1}">
+              <a14:hiddenFill xmlns:a14="http://schemas.microsoft.com/office/drawing/2010/main">
+                <a:solidFill>
+                  <a:srgbClr val="FFFFFF"/>
+                </a:solidFill>
+              </a14:hiddenFill>
+            </a:ext>
+          </a:extLst>
+        </p:spPr>
+      </p:pic>
+      <p:pic>
+        <p:nvPicPr>
+          <p:cNvPr id="2051" name="Picture 3" descr="D:\LiberT\Desktop\à la source.JPG"/>
+          <p:cNvPicPr>
+            <a:picLocks noChangeAspect="1" noChangeArrowheads="1"/>
+          </p:cNvPicPr>
+          <p:nvPr/>
+        </p:nvPicPr>
+        <p:blipFill>
+          <a:blip r:embed="rId3">
+            <a:extLst>
+              <a:ext uri="{28A0092B-C50C-407E-A947-70E740481C1C}">
+                <a14:useLocalDpi xmlns:a14="http://schemas.microsoft.com/office/drawing/2010/main" val="0"/>
+              </a:ext>
+            </a:extLst>
+          </a:blip>
+          <a:srcRect/>
+          <a:stretch>
+            <a:fillRect/>
+          </a:stretch>
+        </p:blipFill>
+        <p:spPr bwMode="auto">
+          <a:xfrm>
+            <a:off x="6129867" y="2759075"/>
+            <a:ext cx="7104062" cy="3829050"/>
+          </a:xfrm>
+          <a:prstGeom prst="rect">
+            <a:avLst/>
+          </a:prstGeom>
+          <a:noFill/>
+          <a:extLst>
+            <a:ext uri="{909E8E84-426E-40DD-AFC4-6F175D3DCCD1}">
+              <a14:hiddenFill xmlns:a14="http://schemas.microsoft.com/office/drawing/2010/main">
+                <a:solidFill>
+                  <a:srgbClr val="FFFFFF"/>
+                </a:solidFill>
+              </a14:hiddenFill>
+            </a:ext>
+          </a:extLst>
+        </p:spPr>
+      </p:pic>
     </p:spTree>
     <p:extLst>
       <p:ext uri="{BB962C8B-B14F-4D97-AF65-F5344CB8AC3E}">
@@ -6768,7 +6842,7 @@
           <p:nvPr/>
         </p:nvPicPr>
         <p:blipFill>
-          <a:blip r:embed="rId2">
+          <a:blip r:embed="rId2" cstate="print">
             <a:extLst>
               <a:ext uri="{28A0092B-C50C-407E-A947-70E740481C1C}">
                 <a14:useLocalDpi xmlns:a14="http://schemas.microsoft.com/office/drawing/2010/main" val="0"/>
@@ -6831,7 +6905,9 @@
         </p:nvSpPr>
         <p:spPr/>
         <p:txBody>
-          <a:bodyPr/>
+          <a:bodyPr>
+            <a:normAutofit fontScale="90000"/>
+          </a:bodyPr>
           <a:lstStyle/>
           <a:p>
             <a:pPr algn="r"/>
@@ -6937,11 +7013,7 @@
             <a:pPr lvl="2"/>
             <a:r>
               <a:rPr lang="fr-FR" sz="2400" dirty="0" smtClean="0"/>
-              <a:t>Puissance cr</a:t>
-            </a:r>
-            <a:r>
-              <a:rPr lang="fr-FR" sz="2400" dirty="0" smtClean="0"/>
-              <a:t>ête (MW)</a:t>
+              <a:t>Puissance crête (MW)</a:t>
             </a:r>
           </a:p>
         </p:txBody>
@@ -6988,7 +7060,9 @@
         </p:nvSpPr>
         <p:spPr/>
         <p:txBody>
-          <a:bodyPr/>
+          <a:bodyPr>
+            <a:normAutofit fontScale="90000"/>
+          </a:bodyPr>
           <a:lstStyle/>
           <a:p>
             <a:pPr algn="r"/>
@@ -7045,11 +7119,7 @@
             <a:pPr lvl="2"/>
             <a:r>
               <a:rPr lang="fr-FR" sz="2400" dirty="0" smtClean="0"/>
-              <a:t>Effort du contr</a:t>
-            </a:r>
-            <a:r>
-              <a:rPr lang="fr-FR" sz="2400" dirty="0" smtClean="0"/>
-              <a:t>ôleur (% par seconde de la variation de la commande)</a:t>
+              <a:t>Effort du contrôleur (% par seconde de la variation de la commande)</a:t>
             </a:r>
           </a:p>
           <a:p>
@@ -7128,11 +7198,7 @@
             <a:pPr lvl="2"/>
             <a:r>
               <a:rPr lang="fr-FR" sz="2400" dirty="0" smtClean="0"/>
-              <a:t>Puissance cr</a:t>
-            </a:r>
-            <a:r>
-              <a:rPr lang="fr-FR" sz="2400" dirty="0" smtClean="0"/>
-              <a:t>ête (MW)</a:t>
+              <a:t>Puissance crête (MW)</a:t>
             </a:r>
           </a:p>
           <a:p>
@@ -7203,7 +7269,9 @@
         </p:nvSpPr>
         <p:spPr/>
         <p:txBody>
-          <a:bodyPr/>
+          <a:bodyPr>
+            <a:normAutofit fontScale="90000"/>
+          </a:bodyPr>
           <a:lstStyle/>
           <a:p>
             <a:pPr algn="r"/>
@@ -7349,7 +7417,9 @@
         </p:nvSpPr>
         <p:spPr/>
         <p:txBody>
-          <a:bodyPr/>
+          <a:bodyPr>
+            <a:normAutofit fontScale="90000"/>
+          </a:bodyPr>
           <a:lstStyle/>
           <a:p>
             <a:pPr algn="r"/>
@@ -9936,7 +10006,7 @@
   <p:timing>
     <p:tnLst>
       <p:par>
-        <p:cTn xmlns:p14="http://schemas.microsoft.com/office/powerpoint/2010/main" id="1" dur="indefinite" restart="never" nodeType="tmRoot"/>
+        <p:cTn id="1" dur="indefinite" restart="never" nodeType="tmRoot"/>
       </p:par>
     </p:tnLst>
   </p:timing>
@@ -10088,7 +10158,7 @@
   <p:timing>
     <p:tnLst>
       <p:par>
-        <p:cTn xmlns:p14="http://schemas.microsoft.com/office/powerpoint/2010/main" id="1" dur="indefinite" restart="never" nodeType="tmRoot"/>
+        <p:cTn id="1" dur="indefinite" restart="never" nodeType="tmRoot"/>
       </p:par>
     </p:tnLst>
   </p:timing>
@@ -10225,7 +10295,7 @@
   <p:timing>
     <p:tnLst>
       <p:par>
-        <p:cTn xmlns:p14="http://schemas.microsoft.com/office/powerpoint/2010/main" id="1" dur="indefinite" restart="never" nodeType="tmRoot"/>
+        <p:cTn id="1" dur="indefinite" restart="never" nodeType="tmRoot"/>
       </p:par>
     </p:tnLst>
   </p:timing>
@@ -10906,6 +10976,47 @@
           </a:p>
         </p:txBody>
       </p:sp>
+      <p:pic>
+        <p:nvPicPr>
+          <p:cNvPr id="1026" name="Picture 2" descr="D:\LiberT\Desktop\schéma.png"/>
+          <p:cNvPicPr>
+            <a:picLocks noChangeAspect="1" noChangeArrowheads="1"/>
+          </p:cNvPicPr>
+          <p:nvPr/>
+        </p:nvPicPr>
+        <p:blipFill>
+          <a:blip r:embed="rId2">
+            <a:extLst>
+              <a:ext uri="{28A0092B-C50C-407E-A947-70E740481C1C}">
+                <a14:useLocalDpi xmlns:a14="http://schemas.microsoft.com/office/drawing/2010/main" val="0"/>
+              </a:ext>
+            </a:extLst>
+          </a:blip>
+          <a:srcRect/>
+          <a:stretch>
+            <a:fillRect/>
+          </a:stretch>
+        </p:blipFill>
+        <p:spPr bwMode="auto">
+          <a:xfrm>
+            <a:off x="1574800" y="1371599"/>
+            <a:ext cx="9245600" cy="5137679"/>
+          </a:xfrm>
+          <a:prstGeom prst="rect">
+            <a:avLst/>
+          </a:prstGeom>
+          <a:noFill/>
+          <a:extLst>
+            <a:ext uri="{909E8E84-426E-40DD-AFC4-6F175D3DCCD1}">
+              <a14:hiddenFill xmlns:a14="http://schemas.microsoft.com/office/drawing/2010/main">
+                <a:solidFill>
+                  <a:srgbClr val="FFFFFF"/>
+                </a:solidFill>
+              </a14:hiddenFill>
+            </a:ext>
+          </a:extLst>
+        </p:spPr>
+      </p:pic>
       <p:sp>
         <p:nvSpPr>
           <p:cNvPr id="3" name="Content Placeholder 2"/>
@@ -10916,7 +11027,12 @@
             <p:ph idx="1"/>
           </p:nvPr>
         </p:nvSpPr>
-        <p:spPr/>
+        <p:spPr>
+          <a:xfrm>
+            <a:off x="663132" y="4233333"/>
+            <a:ext cx="3516669" cy="3264295"/>
+          </a:xfrm>
+        </p:spPr>
         <p:txBody>
           <a:bodyPr>
             <a:normAutofit/>
@@ -10927,20 +11043,12 @@
               <a:buNone/>
             </a:pPr>
             <a:r>
+              <a:rPr lang="en-US" sz="2800" dirty="0" err="1" smtClean="0"/>
+              <a:t>Schéma</a:t>
+            </a:r>
+            <a:r>
               <a:rPr lang="en-US" sz="2800" dirty="0" smtClean="0"/>
-              <a:t>Revue de </a:t>
-            </a:r>
-            <a:r>
-              <a:rPr lang="en-US" sz="2800" dirty="0" err="1" smtClean="0"/>
-              <a:t>l’état</a:t>
-            </a:r>
-            <a:r>
-              <a:rPr lang="en-US" sz="2800" dirty="0" smtClean="0"/>
-              <a:t> de </a:t>
-            </a:r>
-            <a:r>
-              <a:rPr lang="en-US" sz="2800" dirty="0" err="1" smtClean="0"/>
-              <a:t>l’art</a:t>
+              <a:t> d’un NPC à 3 Level de base</a:t>
             </a:r>
             <a:endParaRPr lang="en-US" sz="2800" dirty="0"/>
           </a:p>
@@ -11210,7 +11318,7 @@
   <a:extraClrSchemeLst/>
   <a:extLst>
     <a:ext uri="{05A4C25C-085E-4340-85A3-A5531E510DB2}">
-      <thm15:themeFamily xmlns:thm15="http://schemas.microsoft.com/office/thememl/2012/main" xmlns="" name="Facet" id="{C0C680CD-088A-49FC-A102-D699147F32B2}" vid="{CFBC31BA-B70F-4F30-BCAA-4F3011E16C4D}"/>
+      <thm15:themeFamily xmlns="" xmlns:thm15="http://schemas.microsoft.com/office/thememl/2012/main" name="Facet" id="{C0C680CD-088A-49FC-A102-D699147F32B2}" vid="{CFBC31BA-B70F-4F30-BCAA-4F3011E16C4D}"/>
     </a:ext>
   </a:extLst>
 </a:theme>

</xml_diff>

<commit_message>
Ajout des images que DAN A FLUSHER !
</commit_message>
<xml_diff>
--- a/Remise/Remise 1/Presentation_Remise_1.pptx
+++ b/Remise/Remise 1/Presentation_Remise_1.pptx
@@ -20,8 +20,8 @@
     <p:sldId id="261" r:id="rId14"/>
     <p:sldId id="262" r:id="rId15"/>
     <p:sldId id="263" r:id="rId16"/>
-    <p:sldId id="264" r:id="rId17"/>
-    <p:sldId id="265" r:id="rId18"/>
+    <p:sldId id="282" r:id="rId17"/>
+    <p:sldId id="283" r:id="rId18"/>
     <p:sldId id="266" r:id="rId19"/>
     <p:sldId id="267" r:id="rId20"/>
     <p:sldId id="271" r:id="rId21"/>
@@ -129,6 +129,22 @@
       </a:defRPr>
     </a:lvl9pPr>
   </p:defaultTextStyle>
+  <p:extLst>
+    <p:ext uri="{EFAFB233-063F-42B5-8137-9DF3F51BA10A}">
+      <p15:sldGuideLst xmlns:p15="http://schemas.microsoft.com/office/powerpoint/2012/main">
+        <p15:guide id="1" orient="horz" pos="2160">
+          <p15:clr>
+            <a:srgbClr val="A4A3A4"/>
+          </p15:clr>
+        </p15:guide>
+        <p15:guide id="2" pos="3840">
+          <p15:clr>
+            <a:srgbClr val="A4A3A4"/>
+          </p15:clr>
+        </p15:guide>
+      </p15:sldGuideLst>
+    </p:ext>
+  </p:extLst>
 </p:presentation>
 </file>
 
@@ -6583,7 +6599,7 @@
   <p:timing>
     <p:tnLst>
       <p:par>
-        <p:cTn xmlns:p14="http://schemas.microsoft.com/office/powerpoint/2010/main" id="1" dur="indefinite" restart="never" nodeType="tmRoot"/>
+        <p:cTn id="1" dur="indefinite" restart="never" nodeType="tmRoot"/>
       </p:par>
     </p:tnLst>
   </p:timing>
@@ -6741,7 +6757,7 @@
   <p:timing>
     <p:tnLst>
       <p:par>
-        <p:cTn xmlns:p14="http://schemas.microsoft.com/office/powerpoint/2010/main" id="1" dur="indefinite" restart="never" nodeType="tmRoot"/>
+        <p:cTn id="1" dur="indefinite" restart="never" nodeType="tmRoot"/>
       </p:par>
     </p:tnLst>
   </p:timing>
@@ -6878,7 +6894,7 @@
   <p:timing>
     <p:tnLst>
       <p:par>
-        <p:cTn xmlns:p14="http://schemas.microsoft.com/office/powerpoint/2010/main" id="1" dur="indefinite" restart="never" nodeType="tmRoot"/>
+        <p:cTn id="1" dur="indefinite" restart="never" nodeType="tmRoot"/>
       </p:par>
     </p:tnLst>
   </p:timing>
@@ -7540,6 +7556,9 @@
           </p:cNvSpPr>
           <p:nvPr>
             <p:ph type="title"/>
+            <p:custDataLst>
+              <p:tags r:id="rId1"/>
+            </p:custDataLst>
           </p:nvPr>
         </p:nvSpPr>
         <p:spPr/>
@@ -7559,50 +7578,189 @@
           </a:p>
         </p:txBody>
       </p:sp>
-      <p:sp>
-        <p:nvSpPr>
-          <p:cNvPr id="3" name="Content Placeholder 2"/>
-          <p:cNvSpPr>
-            <a:spLocks noGrp="1"/>
-          </p:cNvSpPr>
-          <p:nvPr>
-            <p:ph idx="1"/>
-          </p:nvPr>
-        </p:nvSpPr>
-        <p:spPr/>
-        <p:txBody>
-          <a:bodyPr>
+      <p:pic>
+        <p:nvPicPr>
+          <p:cNvPr id="1026" name="Picture 2" descr="D:\LiberT\Desktop\schéma.png"/>
+          <p:cNvPicPr>
+            <a:picLocks noChangeAspect="1" noChangeArrowheads="1"/>
+          </p:cNvPicPr>
+          <p:nvPr>
+            <p:custDataLst>
+              <p:tags r:id="rId2"/>
+            </p:custDataLst>
+          </p:nvPr>
+        </p:nvPicPr>
+        <p:blipFill>
+          <a:blip r:embed="rId5">
+            <a:extLst>
+              <a:ext uri="{28A0092B-C50C-407E-A947-70E740481C1C}">
+                <a14:useLocalDpi xmlns:a14="http://schemas.microsoft.com/office/drawing/2010/main" val="0"/>
+              </a:ext>
+            </a:extLst>
+          </a:blip>
+          <a:srcRect/>
+          <a:stretch>
+            <a:fillRect/>
+          </a:stretch>
+        </p:blipFill>
+        <p:spPr bwMode="auto">
+          <a:xfrm>
+            <a:off x="1193800" y="1930400"/>
+            <a:ext cx="9245600" cy="4720393"/>
+          </a:xfrm>
+          <a:prstGeom prst="rect">
+            <a:avLst/>
+          </a:prstGeom>
+          <a:noFill/>
+          <a:ln w="19050">
+            <a:solidFill>
+              <a:schemeClr val="accent1">
+                <a:lumMod val="60000"/>
+                <a:lumOff val="40000"/>
+              </a:schemeClr>
+            </a:solidFill>
+          </a:ln>
+          <a:extLst>
+            <a:ext uri="{909E8E84-426E-40DD-AFC4-6F175D3DCCD1}">
+              <a14:hiddenFill xmlns:a14="http://schemas.microsoft.com/office/drawing/2010/main">
+                <a:solidFill>
+                  <a:srgbClr val="FFFFFF"/>
+                </a:solidFill>
+              </a14:hiddenFill>
+            </a:ext>
+          </a:extLst>
+        </p:spPr>
+      </p:pic>
+      <p:sp>
+        <p:nvSpPr>
+          <p:cNvPr id="5" name="Title 1"/>
+          <p:cNvSpPr txBox="1">
+            <a:spLocks/>
+          </p:cNvSpPr>
+          <p:nvPr>
+            <p:custDataLst>
+              <p:tags r:id="rId3"/>
+            </p:custDataLst>
+          </p:nvPr>
+        </p:nvSpPr>
+        <p:spPr>
+          <a:xfrm>
+            <a:off x="1200476" y="1426029"/>
+            <a:ext cx="9238924" cy="1320800"/>
+          </a:xfrm>
+          <a:prstGeom prst="rect">
+            <a:avLst/>
+          </a:prstGeom>
+        </p:spPr>
+        <p:txBody>
+          <a:bodyPr vert="horz" lIns="91440" tIns="45720" rIns="91440" bIns="45720" rtlCol="0" anchor="t">
             <a:normAutofit/>
           </a:bodyPr>
-          <a:lstStyle/>
-          <a:p>
-            <a:pPr marL="0" indent="0">
+          <a:lstStyle>
+            <a:lvl1pPr algn="l" defTabSz="457200" rtl="0" eaLnBrk="1" latinLnBrk="0" hangingPunct="1">
+              <a:spcBef>
+                <a:spcPct val="0"/>
+              </a:spcBef>
               <a:buNone/>
-            </a:pPr>
-            <a:r>
-              <a:rPr lang="en-US" sz="2800" dirty="0" smtClean="0"/>
-              <a:t>Revue de </a:t>
-            </a:r>
-            <a:r>
-              <a:rPr lang="en-US" sz="2800" dirty="0" err="1" smtClean="0"/>
-              <a:t>l’état</a:t>
-            </a:r>
-            <a:r>
-              <a:rPr lang="en-US" sz="2800" dirty="0" smtClean="0"/>
-              <a:t> de </a:t>
-            </a:r>
-            <a:r>
-              <a:rPr lang="en-US" sz="2800" dirty="0" err="1" smtClean="0"/>
-              <a:t>l’art</a:t>
-            </a:r>
-            <a:endParaRPr lang="en-US" sz="2800" dirty="0"/>
+              <a:defRPr sz="3600" kern="1200">
+                <a:solidFill>
+                  <a:schemeClr val="accent1"/>
+                </a:solidFill>
+                <a:latin typeface="+mj-lt"/>
+                <a:ea typeface="+mj-ea"/>
+                <a:cs typeface="+mj-cs"/>
+              </a:defRPr>
+            </a:lvl1pPr>
+            <a:lvl2pPr eaLnBrk="1" hangingPunct="1">
+              <a:defRPr>
+                <a:solidFill>
+                  <a:schemeClr val="tx2"/>
+                </a:solidFill>
+              </a:defRPr>
+            </a:lvl2pPr>
+            <a:lvl3pPr eaLnBrk="1" hangingPunct="1">
+              <a:defRPr>
+                <a:solidFill>
+                  <a:schemeClr val="tx2"/>
+                </a:solidFill>
+              </a:defRPr>
+            </a:lvl3pPr>
+            <a:lvl4pPr eaLnBrk="1" hangingPunct="1">
+              <a:defRPr>
+                <a:solidFill>
+                  <a:schemeClr val="tx2"/>
+                </a:solidFill>
+              </a:defRPr>
+            </a:lvl4pPr>
+            <a:lvl5pPr eaLnBrk="1" hangingPunct="1">
+              <a:defRPr>
+                <a:solidFill>
+                  <a:schemeClr val="tx2"/>
+                </a:solidFill>
+              </a:defRPr>
+            </a:lvl5pPr>
+            <a:lvl6pPr eaLnBrk="1" hangingPunct="1">
+              <a:defRPr>
+                <a:solidFill>
+                  <a:schemeClr val="tx2"/>
+                </a:solidFill>
+              </a:defRPr>
+            </a:lvl6pPr>
+            <a:lvl7pPr eaLnBrk="1" hangingPunct="1">
+              <a:defRPr>
+                <a:solidFill>
+                  <a:schemeClr val="tx2"/>
+                </a:solidFill>
+              </a:defRPr>
+            </a:lvl7pPr>
+            <a:lvl8pPr eaLnBrk="1" hangingPunct="1">
+              <a:defRPr>
+                <a:solidFill>
+                  <a:schemeClr val="tx2"/>
+                </a:solidFill>
+              </a:defRPr>
+            </a:lvl8pPr>
+            <a:lvl9pPr eaLnBrk="1" hangingPunct="1">
+              <a:defRPr>
+                <a:solidFill>
+                  <a:schemeClr val="tx2"/>
+                </a:solidFill>
+              </a:defRPr>
+            </a:lvl9pPr>
+          </a:lstStyle>
+          <a:p>
+            <a:pPr algn="ctr"/>
+            <a:r>
+              <a:rPr lang="en-US" sz="2400" dirty="0" err="1" smtClean="0"/>
+              <a:t>Schéma</a:t>
+            </a:r>
+            <a:r>
+              <a:rPr lang="en-US" sz="2400" dirty="0" smtClean="0"/>
+              <a:t> d’un </a:t>
+            </a:r>
+            <a:r>
+              <a:rPr lang="en-US" sz="2400" dirty="0" err="1" smtClean="0"/>
+              <a:t>redresseur</a:t>
+            </a:r>
+            <a:r>
+              <a:rPr lang="en-US" sz="2400" dirty="0" smtClean="0"/>
+              <a:t> NPC à 3 </a:t>
+            </a:r>
+            <a:r>
+              <a:rPr lang="en-US" sz="2400" dirty="0" err="1" smtClean="0"/>
+              <a:t>niveaux</a:t>
+            </a:r>
+            <a:r>
+              <a:rPr lang="en-US" sz="2400" dirty="0" smtClean="0"/>
+              <a:t> de base</a:t>
+            </a:r>
           </a:p>
         </p:txBody>
       </p:sp>
     </p:spTree>
     <p:extLst>
       <p:ext uri="{BB962C8B-B14F-4D97-AF65-F5344CB8AC3E}">
-        <p14:creationId xmlns:p14="http://schemas.microsoft.com/office/powerpoint/2010/main" val="3915706220"/>
+        <p14:creationId xmlns:p14="http://schemas.microsoft.com/office/powerpoint/2010/main" val="3388709480"/>
       </p:ext>
     </p:extLst>
   </p:cSld>
@@ -7637,6 +7795,9 @@
           </p:cNvSpPr>
           <p:nvPr>
             <p:ph type="title"/>
+            <p:custDataLst>
+              <p:tags r:id="rId1"/>
+            </p:custDataLst>
           </p:nvPr>
         </p:nvSpPr>
         <p:spPr>
@@ -7669,6 +7830,9 @@
           </p:cNvSpPr>
           <p:nvPr>
             <p:ph idx="1"/>
+            <p:custDataLst>
+              <p:tags r:id="rId2"/>
+            </p:custDataLst>
           </p:nvPr>
         </p:nvSpPr>
         <p:spPr>
@@ -7686,22 +7850,104 @@
             <a:pPr marL="0" indent="0">
               <a:buNone/>
             </a:pPr>
-            <a:r>
-              <a:rPr lang="en-US" sz="2800" dirty="0" smtClean="0"/>
-              <a:t>Tests </a:t>
-            </a:r>
-            <a:r>
-              <a:rPr lang="en-US" sz="2800" dirty="0" err="1" smtClean="0"/>
-              <a:t>préliminaires</a:t>
-            </a:r>
             <a:endParaRPr lang="en-US" sz="2800" dirty="0"/>
           </a:p>
         </p:txBody>
       </p:sp>
+      <p:pic>
+        <p:nvPicPr>
+          <p:cNvPr id="2050" name="Picture 2" descr="D:\LiberT\Desktop\simu.png"/>
+          <p:cNvPicPr>
+            <a:picLocks noChangeAspect="1" noChangeArrowheads="1"/>
+          </p:cNvPicPr>
+          <p:nvPr>
+            <p:custDataLst>
+              <p:tags r:id="rId3"/>
+            </p:custDataLst>
+          </p:nvPr>
+        </p:nvPicPr>
+        <p:blipFill>
+          <a:blip r:embed="rId6">
+            <a:extLst>
+              <a:ext uri="{28A0092B-C50C-407E-A947-70E740481C1C}">
+                <a14:useLocalDpi xmlns:a14="http://schemas.microsoft.com/office/drawing/2010/main" val="0"/>
+              </a:ext>
+            </a:extLst>
+          </a:blip>
+          <a:srcRect/>
+          <a:stretch>
+            <a:fillRect/>
+          </a:stretch>
+        </p:blipFill>
+        <p:spPr bwMode="auto">
+          <a:xfrm>
+            <a:off x="304799" y="1473201"/>
+            <a:ext cx="6950628" cy="3589866"/>
+          </a:xfrm>
+          <a:prstGeom prst="rect">
+            <a:avLst/>
+          </a:prstGeom>
+          <a:noFill/>
+          <a:extLst>
+            <a:ext uri="{909E8E84-426E-40DD-AFC4-6F175D3DCCD1}">
+              <a14:hiddenFill xmlns:a14="http://schemas.microsoft.com/office/drawing/2010/main">
+                <a:solidFill>
+                  <a:srgbClr val="FFFFFF"/>
+                </a:solidFill>
+              </a14:hiddenFill>
+            </a:ext>
+          </a:extLst>
+        </p:spPr>
+      </p:pic>
+      <p:pic>
+        <p:nvPicPr>
+          <p:cNvPr id="2051" name="Picture 3" descr="D:\LiberT\Desktop\à la source.JPG"/>
+          <p:cNvPicPr>
+            <a:picLocks noChangeAspect="1" noChangeArrowheads="1"/>
+          </p:cNvPicPr>
+          <p:nvPr>
+            <p:custDataLst>
+              <p:tags r:id="rId4"/>
+            </p:custDataLst>
+          </p:nvPr>
+        </p:nvPicPr>
+        <p:blipFill>
+          <a:blip r:embed="rId7">
+            <a:extLst>
+              <a:ext uri="{28A0092B-C50C-407E-A947-70E740481C1C}">
+                <a14:useLocalDpi xmlns:a14="http://schemas.microsoft.com/office/drawing/2010/main" val="0"/>
+              </a:ext>
+            </a:extLst>
+          </a:blip>
+          <a:srcRect/>
+          <a:stretch>
+            <a:fillRect/>
+          </a:stretch>
+        </p:blipFill>
+        <p:spPr bwMode="auto">
+          <a:xfrm>
+            <a:off x="4975668" y="2794001"/>
+            <a:ext cx="7104062" cy="3829050"/>
+          </a:xfrm>
+          <a:prstGeom prst="rect">
+            <a:avLst/>
+          </a:prstGeom>
+          <a:noFill/>
+          <a:extLst>
+            <a:ext uri="{909E8E84-426E-40DD-AFC4-6F175D3DCCD1}">
+              <a14:hiddenFill xmlns:a14="http://schemas.microsoft.com/office/drawing/2010/main">
+                <a:solidFill>
+                  <a:srgbClr val="FFFFFF"/>
+                </a:solidFill>
+              </a14:hiddenFill>
+            </a:ext>
+          </a:extLst>
+        </p:spPr>
+      </p:pic>
     </p:spTree>
     <p:extLst>
       <p:ext uri="{BB962C8B-B14F-4D97-AF65-F5344CB8AC3E}">
-        <p14:creationId xmlns:p14="http://schemas.microsoft.com/office/powerpoint/2010/main" val="3692122036"/>
+        <p14:creationId xmlns:p14="http://schemas.microsoft.com/office/powerpoint/2010/main" val="2864239534"/>
       </p:ext>
     </p:extLst>
   </p:cSld>
@@ -7797,7 +8043,7 @@
           <p:nvPr/>
         </p:nvPicPr>
         <p:blipFill>
-          <a:blip r:embed="rId2">
+          <a:blip r:embed="rId2" cstate="print">
             <a:extLst>
               <a:ext uri="{28A0092B-C50C-407E-A947-70E740481C1C}">
                 <a14:useLocalDpi xmlns:a14="http://schemas.microsoft.com/office/drawing/2010/main" val="0"/>
@@ -7860,7 +8106,9 @@
         </p:nvSpPr>
         <p:spPr/>
         <p:txBody>
-          <a:bodyPr/>
+          <a:bodyPr>
+            <a:normAutofit fontScale="90000"/>
+          </a:bodyPr>
           <a:lstStyle/>
           <a:p>
             <a:pPr algn="r"/>
@@ -8176,14 +8424,14 @@
           </a:ln>
           <a:extLst>
             <a:ext uri="{909E8E84-426E-40dd-AFC4-6F175D3DCCD1}">
-              <a14:hiddenFill xmlns:a14="http://schemas.microsoft.com/office/drawing/2010/main">
+              <a14:hiddenFill xmlns:a14="http://schemas.microsoft.com/office/drawing/2010/main" xmlns="">
                 <a:solidFill>
                   <a:srgbClr val="FFFFFF"/>
                 </a:solidFill>
               </a14:hiddenFill>
             </a:ext>
             <a:ext uri="{91240B29-F687-4f45-9708-019B960494DF}">
-              <a14:hiddenLine xmlns:a14="http://schemas.microsoft.com/office/drawing/2010/main" w="9525">
+              <a14:hiddenLine xmlns:a14="http://schemas.microsoft.com/office/drawing/2010/main" xmlns="" w="9525">
                 <a:solidFill>
                   <a:srgbClr val="000000"/>
                 </a:solidFill>
@@ -8262,7 +8510,7 @@
   <p:timing>
     <p:tnLst>
       <p:par>
-        <p:cTn xmlns:p14="http://schemas.microsoft.com/office/powerpoint/2010/main" id="1" dur="indefinite" restart="never" nodeType="tmRoot"/>
+        <p:cTn id="1" dur="indefinite" restart="never" nodeType="tmRoot"/>
       </p:par>
     </p:tnLst>
   </p:timing>
@@ -8298,7 +8546,9 @@
         </p:nvSpPr>
         <p:spPr/>
         <p:txBody>
-          <a:bodyPr/>
+          <a:bodyPr>
+            <a:normAutofit fontScale="90000"/>
+          </a:bodyPr>
           <a:lstStyle/>
           <a:p>
             <a:pPr algn="r"/>
@@ -8505,7 +8755,9 @@
         </p:nvSpPr>
         <p:spPr/>
         <p:txBody>
-          <a:bodyPr/>
+          <a:bodyPr>
+            <a:normAutofit fontScale="90000"/>
+          </a:bodyPr>
           <a:lstStyle/>
           <a:p>
             <a:pPr algn="r"/>
@@ -8651,7 +8903,9 @@
         </p:nvSpPr>
         <p:spPr/>
         <p:txBody>
-          <a:bodyPr/>
+          <a:bodyPr>
+            <a:normAutofit fontScale="90000"/>
+          </a:bodyPr>
           <a:lstStyle/>
           <a:p>
             <a:pPr algn="r"/>
@@ -11249,7 +11503,7 @@
   <p:timing>
     <p:tnLst>
       <p:par>
-        <p:cTn xmlns:p14="http://schemas.microsoft.com/office/powerpoint/2010/main" id="1" dur="indefinite" restart="never" nodeType="tmRoot"/>
+        <p:cTn id="1" dur="indefinite" restart="never" nodeType="tmRoot"/>
       </p:par>
     </p:tnLst>
   </p:timing>
@@ -11412,14 +11666,14 @@
           <a:effectLst/>
           <a:extLst>
             <a:ext uri="{909E8E84-426E-40dd-AFC4-6F175D3DCCD1}">
-              <a14:hiddenFill xmlns:a14="http://schemas.microsoft.com/office/drawing/2010/main">
+              <a14:hiddenFill xmlns:a14="http://schemas.microsoft.com/office/drawing/2010/main" xmlns="">
                 <a:solidFill>
                   <a:schemeClr val="accent1"/>
                 </a:solidFill>
               </a14:hiddenFill>
             </a:ext>
             <a:ext uri="{91240B29-F687-4f45-9708-019B960494DF}">
-              <a14:hiddenLine xmlns:a14="http://schemas.microsoft.com/office/drawing/2010/main" w="9525">
+              <a14:hiddenLine xmlns:a14="http://schemas.microsoft.com/office/drawing/2010/main" xmlns="" w="9525">
                 <a:solidFill>
                   <a:schemeClr val="tx1"/>
                 </a:solidFill>
@@ -11429,7 +11683,7 @@
               </a14:hiddenLine>
             </a:ext>
             <a:ext uri="{AF507438-7753-43e0-B8FC-AC1667EBCBE1}">
-              <a14:hiddenEffects xmlns:a14="http://schemas.microsoft.com/office/drawing/2010/main">
+              <a14:hiddenEffects xmlns:a14="http://schemas.microsoft.com/office/drawing/2010/main" xmlns="">
                 <a:effectLst>
                   <a:outerShdw blurRad="63500" dist="38099" dir="2700000" algn="ctr" rotWithShape="0">
                     <a:schemeClr val="bg2">
@@ -11455,7 +11709,7 @@
   <p:timing>
     <p:tnLst>
       <p:par>
-        <p:cTn xmlns:p14="http://schemas.microsoft.com/office/powerpoint/2010/main" id="1" dur="indefinite" restart="never" nodeType="tmRoot"/>
+        <p:cTn id="1" dur="indefinite" restart="never" nodeType="tmRoot"/>
       </p:par>
     </p:tnLst>
   </p:timing>
@@ -11520,7 +11774,7 @@
         </p:spPr>
         <p:txBody>
           <a:bodyPr>
-            <a:normAutofit fontScale="70000" lnSpcReduction="20000"/>
+            <a:normAutofit fontScale="62500" lnSpcReduction="20000"/>
           </a:bodyPr>
           <a:lstStyle/>
           <a:p>
@@ -11645,7 +11899,7 @@
   <p:timing>
     <p:tnLst>
       <p:par>
-        <p:cTn xmlns:p14="http://schemas.microsoft.com/office/powerpoint/2010/main" id="1" dur="indefinite" restart="never" nodeType="tmRoot"/>
+        <p:cTn id="1" dur="indefinite" restart="never" nodeType="tmRoot"/>
       </p:par>
     </p:tnLst>
   </p:timing>
@@ -11835,7 +12089,7 @@
   <p:timing>
     <p:tnLst>
       <p:par>
-        <p:cTn xmlns:p14="http://schemas.microsoft.com/office/powerpoint/2010/main" id="1" dur="indefinite" restart="never" nodeType="tmRoot"/>
+        <p:cTn id="1" dur="indefinite" restart="never" nodeType="tmRoot"/>
       </p:par>
     </p:tnLst>
   </p:timing>
@@ -11997,7 +12251,7 @@
   <p:timing>
     <p:tnLst>
       <p:par>
-        <p:cTn xmlns:p14="http://schemas.microsoft.com/office/powerpoint/2010/main" id="1" dur="indefinite" restart="never" nodeType="tmRoot"/>
+        <p:cTn id="1" dur="indefinite" restart="never" nodeType="tmRoot"/>
       </p:par>
     </p:tnLst>
   </p:timing>
@@ -12149,7 +12403,7 @@
   <p:timing>
     <p:tnLst>
       <p:par>
-        <p:cTn xmlns:p14="http://schemas.microsoft.com/office/powerpoint/2010/main" id="1" dur="indefinite" restart="never" nodeType="tmRoot"/>
+        <p:cTn id="1" dur="indefinite" restart="never" nodeType="tmRoot"/>
       </p:par>
     </p:tnLst>
   </p:timing>
@@ -12307,11 +12561,53 @@
   <p:timing>
     <p:tnLst>
       <p:par>
-        <p:cTn xmlns:p14="http://schemas.microsoft.com/office/powerpoint/2010/main" id="1" dur="indefinite" restart="never" nodeType="tmRoot"/>
+        <p:cTn id="1" dur="indefinite" restart="never" nodeType="tmRoot"/>
       </p:par>
     </p:tnLst>
   </p:timing>
 </p:sld>
+</file>
+
+<file path=ppt/tags/tag1.xml><?xml version="1.0" encoding="utf-8"?>
+<p:tagLst xmlns:a="http://schemas.openxmlformats.org/drawingml/2006/main" xmlns:r="http://schemas.openxmlformats.org/officeDocument/2006/relationships" xmlns:p="http://schemas.openxmlformats.org/presentationml/2006/main">
+  <p:tag name="NUM" val="1"/>
+</p:tagLst>
+</file>
+
+<file path=ppt/tags/tag2.xml><?xml version="1.0" encoding="utf-8"?>
+<p:tagLst xmlns:a="http://schemas.openxmlformats.org/drawingml/2006/main" xmlns:r="http://schemas.openxmlformats.org/officeDocument/2006/relationships" xmlns:p="http://schemas.openxmlformats.org/presentationml/2006/main">
+  <p:tag name="NUM" val="2"/>
+</p:tagLst>
+</file>
+
+<file path=ppt/tags/tag3.xml><?xml version="1.0" encoding="utf-8"?>
+<p:tagLst xmlns:a="http://schemas.openxmlformats.org/drawingml/2006/main" xmlns:r="http://schemas.openxmlformats.org/officeDocument/2006/relationships" xmlns:p="http://schemas.openxmlformats.org/presentationml/2006/main">
+  <p:tag name="NUM" val="3"/>
+</p:tagLst>
+</file>
+
+<file path=ppt/tags/tag4.xml><?xml version="1.0" encoding="utf-8"?>
+<p:tagLst xmlns:a="http://schemas.openxmlformats.org/drawingml/2006/main" xmlns:r="http://schemas.openxmlformats.org/officeDocument/2006/relationships" xmlns:p="http://schemas.openxmlformats.org/presentationml/2006/main">
+  <p:tag name="NUM" val="1"/>
+</p:tagLst>
+</file>
+
+<file path=ppt/tags/tag5.xml><?xml version="1.0" encoding="utf-8"?>
+<p:tagLst xmlns:a="http://schemas.openxmlformats.org/drawingml/2006/main" xmlns:r="http://schemas.openxmlformats.org/officeDocument/2006/relationships" xmlns:p="http://schemas.openxmlformats.org/presentationml/2006/main">
+  <p:tag name="NUM" val="2"/>
+</p:tagLst>
+</file>
+
+<file path=ppt/tags/tag6.xml><?xml version="1.0" encoding="utf-8"?>
+<p:tagLst xmlns:a="http://schemas.openxmlformats.org/drawingml/2006/main" xmlns:r="http://schemas.openxmlformats.org/officeDocument/2006/relationships" xmlns:p="http://schemas.openxmlformats.org/presentationml/2006/main">
+  <p:tag name="NUM" val="3"/>
+</p:tagLst>
+</file>
+
+<file path=ppt/tags/tag7.xml><?xml version="1.0" encoding="utf-8"?>
+<p:tagLst xmlns:a="http://schemas.openxmlformats.org/drawingml/2006/main" xmlns:r="http://schemas.openxmlformats.org/officeDocument/2006/relationships" xmlns:p="http://schemas.openxmlformats.org/presentationml/2006/main">
+  <p:tag name="NUM" val="4"/>
+</p:tagLst>
 </file>
 
 <file path=ppt/theme/theme1.xml><?xml version="1.0" encoding="utf-8"?>
@@ -12565,7 +12861,7 @@
   <a:extraClrSchemeLst/>
   <a:extLst>
     <a:ext uri="{05A4C25C-085E-4340-85A3-A5531E510DB2}">
-      <thm15:themeFamily xmlns:thm15="http://schemas.microsoft.com/office/thememl/2012/main" xmlns="" name="Facet" id="{C0C680CD-088A-49FC-A102-D699147F32B2}" vid="{CFBC31BA-B70F-4F30-BCAA-4F3011E16C4D}"/>
+      <thm15:themeFamily xmlns:thm15="http://schemas.microsoft.com/office/thememl/2012/main" name="Facet" id="{C0C680CD-088A-49FC-A102-D699147F32B2}" vid="{CFBC31BA-B70F-4F30-BCAA-4F3011E16C4D}"/>
     </a:ext>
   </a:extLst>
 </a:theme>

</xml_diff>

<commit_message>
Modif Viarouge + format 4/3 pour les vieux projecteurs de l'uni
</commit_message>
<xml_diff>
--- a/Remise/Remise 1/Presentation_Remise_1.pptx
+++ b/Remise/Remise 1/Presentation_Remise_1.pptx
@@ -39,7 +39,7 @@
     <p:sldId id="289" r:id="rId33"/>
     <p:sldId id="290" r:id="rId34"/>
   </p:sldIdLst>
-  <p:sldSz cx="12192000" cy="6858000"/>
+  <p:sldSz cx="9144000" cy="6858000" type="screen4x3"/>
   <p:notesSz cx="6858000" cy="9144000"/>
   <p:defaultTextStyle>
     <a:defPPr>
@@ -138,7 +138,7 @@
   </p:defaultTextStyle>
   <p:extLst>
     <p:ext uri="{EFAFB233-063F-42B5-8137-9DF3F51BA10A}">
-      <p15:sldGuideLst xmlns:p15="http://schemas.microsoft.com/office/powerpoint/2012/main">
+      <p15:sldGuideLst xmlns:p15="http://schemas.microsoft.com/office/powerpoint/2012/main" xmlns="">
         <p15:guide id="1" orient="horz" pos="2160">
           <p15:clr>
             <a:srgbClr val="A4A3A4"/>
@@ -181,7 +181,7 @@
         <p:grpSpPr>
           <a:xfrm>
             <a:off x="0" y="-8467"/>
-            <a:ext cx="12192000" cy="6866467"/>
+            <a:ext cx="9144000" cy="6866467"/>
             <a:chOff x="0" y="-8467"/>
             <a:chExt cx="12192000" cy="6866467"/>
           </a:xfrm>
@@ -714,8 +714,8 @@
         </p:nvSpPr>
         <p:spPr>
           <a:xfrm>
-            <a:off x="1507067" y="2404534"/>
-            <a:ext cx="7766936" cy="1646302"/>
+            <a:off x="1130300" y="2404534"/>
+            <a:ext cx="5825202" cy="1646302"/>
           </a:xfrm>
         </p:spPr>
         <p:txBody>
@@ -752,8 +752,8 @@
         </p:nvSpPr>
         <p:spPr>
           <a:xfrm>
-            <a:off x="1507067" y="4050833"/>
-            <a:ext cx="7766936" cy="1096899"/>
+            <a:off x="1130300" y="4050834"/>
+            <a:ext cx="5825202" cy="1096899"/>
           </a:xfrm>
         </p:spPr>
         <p:txBody>
@@ -877,7 +877,7 @@
           <a:p>
             <a:fld id="{5C8908A9-1E53-4D85-A76B-A28D8BCB5503}" type="datetimeFigureOut">
               <a:rPr lang="en-US" smtClean="0"/>
-              <a:t>1/27/2014</a:t>
+              <a:t>2014-01-29</a:t>
             </a:fld>
             <a:endParaRPr lang="en-US"/>
           </a:p>
@@ -967,8 +967,8 @@
         </p:nvSpPr>
         <p:spPr>
           <a:xfrm>
-            <a:off x="677334" y="4800600"/>
-            <a:ext cx="8596667" cy="566738"/>
+            <a:off x="508001" y="4800600"/>
+            <a:ext cx="6447500" cy="566738"/>
           </a:xfrm>
         </p:spPr>
         <p:txBody>
@@ -1001,8 +1001,8 @@
         </p:nvSpPr>
         <p:spPr>
           <a:xfrm>
-            <a:off x="677334" y="609600"/>
-            <a:ext cx="8596668" cy="3845718"/>
+            <a:off x="508001" y="609600"/>
+            <a:ext cx="6447501" cy="3845718"/>
           </a:xfrm>
         </p:spPr>
         <p:txBody>
@@ -1068,8 +1068,8 @@
         </p:nvSpPr>
         <p:spPr>
           <a:xfrm>
-            <a:off x="677334" y="5367338"/>
-            <a:ext cx="8596667" cy="674024"/>
+            <a:off x="508001" y="5367338"/>
+            <a:ext cx="6447500" cy="674024"/>
           </a:xfrm>
         </p:spPr>
         <p:txBody>
@@ -1140,7 +1140,7 @@
           <a:p>
             <a:fld id="{5C8908A9-1E53-4D85-A76B-A28D8BCB5503}" type="datetimeFigureOut">
               <a:rPr lang="en-US" smtClean="0"/>
-              <a:t>1/27/2014</a:t>
+              <a:t>2014-01-29</a:t>
             </a:fld>
             <a:endParaRPr lang="en-US"/>
           </a:p>
@@ -1230,8 +1230,8 @@
         </p:nvSpPr>
         <p:spPr>
           <a:xfrm>
-            <a:off x="677335" y="609600"/>
-            <a:ext cx="8596668" cy="3403600"/>
+            <a:off x="508001" y="609600"/>
+            <a:ext cx="6447501" cy="3403600"/>
           </a:xfrm>
         </p:spPr>
         <p:txBody>
@@ -1264,8 +1264,8 @@
         </p:nvSpPr>
         <p:spPr>
           <a:xfrm>
-            <a:off x="677335" y="4470400"/>
-            <a:ext cx="8596668" cy="1570962"/>
+            <a:off x="508001" y="4470400"/>
+            <a:ext cx="6447501" cy="1570962"/>
           </a:xfrm>
         </p:spPr>
         <p:txBody>
@@ -1391,7 +1391,7 @@
           <a:p>
             <a:fld id="{5C8908A9-1E53-4D85-A76B-A28D8BCB5503}" type="datetimeFigureOut">
               <a:rPr lang="en-US" smtClean="0"/>
-              <a:t>1/27/2014</a:t>
+              <a:t>2014-01-29</a:t>
             </a:fld>
             <a:endParaRPr lang="en-US"/>
           </a:p>
@@ -1481,8 +1481,8 @@
         </p:nvSpPr>
         <p:spPr>
           <a:xfrm>
-            <a:off x="931334" y="609600"/>
-            <a:ext cx="8094134" cy="3022600"/>
+            <a:off x="698500" y="609600"/>
+            <a:ext cx="6070601" cy="3022600"/>
           </a:xfrm>
         </p:spPr>
         <p:txBody>
@@ -1515,8 +1515,8 @@
         </p:nvSpPr>
         <p:spPr>
           <a:xfrm>
-            <a:off x="1366139" y="3632200"/>
-            <a:ext cx="7224524" cy="381000"/>
+            <a:off x="1024604" y="3632200"/>
+            <a:ext cx="5418393" cy="381000"/>
           </a:xfrm>
         </p:spPr>
         <p:txBody>
@@ -1578,8 +1578,8 @@
         </p:nvSpPr>
         <p:spPr>
           <a:xfrm>
-            <a:off x="677335" y="4470400"/>
-            <a:ext cx="8596668" cy="1570962"/>
+            <a:off x="508001" y="4470400"/>
+            <a:ext cx="6447501" cy="1570962"/>
           </a:xfrm>
         </p:spPr>
         <p:txBody>
@@ -1705,7 +1705,7 @@
           <a:p>
             <a:fld id="{5C8908A9-1E53-4D85-A76B-A28D8BCB5503}" type="datetimeFigureOut">
               <a:rPr lang="en-US" smtClean="0"/>
-              <a:t>1/27/2014</a:t>
+              <a:t>2014-01-29</a:t>
             </a:fld>
             <a:endParaRPr lang="en-US"/>
           </a:p>
@@ -1761,8 +1761,8 @@
         </p:nvSpPr>
         <p:spPr>
           <a:xfrm>
-            <a:off x="541870" y="790378"/>
-            <a:ext cx="609600" cy="584776"/>
+            <a:off x="406403" y="790378"/>
+            <a:ext cx="457200" cy="584776"/>
           </a:xfrm>
           <a:prstGeom prst="rect">
             <a:avLst/>
@@ -1802,8 +1802,8 @@
         </p:nvSpPr>
         <p:spPr>
           <a:xfrm>
-            <a:off x="8893011" y="2886556"/>
-            <a:ext cx="609600" cy="584776"/>
+            <a:off x="6669758" y="2886556"/>
+            <a:ext cx="457200" cy="584776"/>
           </a:xfrm>
           <a:prstGeom prst="rect">
             <a:avLst/>
@@ -1885,8 +1885,8 @@
         </p:nvSpPr>
         <p:spPr>
           <a:xfrm>
-            <a:off x="677335" y="1931988"/>
-            <a:ext cx="8596668" cy="2595460"/>
+            <a:off x="508001" y="1931988"/>
+            <a:ext cx="6447501" cy="2595460"/>
           </a:xfrm>
         </p:spPr>
         <p:txBody>
@@ -1919,8 +1919,8 @@
         </p:nvSpPr>
         <p:spPr>
           <a:xfrm>
-            <a:off x="677335" y="4527448"/>
-            <a:ext cx="8596668" cy="1513914"/>
+            <a:off x="508001" y="4527448"/>
+            <a:ext cx="6447501" cy="1513914"/>
           </a:xfrm>
         </p:spPr>
         <p:txBody>
@@ -2046,7 +2046,7 @@
           <a:p>
             <a:fld id="{5C8908A9-1E53-4D85-A76B-A28D8BCB5503}" type="datetimeFigureOut">
               <a:rPr lang="en-US" smtClean="0"/>
-              <a:t>1/27/2014</a:t>
+              <a:t>2014-01-29</a:t>
             </a:fld>
             <a:endParaRPr lang="en-US"/>
           </a:p>
@@ -2136,8 +2136,8 @@
         </p:nvSpPr>
         <p:spPr>
           <a:xfrm>
-            <a:off x="931334" y="609600"/>
-            <a:ext cx="8094134" cy="3022600"/>
+            <a:off x="698500" y="609600"/>
+            <a:ext cx="6070601" cy="3022600"/>
           </a:xfrm>
         </p:spPr>
         <p:txBody>
@@ -2170,8 +2170,8 @@
         </p:nvSpPr>
         <p:spPr>
           <a:xfrm>
-            <a:off x="677332" y="4013200"/>
-            <a:ext cx="8596669" cy="514248"/>
+            <a:off x="507999" y="4013200"/>
+            <a:ext cx="6447502" cy="514248"/>
           </a:xfrm>
         </p:spPr>
         <p:txBody>
@@ -2233,8 +2233,8 @@
         </p:nvSpPr>
         <p:spPr>
           <a:xfrm>
-            <a:off x="677335" y="4527448"/>
-            <a:ext cx="8596668" cy="1513914"/>
+            <a:off x="508001" y="4527448"/>
+            <a:ext cx="6447501" cy="1513914"/>
           </a:xfrm>
         </p:spPr>
         <p:txBody>
@@ -2360,7 +2360,7 @@
           <a:p>
             <a:fld id="{5C8908A9-1E53-4D85-A76B-A28D8BCB5503}" type="datetimeFigureOut">
               <a:rPr lang="en-US" smtClean="0"/>
-              <a:t>1/27/2014</a:t>
+              <a:t>2014-01-29</a:t>
             </a:fld>
             <a:endParaRPr lang="en-US"/>
           </a:p>
@@ -2416,8 +2416,8 @@
         </p:nvSpPr>
         <p:spPr>
           <a:xfrm>
-            <a:off x="541870" y="790378"/>
-            <a:ext cx="609600" cy="584776"/>
+            <a:off x="406403" y="790378"/>
+            <a:ext cx="457200" cy="584776"/>
           </a:xfrm>
           <a:prstGeom prst="rect">
             <a:avLst/>
@@ -2457,8 +2457,8 @@
         </p:nvSpPr>
         <p:spPr>
           <a:xfrm>
-            <a:off x="8893011" y="2886556"/>
-            <a:ext cx="609600" cy="584776"/>
+            <a:off x="6669758" y="2886556"/>
+            <a:ext cx="457200" cy="584776"/>
           </a:xfrm>
           <a:prstGeom prst="rect">
             <a:avLst/>
@@ -2532,8 +2532,8 @@
         </p:nvSpPr>
         <p:spPr>
           <a:xfrm>
-            <a:off x="685799" y="609600"/>
-            <a:ext cx="8588203" cy="3022600"/>
+            <a:off x="514350" y="609600"/>
+            <a:ext cx="6441152" cy="3022600"/>
           </a:xfrm>
         </p:spPr>
         <p:txBody>
@@ -2566,8 +2566,8 @@
         </p:nvSpPr>
         <p:spPr>
           <a:xfrm>
-            <a:off x="677332" y="4013200"/>
-            <a:ext cx="8596669" cy="514248"/>
+            <a:off x="507999" y="4013200"/>
+            <a:ext cx="6447502" cy="514248"/>
           </a:xfrm>
         </p:spPr>
         <p:txBody>
@@ -2626,8 +2626,8 @@
         </p:nvSpPr>
         <p:spPr>
           <a:xfrm>
-            <a:off x="677335" y="4527448"/>
-            <a:ext cx="8596668" cy="1513914"/>
+            <a:off x="508001" y="4527448"/>
+            <a:ext cx="6447501" cy="1513914"/>
           </a:xfrm>
         </p:spPr>
         <p:txBody>
@@ -2753,7 +2753,7 @@
           <a:p>
             <a:fld id="{5C8908A9-1E53-4D85-A76B-A28D8BCB5503}" type="datetimeFigureOut">
               <a:rPr lang="en-US" smtClean="0"/>
-              <a:t>1/27/2014</a:t>
+              <a:t>2014-01-29</a:t>
             </a:fld>
             <a:endParaRPr lang="en-US"/>
           </a:p>
@@ -2923,7 +2923,7 @@
           <a:p>
             <a:fld id="{5C8908A9-1E53-4D85-A76B-A28D8BCB5503}" type="datetimeFigureOut">
               <a:rPr lang="en-US" smtClean="0"/>
-              <a:t>1/27/2014</a:t>
+              <a:t>2014-01-29</a:t>
             </a:fld>
             <a:endParaRPr lang="en-US"/>
           </a:p>
@@ -3013,8 +3013,8 @@
         </p:nvSpPr>
         <p:spPr>
           <a:xfrm>
-            <a:off x="7967673" y="609599"/>
-            <a:ext cx="1304743" cy="5251451"/>
+            <a:off x="5975755" y="609600"/>
+            <a:ext cx="978557" cy="5251451"/>
           </a:xfrm>
         </p:spPr>
         <p:txBody>
@@ -3041,8 +3041,8 @@
         </p:nvSpPr>
         <p:spPr>
           <a:xfrm>
-            <a:off x="677335" y="609600"/>
-            <a:ext cx="7060150" cy="5251450"/>
+            <a:off x="508001" y="609600"/>
+            <a:ext cx="5295113" cy="5251450"/>
           </a:xfrm>
         </p:spPr>
         <p:txBody>
@@ -3103,7 +3103,7 @@
           <a:p>
             <a:fld id="{5C8908A9-1E53-4D85-A76B-A28D8BCB5503}" type="datetimeFigureOut">
               <a:rPr lang="en-US" smtClean="0"/>
-              <a:t>1/27/2014</a:t>
+              <a:t>2014-01-29</a:t>
             </a:fld>
             <a:endParaRPr lang="en-US"/>
           </a:p>
@@ -3279,7 +3279,7 @@
           <a:p>
             <a:fld id="{5C8908A9-1E53-4D85-A76B-A28D8BCB5503}" type="datetimeFigureOut">
               <a:rPr lang="en-US" smtClean="0"/>
-              <a:t>1/27/2014</a:t>
+              <a:t>2014-01-29</a:t>
             </a:fld>
             <a:endParaRPr lang="en-US"/>
           </a:p>
@@ -3369,8 +3369,8 @@
         </p:nvSpPr>
         <p:spPr>
           <a:xfrm>
-            <a:off x="677335" y="2700867"/>
-            <a:ext cx="8596668" cy="1826581"/>
+            <a:off x="508001" y="2700868"/>
+            <a:ext cx="6447501" cy="1826581"/>
           </a:xfrm>
         </p:spPr>
         <p:txBody>
@@ -3401,8 +3401,8 @@
         </p:nvSpPr>
         <p:spPr>
           <a:xfrm>
-            <a:off x="677335" y="4527448"/>
-            <a:ext cx="8596668" cy="860400"/>
+            <a:off x="508001" y="4527448"/>
+            <a:ext cx="6447501" cy="860400"/>
           </a:xfrm>
         </p:spPr>
         <p:txBody>
@@ -3526,7 +3526,7 @@
           <a:p>
             <a:fld id="{5C8908A9-1E53-4D85-A76B-A28D8BCB5503}" type="datetimeFigureOut">
               <a:rPr lang="en-US" smtClean="0"/>
-              <a:t>1/27/2014</a:t>
+              <a:t>2014-01-29</a:t>
             </a:fld>
             <a:endParaRPr lang="en-US"/>
           </a:p>
@@ -3639,8 +3639,8 @@
         </p:nvSpPr>
         <p:spPr>
           <a:xfrm>
-            <a:off x="677334" y="2160589"/>
-            <a:ext cx="4184035" cy="3880772"/>
+            <a:off x="508001" y="2160589"/>
+            <a:ext cx="3138026" cy="3880772"/>
           </a:xfrm>
         </p:spPr>
         <p:txBody>
@@ -3696,8 +3696,8 @@
         </p:nvSpPr>
         <p:spPr>
           <a:xfrm>
-            <a:off x="5089970" y="2160589"/>
-            <a:ext cx="4184034" cy="3880773"/>
+            <a:off x="3817477" y="2160590"/>
+            <a:ext cx="3138026" cy="3880773"/>
           </a:xfrm>
         </p:spPr>
         <p:txBody>
@@ -3758,7 +3758,7 @@
           <a:p>
             <a:fld id="{5C8908A9-1E53-4D85-A76B-A28D8BCB5503}" type="datetimeFigureOut">
               <a:rPr lang="en-US" smtClean="0"/>
-              <a:t>1/27/2014</a:t>
+              <a:t>2014-01-29</a:t>
             </a:fld>
             <a:endParaRPr lang="en-US"/>
           </a:p>
@@ -3875,8 +3875,8 @@
         </p:nvSpPr>
         <p:spPr>
           <a:xfrm>
-            <a:off x="675745" y="2160983"/>
-            <a:ext cx="4185623" cy="576262"/>
+            <a:off x="506809" y="2160983"/>
+            <a:ext cx="3139217" cy="576262"/>
           </a:xfrm>
         </p:spPr>
         <p:txBody>
@@ -3942,8 +3942,8 @@
         </p:nvSpPr>
         <p:spPr>
           <a:xfrm>
-            <a:off x="675745" y="2737245"/>
-            <a:ext cx="4185623" cy="3304117"/>
+            <a:off x="506809" y="2737246"/>
+            <a:ext cx="3139217" cy="3304117"/>
           </a:xfrm>
         </p:spPr>
         <p:txBody>
@@ -4001,8 +4001,8 @@
         </p:nvSpPr>
         <p:spPr>
           <a:xfrm>
-            <a:off x="5088383" y="2160983"/>
-            <a:ext cx="4185618" cy="576262"/>
+            <a:off x="3816287" y="2160983"/>
+            <a:ext cx="3139214" cy="576262"/>
           </a:xfrm>
         </p:spPr>
         <p:txBody>
@@ -4068,8 +4068,8 @@
         </p:nvSpPr>
         <p:spPr>
           <a:xfrm>
-            <a:off x="5088384" y="2737245"/>
-            <a:ext cx="4185617" cy="3304117"/>
+            <a:off x="3816288" y="2737246"/>
+            <a:ext cx="3139213" cy="3304117"/>
           </a:xfrm>
         </p:spPr>
         <p:txBody>
@@ -4132,7 +4132,7 @@
           <a:p>
             <a:fld id="{5C8908A9-1E53-4D85-A76B-A28D8BCB5503}" type="datetimeFigureOut">
               <a:rPr lang="en-US" smtClean="0"/>
-              <a:t>1/27/2014</a:t>
+              <a:t>2014-01-29</a:t>
             </a:fld>
             <a:endParaRPr lang="en-US"/>
           </a:p>
@@ -4222,8 +4222,8 @@
         </p:nvSpPr>
         <p:spPr>
           <a:xfrm>
-            <a:off x="677334" y="609600"/>
-            <a:ext cx="8596668" cy="1320800"/>
+            <a:off x="508001" y="609600"/>
+            <a:ext cx="6447501" cy="1320800"/>
           </a:xfrm>
         </p:spPr>
         <p:txBody>
@@ -4255,7 +4255,7 @@
           <a:p>
             <a:fld id="{5C8908A9-1E53-4D85-A76B-A28D8BCB5503}" type="datetimeFigureOut">
               <a:rPr lang="en-US" smtClean="0"/>
-              <a:t>1/27/2014</a:t>
+              <a:t>2014-01-29</a:t>
             </a:fld>
             <a:endParaRPr lang="en-US"/>
           </a:p>
@@ -4350,7 +4350,7 @@
           <a:p>
             <a:fld id="{5C8908A9-1E53-4D85-A76B-A28D8BCB5503}" type="datetimeFigureOut">
               <a:rPr lang="en-US" smtClean="0"/>
-              <a:t>1/27/2014</a:t>
+              <a:t>2014-01-29</a:t>
             </a:fld>
             <a:endParaRPr lang="en-US"/>
           </a:p>
@@ -4440,8 +4440,8 @@
         </p:nvSpPr>
         <p:spPr>
           <a:xfrm>
-            <a:off x="9670039" y="6041362"/>
-            <a:ext cx="911939" cy="365125"/>
+            <a:off x="7252530" y="6041363"/>
+            <a:ext cx="683954" cy="365125"/>
           </a:xfrm>
         </p:spPr>
         <p:txBody>
@@ -4450,7 +4450,7 @@
           <a:p>
             <a:fld id="{5C8908A9-1E53-4D85-A76B-A28D8BCB5503}" type="datetimeFigureOut">
               <a:rPr lang="en-US" smtClean="0"/>
-              <a:t>1/27/2014</a:t>
+              <a:t>2014-01-29</a:t>
             </a:fld>
             <a:endParaRPr lang="en-US" dirty="0"/>
           </a:p>
@@ -4468,8 +4468,8 @@
         </p:nvSpPr>
         <p:spPr>
           <a:xfrm>
-            <a:off x="3142240" y="6041362"/>
-            <a:ext cx="6297612" cy="365125"/>
+            <a:off x="2356680" y="6041363"/>
+            <a:ext cx="4723209" cy="365125"/>
           </a:xfrm>
         </p:spPr>
         <p:txBody>
@@ -4492,8 +4492,8 @@
         </p:nvSpPr>
         <p:spPr>
           <a:xfrm>
-            <a:off x="11055569" y="6041362"/>
-            <a:ext cx="683339" cy="365125"/>
+            <a:off x="8291677" y="6041363"/>
+            <a:ext cx="512504" cy="365125"/>
           </a:xfrm>
         </p:spPr>
         <p:txBody>
@@ -4516,8 +4516,8 @@
         </p:nvGrpSpPr>
         <p:grpSpPr>
           <a:xfrm flipH="1">
-            <a:off x="-1224508" y="-8467"/>
-            <a:ext cx="13416502" cy="6866467"/>
+            <a:off x="-918381" y="-8467"/>
+            <a:ext cx="10062377" cy="6866467"/>
             <a:chOff x="-1216551" y="-8467"/>
             <a:chExt cx="13416502" cy="6866467"/>
           </a:xfrm>
@@ -5080,8 +5080,8 @@
         </p:nvSpPr>
         <p:spPr>
           <a:xfrm>
-            <a:off x="677334" y="1498604"/>
-            <a:ext cx="3854528" cy="1278466"/>
+            <a:off x="508001" y="1498604"/>
+            <a:ext cx="2890896" cy="1278466"/>
           </a:xfrm>
         </p:spPr>
         <p:txBody>
@@ -5114,8 +5114,8 @@
         </p:nvSpPr>
         <p:spPr>
           <a:xfrm>
-            <a:off x="4760461" y="514924"/>
-            <a:ext cx="4513541" cy="5526437"/>
+            <a:off x="3570346" y="514925"/>
+            <a:ext cx="3385156" cy="5526437"/>
           </a:xfrm>
         </p:spPr>
         <p:txBody>
@@ -5173,8 +5173,8 @@
         </p:nvSpPr>
         <p:spPr>
           <a:xfrm>
-            <a:off x="677334" y="2777069"/>
-            <a:ext cx="3854528" cy="2584449"/>
+            <a:off x="508001" y="2777069"/>
+            <a:ext cx="2890896" cy="2584449"/>
           </a:xfrm>
         </p:spPr>
         <p:txBody>
@@ -5245,7 +5245,7 @@
           <a:p>
             <a:fld id="{5C8908A9-1E53-4D85-A76B-A28D8BCB5503}" type="datetimeFigureOut">
               <a:rPr lang="en-US" smtClean="0"/>
-              <a:t>1/27/2014</a:t>
+              <a:t>2014-01-29</a:t>
             </a:fld>
             <a:endParaRPr lang="en-US"/>
           </a:p>
@@ -5356,7 +5356,7 @@
         <p:grpSpPr>
           <a:xfrm>
             <a:off x="-3" y="-8467"/>
-            <a:ext cx="13416502" cy="6866467"/>
+            <a:ext cx="10062377" cy="6866467"/>
             <a:chOff x="-1216551" y="-8467"/>
             <a:chExt cx="13416502" cy="6866467"/>
           </a:xfrm>
@@ -5889,8 +5889,8 @@
         </p:nvSpPr>
         <p:spPr>
           <a:xfrm>
-            <a:off x="677334" y="609600"/>
-            <a:ext cx="8596668" cy="1320800"/>
+            <a:off x="508001" y="609600"/>
+            <a:ext cx="6447501" cy="1320800"/>
           </a:xfrm>
           <a:prstGeom prst="rect">
             <a:avLst/>
@@ -5922,8 +5922,8 @@
         </p:nvSpPr>
         <p:spPr>
           <a:xfrm>
-            <a:off x="677334" y="2160589"/>
-            <a:ext cx="8596668" cy="3880773"/>
+            <a:off x="508001" y="2160590"/>
+            <a:ext cx="6447501" cy="3880773"/>
           </a:xfrm>
           <a:prstGeom prst="rect">
             <a:avLst/>
@@ -5984,8 +5984,8 @@
         </p:nvSpPr>
         <p:spPr>
           <a:xfrm>
-            <a:off x="7205133" y="6041362"/>
-            <a:ext cx="911939" cy="365125"/>
+            <a:off x="5403850" y="6041363"/>
+            <a:ext cx="683954" cy="365125"/>
           </a:xfrm>
           <a:prstGeom prst="rect">
             <a:avLst/>
@@ -6007,7 +6007,7 @@
           <a:p>
             <a:fld id="{5C8908A9-1E53-4D85-A76B-A28D8BCB5503}" type="datetimeFigureOut">
               <a:rPr lang="en-US" smtClean="0"/>
-              <a:t>1/27/2014</a:t>
+              <a:t>2014-01-29</a:t>
             </a:fld>
             <a:endParaRPr lang="en-US"/>
           </a:p>
@@ -6025,8 +6025,8 @@
         </p:nvSpPr>
         <p:spPr>
           <a:xfrm>
-            <a:off x="677334" y="6041362"/>
-            <a:ext cx="6297612" cy="365125"/>
+            <a:off x="508001" y="6041363"/>
+            <a:ext cx="4723209" cy="365125"/>
           </a:xfrm>
           <a:prstGeom prst="rect">
             <a:avLst/>
@@ -6062,8 +6062,8 @@
         </p:nvSpPr>
         <p:spPr>
           <a:xfrm>
-            <a:off x="8590663" y="6041362"/>
-            <a:ext cx="683339" cy="365125"/>
+            <a:off x="6442998" y="6041363"/>
+            <a:ext cx="512504" cy="365125"/>
           </a:xfrm>
           <a:prstGeom prst="rect">
             <a:avLst/>
@@ -6547,8 +6547,8 @@
         </p:nvSpPr>
         <p:spPr>
           <a:xfrm>
-            <a:off x="1507067" y="2898145"/>
-            <a:ext cx="7766936" cy="1646302"/>
+            <a:off x="1130300" y="2898145"/>
+            <a:ext cx="5825202" cy="1646302"/>
           </a:xfrm>
         </p:spPr>
         <p:txBody>
@@ -6589,8 +6589,8 @@
         </p:nvSpPr>
         <p:spPr>
           <a:xfrm>
-            <a:off x="1507067" y="4544447"/>
-            <a:ext cx="7766936" cy="1096899"/>
+            <a:off x="1130300" y="4544448"/>
+            <a:ext cx="5825202" cy="1096899"/>
           </a:xfrm>
         </p:spPr>
         <p:txBody>
@@ -6622,7 +6622,7 @@
   <p:timing>
     <p:tnLst>
       <p:par>
-        <p:cTn id="1" dur="indefinite" restart="never" nodeType="tmRoot"/>
+        <p:cTn xmlns:p14="http://schemas.microsoft.com/office/powerpoint/2010/main" id="1" dur="indefinite" restart="never" nodeType="tmRoot"/>
       </p:par>
     </p:tnLst>
   </p:timing>
@@ -6659,7 +6659,12 @@
             </p:custDataLst>
           </p:nvPr>
         </p:nvSpPr>
-        <p:spPr/>
+        <p:spPr>
+          <a:xfrm>
+            <a:off x="478118" y="430306"/>
+            <a:ext cx="7231528" cy="1320800"/>
+          </a:xfrm>
+        </p:spPr>
         <p:txBody>
           <a:bodyPr/>
           <a:lstStyle/>
@@ -6687,13 +6692,13 @@
         </p:nvSpPr>
         <p:spPr>
           <a:xfrm>
-            <a:off x="5936355" y="1270566"/>
-            <a:ext cx="5578050" cy="5487551"/>
+            <a:off x="4452266" y="1270566"/>
+            <a:ext cx="4183538" cy="5487551"/>
           </a:xfrm>
         </p:spPr>
         <p:txBody>
           <a:bodyPr>
-            <a:normAutofit lnSpcReduction="10000"/>
+            <a:normAutofit fontScale="92500" lnSpcReduction="10000"/>
           </a:bodyPr>
           <a:lstStyle/>
           <a:p>
@@ -6705,15 +6710,7 @@
           <a:p>
             <a:r>
               <a:rPr lang="fr-CA" dirty="0" smtClean="0"/>
-              <a:t>La courbe rouge présente le courant dans l’électroaimant </a:t>
-            </a:r>
-            <a:r>
-              <a:rPr lang="fr-CA" dirty="0" smtClean="0"/>
-              <a:t>contrôlé </a:t>
-            </a:r>
-            <a:r>
-              <a:rPr lang="fr-CA" dirty="0" smtClean="0"/>
-              <a:t>par le convertisseur CC-CC 4 quadrants.</a:t>
+              <a:t>La courbe rouge présente le courant dans l’électroaimant contrôlé par le convertisseur CC-CC 4 quadrants.</a:t>
             </a:r>
           </a:p>
           <a:p>
@@ -6726,15 +6723,7 @@
           <a:p>
             <a:r>
               <a:rPr lang="fr-CA" dirty="0" smtClean="0"/>
-              <a:t>La courbe </a:t>
-            </a:r>
-            <a:r>
-              <a:rPr lang="fr-CA" dirty="0" smtClean="0"/>
-              <a:t>vert </a:t>
-            </a:r>
-            <a:r>
-              <a:rPr lang="fr-CA" dirty="0" smtClean="0"/>
-              <a:t>foncée représente la tension aux bornes de l’aimant</a:t>
+              <a:t>La courbe vert foncée représente la tension aux bornes de l’aimant</a:t>
             </a:r>
           </a:p>
           <a:p>
@@ -6747,15 +6736,7 @@
           <a:p>
             <a:r>
               <a:rPr lang="fr-CA" dirty="0" smtClean="0"/>
-              <a:t>La courbe </a:t>
-            </a:r>
-            <a:r>
-              <a:rPr lang="fr-CA" dirty="0" smtClean="0"/>
-              <a:t>vert </a:t>
-            </a:r>
-            <a:r>
-              <a:rPr lang="fr-CA" dirty="0" smtClean="0"/>
-              <a:t>pâle représente la tension aux bornes du condensateur</a:t>
+              <a:t>La courbe vert pâle représente la tension aux bornes du condensateur</a:t>
             </a:r>
           </a:p>
           <a:p>
@@ -6792,8 +6773,8 @@
         </p:blipFill>
         <p:spPr>
           <a:xfrm>
-            <a:off x="453154" y="1488935"/>
-            <a:ext cx="5186995" cy="4191674"/>
+            <a:off x="339866" y="1488935"/>
+            <a:ext cx="3890246" cy="4191674"/>
           </a:xfrm>
           <a:prstGeom prst="rect">
             <a:avLst/>
@@ -6817,8 +6798,8 @@
         </p:nvSpPr>
         <p:spPr>
           <a:xfrm>
-            <a:off x="2354075" y="5806657"/>
-            <a:ext cx="1400576" cy="276999"/>
+            <a:off x="1765556" y="5806658"/>
+            <a:ext cx="1403900" cy="276999"/>
           </a:xfrm>
           <a:prstGeom prst="rect">
             <a:avLst/>
@@ -6856,7 +6837,7 @@
   <p:timing>
     <p:tnLst>
       <p:par>
-        <p:cTn id="1" dur="indefinite" restart="never" nodeType="tmRoot"/>
+        <p:cTn xmlns:p14="http://schemas.microsoft.com/office/powerpoint/2010/main" id="1" dur="indefinite" restart="never" nodeType="tmRoot"/>
       </p:par>
     </p:tnLst>
   </p:timing>
@@ -6921,13 +6902,13 @@
         </p:nvSpPr>
         <p:spPr>
           <a:xfrm>
-            <a:off x="677334" y="1360489"/>
-            <a:ext cx="8596668" cy="5497511"/>
+            <a:off x="508001" y="1360490"/>
+            <a:ext cx="6447501" cy="5497511"/>
           </a:xfrm>
         </p:spPr>
         <p:txBody>
           <a:bodyPr>
-            <a:normAutofit lnSpcReduction="10000"/>
+            <a:normAutofit fontScale="92500" lnSpcReduction="20000"/>
           </a:bodyPr>
           <a:lstStyle/>
           <a:p>
@@ -6981,39 +6962,7 @@
             <a:pPr marL="1200150" lvl="3" indent="-342900"/>
             <a:r>
               <a:rPr lang="fr-CA" dirty="0" smtClean="0"/>
-              <a:t>Outil de simulation générique. </a:t>
-            </a:r>
-            <a:r>
-              <a:rPr lang="fr-CA" dirty="0" smtClean="0"/>
-              <a:t>Permets </a:t>
-            </a:r>
-            <a:r>
-              <a:rPr lang="fr-CA" dirty="0" smtClean="0"/>
-              <a:t>de simuler tout type de circuits, toutefois ce côté générique cause des temps de simulation beaucoup plus </a:t>
-            </a:r>
-            <a:r>
-              <a:rPr lang="fr-CA" dirty="0" smtClean="0"/>
-              <a:t>longs </a:t>
-            </a:r>
-            <a:r>
-              <a:rPr lang="fr-CA" dirty="0" smtClean="0"/>
-              <a:t>pour une même précision </a:t>
-            </a:r>
-            <a:r>
-              <a:rPr lang="fr-CA" dirty="0" smtClean="0"/>
-              <a:t>comparée </a:t>
-            </a:r>
-            <a:r>
-              <a:rPr lang="fr-CA" dirty="0" smtClean="0"/>
-              <a:t>à des simulateurs </a:t>
-            </a:r>
-            <a:r>
-              <a:rPr lang="fr-CA" dirty="0" smtClean="0"/>
-              <a:t>spécifiques. </a:t>
-            </a:r>
-            <a:r>
-              <a:rPr lang="fr-CA" dirty="0" smtClean="0"/>
-              <a:t>Problématique au niveau des variations rapides.</a:t>
+              <a:t>Outil de simulation générique. Permets de simuler tout type de circuits, toutefois ce côté générique cause des temps de simulation beaucoup plus longs pour une même précision comparée à des simulateurs spécifiques. Problématique au niveau des variations rapides.</a:t>
             </a:r>
           </a:p>
           <a:p>
@@ -7078,15 +7027,7 @@
             <a:pPr marL="1200150" lvl="3" indent="-342900"/>
             <a:r>
               <a:rPr lang="fr-CA" dirty="0" smtClean="0"/>
-              <a:t>Simulateur en </a:t>
-            </a:r>
-            <a:r>
-              <a:rPr lang="fr-CA" dirty="0" smtClean="0"/>
-              <a:t>temps réel, </a:t>
-            </a:r>
-            <a:r>
-              <a:rPr lang="fr-CA" dirty="0" smtClean="0"/>
-              <a:t>permet une comparaison directe avec le procédé implanté. Meilleur pour </a:t>
+              <a:t>Simulateur en temps réel, permet une comparaison directe avec le procédé implanté. Meilleur pour </a:t>
             </a:r>
             <a:r>
               <a:rPr lang="fr-CA" dirty="0"/>
@@ -7094,23 +7035,7 @@
             </a:r>
             <a:r>
               <a:rPr lang="fr-CA" dirty="0" smtClean="0"/>
-              <a:t>es tests d’intégration (Pas de simulation : &gt; 10 µs dans le cas du HYPERSIM). </a:t>
-            </a:r>
-            <a:r>
-              <a:rPr lang="fr-CA" dirty="0" smtClean="0"/>
-              <a:t>Permets </a:t>
-            </a:r>
-            <a:r>
-              <a:rPr lang="fr-CA" dirty="0" smtClean="0"/>
-              <a:t>de réaliser une simulation en </a:t>
-            </a:r>
-            <a:r>
-              <a:rPr lang="fr-CA" dirty="0" smtClean="0"/>
-              <a:t>temps réel </a:t>
-            </a:r>
-            <a:r>
-              <a:rPr lang="fr-CA" dirty="0" smtClean="0"/>
-              <a:t>à partir d’un fichier de simulation Matlab.</a:t>
+              <a:t>es tests d’intégration (Pas de simulation : &gt; 10 µs dans le cas du HYPERSIM). Permets de réaliser une simulation en temps réel à partir d’un fichier de simulation Matlab.</a:t>
             </a:r>
           </a:p>
           <a:p>
@@ -7139,7 +7064,7 @@
   <p:timing>
     <p:tnLst>
       <p:par>
-        <p:cTn id="1" dur="indefinite" restart="never" nodeType="tmRoot"/>
+        <p:cTn xmlns:p14="http://schemas.microsoft.com/office/powerpoint/2010/main" id="1" dur="indefinite" restart="never" nodeType="tmRoot"/>
       </p:par>
     </p:tnLst>
   </p:timing>
@@ -7204,8 +7129,8 @@
         </p:nvSpPr>
         <p:spPr>
           <a:xfrm>
-            <a:off x="677334" y="1360489"/>
-            <a:ext cx="8596668" cy="5173661"/>
+            <a:off x="508001" y="1360490"/>
+            <a:ext cx="6447501" cy="5173661"/>
           </a:xfrm>
         </p:spPr>
         <p:txBody>
@@ -7328,7 +7253,7 @@
   <p:timing>
     <p:tnLst>
       <p:par>
-        <p:cTn id="1" dur="indefinite" restart="never" nodeType="tmRoot"/>
+        <p:cTn xmlns:p14="http://schemas.microsoft.com/office/powerpoint/2010/main" id="1" dur="indefinite" restart="never" nodeType="tmRoot"/>
       </p:par>
     </p:tnLst>
   </p:timing>
@@ -7397,8 +7322,8 @@
         </p:nvSpPr>
         <p:spPr>
           <a:xfrm>
-            <a:off x="677334" y="1801726"/>
-            <a:ext cx="10811388" cy="5419942"/>
+            <a:off x="298827" y="1801726"/>
+            <a:ext cx="8108541" cy="5419942"/>
           </a:xfrm>
         </p:spPr>
         <p:txBody>
@@ -7471,7 +7396,7 @@
   <p:timing>
     <p:tnLst>
       <p:par>
-        <p:cTn id="1" dur="indefinite" restart="never" nodeType="tmRoot"/>
+        <p:cTn xmlns:p14="http://schemas.microsoft.com/office/powerpoint/2010/main" id="1" dur="indefinite" restart="never" nodeType="tmRoot"/>
       </p:par>
     </p:tnLst>
   </p:timing>
@@ -7540,13 +7465,13 @@
         </p:nvSpPr>
         <p:spPr>
           <a:xfrm>
-            <a:off x="677333" y="1683575"/>
-            <a:ext cx="9378989" cy="4932595"/>
+            <a:off x="508000" y="1653694"/>
+            <a:ext cx="7034242" cy="4932595"/>
           </a:xfrm>
         </p:spPr>
         <p:txBody>
           <a:bodyPr>
-            <a:normAutofit/>
+            <a:normAutofit fontScale="92500"/>
           </a:bodyPr>
           <a:lstStyle/>
           <a:p>
@@ -7625,6 +7550,13 @@
   <p:clrMapOvr>
     <a:masterClrMapping/>
   </p:clrMapOvr>
+  <p:timing>
+    <p:tnLst>
+      <p:par>
+        <p:cTn xmlns:p14="http://schemas.microsoft.com/office/powerpoint/2010/main" id="1" dur="indefinite" restart="never" nodeType="tmRoot"/>
+      </p:par>
+    </p:tnLst>
+  </p:timing>
 </p:sld>
 </file>
 
@@ -7699,7 +7631,7 @@
         <p:spPr/>
         <p:txBody>
           <a:bodyPr>
-            <a:normAutofit fontScale="92500" lnSpcReduction="10000"/>
+            <a:normAutofit fontScale="92500" lnSpcReduction="20000"/>
           </a:bodyPr>
           <a:lstStyle/>
           <a:p>
@@ -7824,7 +7756,7 @@
   <p:timing>
     <p:tnLst>
       <p:par>
-        <p:cTn id="1" dur="indefinite" restart="never" nodeType="tmRoot"/>
+        <p:cTn xmlns:p14="http://schemas.microsoft.com/office/powerpoint/2010/main" id="1" dur="indefinite" restart="never" nodeType="tmRoot"/>
       </p:par>
     </p:tnLst>
   </p:timing>
@@ -7889,13 +7821,13 @@
         </p:nvSpPr>
         <p:spPr>
           <a:xfrm>
-            <a:off x="573965" y="1314373"/>
-            <a:ext cx="9925368" cy="5543627"/>
+            <a:off x="430474" y="1314374"/>
+            <a:ext cx="7444026" cy="5543627"/>
           </a:xfrm>
         </p:spPr>
         <p:txBody>
           <a:bodyPr>
-            <a:normAutofit lnSpcReduction="10000"/>
+            <a:normAutofit fontScale="92500" lnSpcReduction="20000"/>
           </a:bodyPr>
           <a:lstStyle/>
           <a:p>
@@ -8010,6 +7942,13 @@
   <p:clrMapOvr>
     <a:masterClrMapping/>
   </p:clrMapOvr>
+  <p:timing>
+    <p:tnLst>
+      <p:par>
+        <p:cTn xmlns:p14="http://schemas.microsoft.com/office/powerpoint/2010/main" id="1" dur="indefinite" restart="never" nodeType="tmRoot"/>
+      </p:par>
+    </p:tnLst>
+  </p:timing>
 </p:sld>
 </file>
 
@@ -8080,7 +8019,7 @@
         <p:spPr/>
         <p:txBody>
           <a:bodyPr>
-            <a:normAutofit lnSpcReduction="10000"/>
+            <a:normAutofit fontScale="85000" lnSpcReduction="20000"/>
           </a:bodyPr>
           <a:lstStyle/>
           <a:p>
@@ -8136,6 +8075,13 @@
   <p:clrMapOvr>
     <a:masterClrMapping/>
   </p:clrMapOvr>
+  <p:timing>
+    <p:tnLst>
+      <p:par>
+        <p:cTn xmlns:p14="http://schemas.microsoft.com/office/powerpoint/2010/main" id="1" dur="indefinite" restart="never" nodeType="tmRoot"/>
+      </p:par>
+    </p:tnLst>
+  </p:timing>
 </p:sld>
 </file>
 
@@ -8213,8 +8159,8 @@
         </p:blipFill>
         <p:spPr bwMode="auto">
           <a:xfrm>
-            <a:off x="1193800" y="1930400"/>
-            <a:ext cx="9245600" cy="4720393"/>
+            <a:off x="895350" y="1930401"/>
+            <a:ext cx="6934200" cy="4720393"/>
           </a:xfrm>
           <a:prstGeom prst="rect">
             <a:avLst/>
@@ -8230,7 +8176,7 @@
           </a:ln>
           <a:extLst>
             <a:ext uri="{909E8E84-426E-40dd-AFC4-6F175D3DCCD1}">
-              <a14:hiddenFill xmlns:a14="http://schemas.microsoft.com/office/drawing/2010/main" xmlns="">
+              <a14:hiddenFill xmlns:a14="http://schemas.microsoft.com/office/drawing/2010/main">
                 <a:solidFill>
                   <a:srgbClr val="FFFFFF"/>
                 </a:solidFill>
@@ -8253,8 +8199,8 @@
         </p:nvSpPr>
         <p:spPr>
           <a:xfrm>
-            <a:off x="1200476" y="1426029"/>
-            <a:ext cx="9238924" cy="1320800"/>
+            <a:off x="900357" y="1426029"/>
+            <a:ext cx="6929193" cy="1320800"/>
           </a:xfrm>
           <a:prstGeom prst="rect">
             <a:avLst/>
@@ -8375,6 +8321,13 @@
   <p:clrMapOvr>
     <a:masterClrMapping/>
   </p:clrMapOvr>
+  <p:timing>
+    <p:tnLst>
+      <p:par>
+        <p:cTn xmlns:p14="http://schemas.microsoft.com/office/powerpoint/2010/main" id="1" dur="indefinite" restart="never" nodeType="tmRoot"/>
+      </p:par>
+    </p:tnLst>
+  </p:timing>
 </p:sld>
 </file>
 
@@ -8410,8 +8363,8 @@
         </p:nvSpPr>
         <p:spPr>
           <a:xfrm>
-            <a:off x="677334" y="609600"/>
-            <a:ext cx="8596668" cy="1320800"/>
+            <a:off x="508001" y="609600"/>
+            <a:ext cx="6447501" cy="1320800"/>
           </a:xfrm>
         </p:spPr>
         <p:txBody>
@@ -8442,8 +8395,8 @@
         </p:nvGrpSpPr>
         <p:grpSpPr>
           <a:xfrm>
-            <a:off x="304799" y="1473201"/>
-            <a:ext cx="11774931" cy="5149850"/>
+            <a:off x="228600" y="1473201"/>
+            <a:ext cx="8831198" cy="5149850"/>
             <a:chOff x="304799" y="1473201"/>
             <a:chExt cx="11774931" cy="5149850"/>
           </a:xfrm>
@@ -8484,7 +8437,7 @@
             <a:noFill/>
             <a:extLst>
               <a:ext uri="{909E8E84-426E-40dd-AFC4-6F175D3DCCD1}">
-                <a14:hiddenFill xmlns:a14="http://schemas.microsoft.com/office/drawing/2010/main" xmlns="">
+                <a14:hiddenFill xmlns:a14="http://schemas.microsoft.com/office/drawing/2010/main">
                   <a:solidFill>
                     <a:srgbClr val="FFFFFF"/>
                   </a:solidFill>
@@ -8529,7 +8482,7 @@
             <a:noFill/>
             <a:extLst>
               <a:ext uri="{909E8E84-426E-40dd-AFC4-6F175D3DCCD1}">
-                <a14:hiddenFill xmlns:a14="http://schemas.microsoft.com/office/drawing/2010/main" xmlns="">
+                <a14:hiddenFill xmlns:a14="http://schemas.microsoft.com/office/drawing/2010/main">
                   <a:solidFill>
                     <a:srgbClr val="FFFFFF"/>
                   </a:solidFill>
@@ -8549,6 +8502,13 @@
   <p:clrMapOvr>
     <a:masterClrMapping/>
   </p:clrMapOvr>
+  <p:timing>
+    <p:tnLst>
+      <p:par>
+        <p:cTn xmlns:p14="http://schemas.microsoft.com/office/powerpoint/2010/main" id="1" dur="indefinite" restart="never" nodeType="tmRoot"/>
+      </p:par>
+    </p:tnLst>
+  </p:timing>
 </p:sld>
 </file>
 
@@ -8610,12 +8570,14 @@
         </p:nvSpPr>
         <p:spPr>
           <a:xfrm>
-            <a:off x="4779748" y="1398354"/>
-            <a:ext cx="6236753" cy="4842773"/>
+            <a:off x="3584811" y="1398355"/>
+            <a:ext cx="4677565" cy="4842773"/>
           </a:xfrm>
         </p:spPr>
         <p:txBody>
-          <a:bodyPr/>
+          <a:bodyPr>
+            <a:normAutofit fontScale="92500" lnSpcReduction="20000"/>
+          </a:bodyPr>
           <a:lstStyle/>
           <a:p>
             <a:r>
@@ -8627,7 +8589,15 @@
             <a:pPr lvl="1"/>
             <a:r>
               <a:rPr lang="fr-CA" dirty="0" smtClean="0"/>
-              <a:t>Le CERN est situé en Suisse (Genève)</a:t>
+              <a:t>Le CERN est situé </a:t>
+            </a:r>
+            <a:r>
+              <a:rPr lang="fr-CA" dirty="0" smtClean="0"/>
+              <a:t>à la frontière Franco-Suisse </a:t>
+            </a:r>
+            <a:r>
+              <a:rPr lang="fr-CA" dirty="0" smtClean="0"/>
+              <a:t>(Genève)</a:t>
             </a:r>
           </a:p>
           <a:p>
@@ -8647,35 +8617,40 @@
             <a:pPr lvl="1"/>
             <a:r>
               <a:rPr lang="fr-CA" dirty="0" smtClean="0"/>
-              <a:t>simulation de réseaux électriques;</a:t>
+              <a:t>modélisation </a:t>
+            </a:r>
+            <a:r>
+              <a:rPr lang="fr-CA" dirty="0" smtClean="0"/>
+              <a:t>et conception de machines électriques;</a:t>
             </a:r>
           </a:p>
           <a:p>
             <a:pPr lvl="1"/>
             <a:r>
               <a:rPr lang="fr-CA" dirty="0" smtClean="0"/>
-              <a:t>modélisation et conception de machines électriques;</a:t>
+              <a:t>modélisation et conception de convertisseurs d’électronique de puissance</a:t>
+            </a:r>
+            <a:r>
+              <a:rPr lang="fr-CA" dirty="0" smtClean="0"/>
+              <a:t>.</a:t>
             </a:r>
           </a:p>
           <a:p>
             <a:pPr lvl="1"/>
             <a:r>
+              <a:rPr lang="fr-CA" dirty="0"/>
+              <a:t>simulation et commande des réseaux électriques</a:t>
+            </a:r>
+            <a:r>
               <a:rPr lang="fr-CA" dirty="0" smtClean="0"/>
-              <a:t>modélisation et conception de convertisseurs d’électronique de puissance.</a:t>
-            </a:r>
+              <a:t>;</a:t>
+            </a:r>
+            <a:endParaRPr lang="fr-CA" dirty="0" smtClean="0"/>
           </a:p>
           <a:p>
             <a:r>
               <a:rPr lang="fr-CA" dirty="0" smtClean="0"/>
-              <a:t>OPAL-RT est une compagnie spécialisée dans </a:t>
-            </a:r>
-            <a:r>
-              <a:rPr lang="fr-CA" dirty="0" smtClean="0"/>
-              <a:t>le </a:t>
-            </a:r>
-            <a:r>
-              <a:rPr lang="fr-CA" dirty="0" smtClean="0"/>
-              <a:t>développement de simulateurs temps réel PC/FPGA</a:t>
+              <a:t>OPAL-RT est une compagnie spécialisée dans le développement de simulateurs temps réel PC/FPGA</a:t>
             </a:r>
           </a:p>
           <a:p>
@@ -8712,8 +8687,8 @@
         </p:blipFill>
         <p:spPr bwMode="auto">
           <a:xfrm>
-            <a:off x="1200351" y="3498478"/>
-            <a:ext cx="434975" cy="489522"/>
+            <a:off x="1318618" y="4006477"/>
+            <a:ext cx="549029" cy="823839"/>
           </a:xfrm>
           <a:prstGeom prst="rect">
             <a:avLst/>
@@ -8754,8 +8729,8 @@
         </p:blipFill>
         <p:spPr bwMode="auto">
           <a:xfrm>
-            <a:off x="1867380" y="3512747"/>
-            <a:ext cx="1833298" cy="412750"/>
+            <a:off x="1176415" y="3243804"/>
+            <a:ext cx="2085227" cy="625959"/>
           </a:xfrm>
           <a:prstGeom prst="rect">
             <a:avLst/>
@@ -8766,14 +8741,14 @@
           </a:ln>
           <a:extLst>
             <a:ext uri="{909E8E84-426E-40dd-AFC4-6F175D3DCCD1}">
-              <a14:hiddenFill xmlns:a14="http://schemas.microsoft.com/office/drawing/2010/main" xmlns="">
+              <a14:hiddenFill xmlns:a14="http://schemas.microsoft.com/office/drawing/2010/main">
                 <a:solidFill>
                   <a:srgbClr val="FFFFFF"/>
                 </a:solidFill>
               </a14:hiddenFill>
             </a:ext>
             <a:ext uri="{91240B29-F687-4f45-9708-019B960494DF}">
-              <a14:hiddenLine xmlns:a14="http://schemas.microsoft.com/office/drawing/2010/main" xmlns="" w="9525">
+              <a14:hiddenLine xmlns:a14="http://schemas.microsoft.com/office/drawing/2010/main" w="9525">
                 <a:solidFill>
                   <a:srgbClr val="000000"/>
                 </a:solidFill>
@@ -8805,8 +8780,8 @@
         </p:blipFill>
         <p:spPr>
           <a:xfrm>
-            <a:off x="3927588" y="3441402"/>
-            <a:ext cx="655695" cy="606423"/>
+            <a:off x="2392869" y="4009167"/>
+            <a:ext cx="699955" cy="863143"/>
           </a:xfrm>
           <a:prstGeom prst="rect">
             <a:avLst/>
@@ -8825,7 +8800,7 @@
         </p:nvSpPr>
         <p:spPr>
           <a:xfrm>
-            <a:off x="1441278" y="2639750"/>
+            <a:off x="737312" y="2639750"/>
             <a:ext cx="2903359" cy="523220"/>
           </a:xfrm>
           <a:prstGeom prst="rect">
@@ -8860,7 +8835,7 @@
   <p:timing>
     <p:tnLst>
       <p:par>
-        <p:cTn id="1" dur="indefinite" restart="never" nodeType="tmRoot"/>
+        <p:cTn xmlns:p14="http://schemas.microsoft.com/office/powerpoint/2010/main" id="1" dur="indefinite" restart="never" nodeType="tmRoot"/>
       </p:par>
     </p:tnLst>
   </p:timing>
@@ -8933,8 +8908,8 @@
         </p:nvSpPr>
         <p:spPr>
           <a:xfrm flipH="1">
-            <a:off x="4806735" y="-989472"/>
-            <a:ext cx="3521850" cy="4179537"/>
+            <a:off x="3605051" y="-989472"/>
+            <a:ext cx="2641388" cy="369332"/>
           </a:xfrm>
           <a:prstGeom prst="rect">
             <a:avLst/>
@@ -8977,8 +8952,8 @@
         </p:blipFill>
         <p:spPr>
           <a:xfrm>
-            <a:off x="343790" y="1314373"/>
-            <a:ext cx="9839897" cy="4982184"/>
+            <a:off x="257843" y="1314373"/>
+            <a:ext cx="7379923" cy="4982184"/>
           </a:xfrm>
           <a:prstGeom prst="rect">
             <a:avLst/>
@@ -8995,6 +8970,13 @@
   <p:clrMapOvr>
     <a:masterClrMapping/>
   </p:clrMapOvr>
+  <p:timing>
+    <p:tnLst>
+      <p:par>
+        <p:cTn xmlns:p14="http://schemas.microsoft.com/office/powerpoint/2010/main" id="1" dur="indefinite" restart="never" nodeType="tmRoot"/>
+      </p:par>
+    </p:tnLst>
+  </p:timing>
 </p:sld>
 </file>
 
@@ -9028,7 +9010,12 @@
             </p:custDataLst>
           </p:nvPr>
         </p:nvSpPr>
-        <p:spPr/>
+        <p:spPr>
+          <a:xfrm>
+            <a:off x="313767" y="609600"/>
+            <a:ext cx="7739529" cy="1320800"/>
+          </a:xfrm>
+        </p:spPr>
         <p:txBody>
           <a:bodyPr>
             <a:normAutofit fontScale="90000"/>
@@ -9066,13 +9053,13 @@
         </p:nvSpPr>
         <p:spPr>
           <a:xfrm>
-            <a:off x="618265" y="1835687"/>
-            <a:ext cx="10087805" cy="4810020"/>
+            <a:off x="463699" y="1835687"/>
+            <a:ext cx="7565854" cy="4810020"/>
           </a:xfrm>
         </p:spPr>
         <p:txBody>
           <a:bodyPr>
-            <a:normAutofit lnSpcReduction="10000"/>
+            <a:normAutofit fontScale="92500" lnSpcReduction="10000"/>
           </a:bodyPr>
           <a:lstStyle/>
           <a:p>
@@ -9156,6 +9143,13 @@
   <p:clrMapOvr>
     <a:masterClrMapping/>
   </p:clrMapOvr>
+  <p:timing>
+    <p:tnLst>
+      <p:par>
+        <p:cTn xmlns:p14="http://schemas.microsoft.com/office/powerpoint/2010/main" id="1" dur="indefinite" restart="never" nodeType="tmRoot"/>
+      </p:par>
+    </p:tnLst>
+  </p:timing>
 </p:sld>
 </file>
 
@@ -9189,7 +9183,12 @@
             </p:custDataLst>
           </p:nvPr>
         </p:nvSpPr>
-        <p:spPr/>
+        <p:spPr>
+          <a:xfrm>
+            <a:off x="89649" y="594659"/>
+            <a:ext cx="7814234" cy="1320800"/>
+          </a:xfrm>
+        </p:spPr>
         <p:txBody>
           <a:bodyPr>
             <a:normAutofit fontScale="90000"/>
@@ -9227,8 +9226,8 @@
         </p:nvSpPr>
         <p:spPr>
           <a:xfrm>
-            <a:off x="618265" y="1835687"/>
-            <a:ext cx="10087805" cy="4810020"/>
+            <a:off x="463699" y="1835687"/>
+            <a:ext cx="7565854" cy="4810020"/>
           </a:xfrm>
         </p:spPr>
         <p:txBody>
@@ -9371,6 +9370,13 @@
   <p:clrMapOvr>
     <a:masterClrMapping/>
   </p:clrMapOvr>
+  <p:timing>
+    <p:tnLst>
+      <p:par>
+        <p:cTn xmlns:p14="http://schemas.microsoft.com/office/powerpoint/2010/main" id="1" dur="indefinite" restart="never" nodeType="tmRoot"/>
+      </p:par>
+    </p:tnLst>
+  </p:timing>
 </p:sld>
 </file>
 
@@ -9404,7 +9410,12 @@
             </p:custDataLst>
           </p:nvPr>
         </p:nvSpPr>
-        <p:spPr/>
+        <p:spPr>
+          <a:xfrm>
+            <a:off x="104594" y="609600"/>
+            <a:ext cx="7933764" cy="1320800"/>
+          </a:xfrm>
+        </p:spPr>
         <p:txBody>
           <a:bodyPr>
             <a:normAutofit fontScale="90000"/>
@@ -9442,13 +9453,13 @@
         </p:nvSpPr>
         <p:spPr>
           <a:xfrm>
-            <a:off x="618265" y="1835687"/>
-            <a:ext cx="10087805" cy="4810020"/>
+            <a:off x="463699" y="1835687"/>
+            <a:ext cx="7565854" cy="4810020"/>
           </a:xfrm>
         </p:spPr>
         <p:txBody>
           <a:bodyPr>
-            <a:normAutofit lnSpcReduction="10000"/>
+            <a:normAutofit fontScale="85000" lnSpcReduction="10000"/>
           </a:bodyPr>
           <a:lstStyle/>
           <a:p>
@@ -9525,6 +9536,13 @@
   <p:clrMapOvr>
     <a:masterClrMapping/>
   </p:clrMapOvr>
+  <p:timing>
+    <p:tnLst>
+      <p:par>
+        <p:cTn xmlns:p14="http://schemas.microsoft.com/office/powerpoint/2010/main" id="1" dur="indefinite" restart="never" nodeType="tmRoot"/>
+      </p:par>
+    </p:tnLst>
+  </p:timing>
 </p:sld>
 </file>
 
@@ -9558,7 +9576,12 @@
             </p:custDataLst>
           </p:nvPr>
         </p:nvSpPr>
-        <p:spPr/>
+        <p:spPr>
+          <a:xfrm>
+            <a:off x="328708" y="609600"/>
+            <a:ext cx="7694705" cy="1320800"/>
+          </a:xfrm>
+        </p:spPr>
         <p:txBody>
           <a:bodyPr>
             <a:normAutofit fontScale="90000"/>
@@ -9596,13 +9619,13 @@
         </p:nvSpPr>
         <p:spPr>
           <a:xfrm>
-            <a:off x="618265" y="1835687"/>
-            <a:ext cx="10087805" cy="4810020"/>
+            <a:off x="463699" y="1835687"/>
+            <a:ext cx="7565854" cy="4810020"/>
           </a:xfrm>
         </p:spPr>
         <p:txBody>
           <a:bodyPr>
-            <a:normAutofit lnSpcReduction="10000"/>
+            <a:normAutofit fontScale="92500"/>
           </a:bodyPr>
           <a:lstStyle/>
           <a:p>
@@ -9672,6 +9695,13 @@
   <p:clrMapOvr>
     <a:masterClrMapping/>
   </p:clrMapOvr>
+  <p:timing>
+    <p:tnLst>
+      <p:par>
+        <p:cTn xmlns:p14="http://schemas.microsoft.com/office/powerpoint/2010/main" id="1" dur="indefinite" restart="never" nodeType="tmRoot"/>
+      </p:par>
+    </p:tnLst>
+  </p:timing>
 </p:sld>
 </file>
 
@@ -9705,7 +9735,12 @@
             </p:custDataLst>
           </p:nvPr>
         </p:nvSpPr>
-        <p:spPr/>
+        <p:spPr>
+          <a:xfrm>
+            <a:off x="343650" y="609600"/>
+            <a:ext cx="7903879" cy="1320800"/>
+          </a:xfrm>
+        </p:spPr>
         <p:txBody>
           <a:bodyPr/>
           <a:lstStyle/>
@@ -9734,7 +9769,7 @@
         <p:spPr/>
         <p:txBody>
           <a:bodyPr>
-            <a:normAutofit/>
+            <a:normAutofit lnSpcReduction="10000"/>
           </a:bodyPr>
           <a:lstStyle/>
           <a:p>
@@ -9787,6 +9822,13 @@
   <p:clrMapOvr>
     <a:masterClrMapping/>
   </p:clrMapOvr>
+  <p:timing>
+    <p:tnLst>
+      <p:par>
+        <p:cTn xmlns:p14="http://schemas.microsoft.com/office/powerpoint/2010/main" id="1" dur="indefinite" restart="never" nodeType="tmRoot"/>
+      </p:par>
+    </p:tnLst>
+  </p:timing>
 </p:sld>
 </file>
 
@@ -9864,8 +9906,8 @@
           </p:nvPr>
         </p:nvGraphicFramePr>
         <p:xfrm>
-          <a:off x="677863" y="1314373"/>
-          <a:ext cx="10382617" cy="5360871"/>
+          <a:off x="508398" y="1314374"/>
+          <a:ext cx="7786961" cy="5457627"/>
         </p:xfrm>
         <a:graphic>
           <a:graphicData uri="http://schemas.openxmlformats.org/drawingml/2006/table">
@@ -9874,13 +9916,13 @@
                 <a:tableStyleId>{5C22544A-7EE6-4342-B048-85BDC9FD1C3A}</a:tableStyleId>
               </a:tblPr>
               <a:tblGrid>
-                <a:gridCol w="1483231"/>
-                <a:gridCol w="1483231"/>
-                <a:gridCol w="1483231"/>
-                <a:gridCol w="1483231"/>
-                <a:gridCol w="1483231"/>
-                <a:gridCol w="1483231"/>
-                <a:gridCol w="1483231"/>
+                <a:gridCol w="1112423"/>
+                <a:gridCol w="1112423"/>
+                <a:gridCol w="1112423"/>
+                <a:gridCol w="1112423"/>
+                <a:gridCol w="1112423"/>
+                <a:gridCol w="1112423"/>
+                <a:gridCol w="1112423"/>
               </a:tblGrid>
               <a:tr h="906127">
                 <a:tc>
@@ -9901,7 +9943,7 @@
                       </a:r>
                     </a:p>
                   </a:txBody>
-                  <a:tcPr marL="12700" marR="12700" marT="12700" marB="0" anchor="ctr"/>
+                  <a:tcPr marL="9525" marR="9525" marT="12700" marB="0" anchor="ctr"/>
                 </a:tc>
                 <a:tc>
                   <a:txBody>
@@ -9940,7 +9982,7 @@
                       </a:r>
                     </a:p>
                   </a:txBody>
-                  <a:tcPr marL="12700" marR="12700" marT="12700" marB="0" anchor="ctr"/>
+                  <a:tcPr marL="9525" marR="9525" marT="12700" marB="0" anchor="ctr"/>
                 </a:tc>
                 <a:tc>
                   <a:txBody>
@@ -9979,7 +10021,7 @@
                       </a:r>
                     </a:p>
                   </a:txBody>
-                  <a:tcPr marL="12700" marR="12700" marT="12700" marB="0" anchor="ctr"/>
+                  <a:tcPr marL="9525" marR="9525" marT="12700" marB="0" anchor="ctr"/>
                 </a:tc>
                 <a:tc>
                   <a:txBody>
@@ -10018,7 +10060,7 @@
                       </a:r>
                     </a:p>
                   </a:txBody>
-                  <a:tcPr marL="12700" marR="12700" marT="12700" marB="0" anchor="ctr"/>
+                  <a:tcPr marL="9525" marR="9525" marT="12700" marB="0" anchor="ctr"/>
                 </a:tc>
                 <a:tc>
                   <a:txBody>
@@ -10038,7 +10080,7 @@
                       </a:r>
                     </a:p>
                   </a:txBody>
-                  <a:tcPr marL="12700" marR="12700" marT="12700" marB="0" anchor="ctr"/>
+                  <a:tcPr marL="9525" marR="9525" marT="12700" marB="0" anchor="ctr"/>
                 </a:tc>
                 <a:tc>
                   <a:txBody>
@@ -10077,7 +10119,7 @@
                       </a:r>
                     </a:p>
                   </a:txBody>
-                  <a:tcPr marL="12700" marR="12700" marT="12700" marB="0" anchor="ctr"/>
+                  <a:tcPr marL="9525" marR="9525" marT="12700" marB="0" anchor="ctr"/>
                 </a:tc>
                 <a:tc>
                   <a:txBody>
@@ -10097,7 +10139,7 @@
                       </a:r>
                     </a:p>
                   </a:txBody>
-                  <a:tcPr marL="12700" marR="12700" marT="12700" marB="0" anchor="ctr"/>
+                  <a:tcPr marL="9525" marR="9525" marT="12700" marB="0" anchor="ctr"/>
                 </a:tc>
               </a:tr>
               <a:tr h="906127">
@@ -10138,7 +10180,7 @@
                       </a:r>
                     </a:p>
                   </a:txBody>
-                  <a:tcPr marL="12700" marR="12700" marT="12700" marB="0" anchor="ctr"/>
+                  <a:tcPr marL="9525" marR="9525" marT="12700" marB="0" anchor="ctr"/>
                 </a:tc>
                 <a:tc>
                   <a:txBody>
@@ -10158,7 +10200,7 @@
                       </a:r>
                     </a:p>
                   </a:txBody>
-                  <a:tcPr marL="12700" marR="12700" marT="12700" marB="0" anchor="ctr"/>
+                  <a:tcPr marL="9525" marR="9525" marT="12700" marB="0" anchor="ctr"/>
                 </a:tc>
                 <a:tc>
                   <a:txBody>
@@ -10197,7 +10239,7 @@
                       </a:r>
                     </a:p>
                   </a:txBody>
-                  <a:tcPr marL="12700" marR="12700" marT="12700" marB="0" anchor="ctr"/>
+                  <a:tcPr marL="9525" marR="9525" marT="12700" marB="0" anchor="ctr"/>
                 </a:tc>
                 <a:tc>
                   <a:txBody>
@@ -10217,7 +10259,7 @@
                       </a:r>
                     </a:p>
                   </a:txBody>
-                  <a:tcPr marL="12700" marR="12700" marT="12700" marB="0" anchor="ctr"/>
+                  <a:tcPr marL="9525" marR="9525" marT="12700" marB="0" anchor="ctr"/>
                 </a:tc>
                 <a:tc>
                   <a:txBody>
@@ -10237,7 +10279,7 @@
                       </a:r>
                     </a:p>
                   </a:txBody>
-                  <a:tcPr marL="12700" marR="12700" marT="12700" marB="0" anchor="ctr"/>
+                  <a:tcPr marL="9525" marR="9525" marT="12700" marB="0" anchor="ctr"/>
                 </a:tc>
                 <a:tc>
                   <a:txBody>
@@ -10276,7 +10318,7 @@
                       </a:r>
                     </a:p>
                   </a:txBody>
-                  <a:tcPr marL="12700" marR="12700" marT="12700" marB="0" anchor="ctr"/>
+                  <a:tcPr marL="9525" marR="9525" marT="12700" marB="0" anchor="ctr"/>
                 </a:tc>
                 <a:tc>
                   <a:txBody>
@@ -10296,7 +10338,7 @@
                       </a:r>
                     </a:p>
                   </a:txBody>
-                  <a:tcPr marL="12700" marR="12700" marT="12700" marB="0" anchor="ctr"/>
+                  <a:tcPr marL="9525" marR="9525" marT="12700" marB="0" anchor="ctr"/>
                 </a:tc>
               </a:tr>
               <a:tr h="1257063">
@@ -10337,7 +10379,7 @@
                       </a:r>
                     </a:p>
                   </a:txBody>
-                  <a:tcPr marL="12700" marR="12700" marT="12700" marB="0" anchor="ctr"/>
+                  <a:tcPr marL="9525" marR="9525" marT="12700" marB="0" anchor="ctr"/>
                 </a:tc>
                 <a:tc>
                   <a:txBody>
@@ -10357,7 +10399,7 @@
                       </a:r>
                     </a:p>
                   </a:txBody>
-                  <a:tcPr marL="12700" marR="12700" marT="12700" marB="0" anchor="ctr"/>
+                  <a:tcPr marL="9525" marR="9525" marT="12700" marB="0" anchor="ctr"/>
                 </a:tc>
                 <a:tc>
                   <a:txBody>
@@ -10396,7 +10438,7 @@
                       </a:r>
                     </a:p>
                   </a:txBody>
-                  <a:tcPr marL="12700" marR="12700" marT="12700" marB="0" anchor="ctr"/>
+                  <a:tcPr marL="9525" marR="9525" marT="12700" marB="0" anchor="ctr"/>
                 </a:tc>
                 <a:tc>
                   <a:txBody>
@@ -10435,7 +10477,7 @@
                       </a:r>
                     </a:p>
                   </a:txBody>
-                  <a:tcPr marL="12700" marR="12700" marT="12700" marB="0" anchor="ctr"/>
+                  <a:tcPr marL="9525" marR="9525" marT="12700" marB="0" anchor="ctr"/>
                 </a:tc>
                 <a:tc>
                   <a:txBody>
@@ -10455,7 +10497,7 @@
                       </a:r>
                     </a:p>
                   </a:txBody>
-                  <a:tcPr marL="12700" marR="12700" marT="12700" marB="0" anchor="ctr"/>
+                  <a:tcPr marL="9525" marR="9525" marT="12700" marB="0" anchor="ctr"/>
                 </a:tc>
                 <a:tc>
                   <a:txBody>
@@ -10475,7 +10517,7 @@
                       </a:r>
                     </a:p>
                   </a:txBody>
-                  <a:tcPr marL="12700" marR="12700" marT="12700" marB="0" anchor="ctr"/>
+                  <a:tcPr marL="9525" marR="9525" marT="12700" marB="0" anchor="ctr"/>
                 </a:tc>
                 <a:tc>
                   <a:txBody>
@@ -10495,7 +10537,7 @@
                       </a:r>
                     </a:p>
                   </a:txBody>
-                  <a:tcPr marL="12700" marR="12700" marT="12700" marB="0" anchor="ctr"/>
+                  <a:tcPr marL="9525" marR="9525" marT="12700" marB="0" anchor="ctr"/>
                 </a:tc>
               </a:tr>
               <a:tr h="2291554">
@@ -10517,7 +10559,7 @@
                       </a:r>
                     </a:p>
                   </a:txBody>
-                  <a:tcPr marL="12700" marR="12700" marT="12700" marB="0" anchor="ctr"/>
+                  <a:tcPr marL="9525" marR="9525" marT="12700" marB="0" anchor="ctr"/>
                 </a:tc>
                 <a:tc>
                   <a:txBody>
@@ -10537,7 +10579,7 @@
                       </a:r>
                     </a:p>
                   </a:txBody>
-                  <a:tcPr marL="12700" marR="12700" marT="12700" marB="0" anchor="ctr"/>
+                  <a:tcPr marL="9525" marR="9525" marT="12700" marB="0" anchor="ctr"/>
                 </a:tc>
                 <a:tc>
                   <a:txBody>
@@ -10557,7 +10599,7 @@
                       </a:r>
                     </a:p>
                   </a:txBody>
-                  <a:tcPr marL="12700" marR="12700" marT="12700" marB="0" anchor="ctr"/>
+                  <a:tcPr marL="9525" marR="9525" marT="12700" marB="0" anchor="ctr"/>
                 </a:tc>
                 <a:tc>
                   <a:txBody>
@@ -10577,7 +10619,7 @@
                       </a:r>
                     </a:p>
                   </a:txBody>
-                  <a:tcPr marL="12700" marR="12700" marT="12700" marB="0" anchor="ctr"/>
+                  <a:tcPr marL="9525" marR="9525" marT="12700" marB="0" anchor="ctr"/>
                 </a:tc>
                 <a:tc>
                   <a:txBody>
@@ -10597,7 +10639,7 @@
                       </a:r>
                     </a:p>
                   </a:txBody>
-                  <a:tcPr marL="12700" marR="12700" marT="12700" marB="0" anchor="ctr"/>
+                  <a:tcPr marL="9525" marR="9525" marT="12700" marB="0" anchor="ctr"/>
                 </a:tc>
                 <a:tc>
                   <a:txBody>
@@ -10637,7 +10679,7 @@
                       </a:r>
                     </a:p>
                   </a:txBody>
-                  <a:tcPr marL="12700" marR="12700" marT="12700" marB="0" anchor="ctr"/>
+                  <a:tcPr marL="9525" marR="9525" marT="12700" marB="0" anchor="ctr"/>
                 </a:tc>
                 <a:tc>
                   <a:txBody>
@@ -10674,7 +10716,7 @@
                       </a:endParaRPr>
                     </a:p>
                   </a:txBody>
-                  <a:tcPr marL="12700" marR="12700" marT="12700" marB="0" anchor="ctr"/>
+                  <a:tcPr marL="9525" marR="9525" marT="12700" marB="0" anchor="ctr"/>
                 </a:tc>
               </a:tr>
             </a:tbl>
@@ -10691,6 +10733,13 @@
   <p:clrMapOvr>
     <a:masterClrMapping/>
   </p:clrMapOvr>
+  <p:timing>
+    <p:tnLst>
+      <p:par>
+        <p:cTn xmlns:p14="http://schemas.microsoft.com/office/powerpoint/2010/main" id="1" dur="indefinite" restart="never" nodeType="tmRoot"/>
+      </p:par>
+    </p:tnLst>
+  </p:timing>
 </p:sld>
 </file>
 
@@ -10724,7 +10773,12 @@
             </p:custDataLst>
           </p:nvPr>
         </p:nvSpPr>
-        <p:spPr/>
+        <p:spPr>
+          <a:xfrm>
+            <a:off x="508001" y="310776"/>
+            <a:ext cx="6447501" cy="1320800"/>
+          </a:xfrm>
+        </p:spPr>
         <p:txBody>
           <a:bodyPr/>
           <a:lstStyle/>
@@ -10766,14 +10820,14 @@
             </p:custDataLst>
             <p:extLst>
               <p:ext uri="{D42A27DB-BD31-4B8C-83A1-F6EECF244321}">
-                <p14:modId xmlns:p14="http://schemas.microsoft.com/office/powerpoint/2010/main" val="4126102908"/>
+                <p14:modId xmlns:p14="http://schemas.microsoft.com/office/powerpoint/2010/main" val="1120902027"/>
               </p:ext>
             </p:extLst>
           </p:nvPr>
         </p:nvGraphicFramePr>
         <p:xfrm>
-          <a:off x="677863" y="1373443"/>
-          <a:ext cx="10766560" cy="5257496"/>
+          <a:off x="478515" y="1044737"/>
+          <a:ext cx="8074920" cy="5509413"/>
         </p:xfrm>
         <a:graphic>
           <a:graphicData uri="http://schemas.openxmlformats.org/drawingml/2006/table">
@@ -10782,13 +10836,13 @@
                 <a:tableStyleId>{5C22544A-7EE6-4342-B048-85BDC9FD1C3A}</a:tableStyleId>
               </a:tblPr>
               <a:tblGrid>
-                <a:gridCol w="1538080"/>
-                <a:gridCol w="1538080"/>
-                <a:gridCol w="1538080"/>
-                <a:gridCol w="1538080"/>
-                <a:gridCol w="1538080"/>
-                <a:gridCol w="1538080"/>
-                <a:gridCol w="1538080"/>
+                <a:gridCol w="1153560"/>
+                <a:gridCol w="833219"/>
+                <a:gridCol w="1165412"/>
+                <a:gridCol w="1462049"/>
+                <a:gridCol w="1153560"/>
+                <a:gridCol w="1153560"/>
+                <a:gridCol w="1153560"/>
               </a:tblGrid>
               <a:tr h="1125374">
                 <a:tc>
@@ -10809,7 +10863,7 @@
                       </a:r>
                     </a:p>
                   </a:txBody>
-                  <a:tcPr marL="12700" marR="12700" marT="12700" marB="0" anchor="ctr"/>
+                  <a:tcPr marL="9525" marR="9525" marT="12700" marB="0" anchor="ctr"/>
                 </a:tc>
                 <a:tc>
                   <a:txBody>
@@ -10848,7 +10902,7 @@
                       </a:r>
                     </a:p>
                   </a:txBody>
-                  <a:tcPr marL="12700" marR="12700" marT="12700" marB="0" anchor="ctr"/>
+                  <a:tcPr marL="9525" marR="9525" marT="12700" marB="0" anchor="ctr"/>
                 </a:tc>
                 <a:tc>
                   <a:txBody>
@@ -10887,7 +10941,7 @@
                       </a:r>
                     </a:p>
                   </a:txBody>
-                  <a:tcPr marL="12700" marR="12700" marT="12700" marB="0" anchor="ctr"/>
+                  <a:tcPr marL="9525" marR="9525" marT="12700" marB="0" anchor="ctr"/>
                 </a:tc>
                 <a:tc>
                   <a:txBody>
@@ -10926,7 +10980,7 @@
                       </a:r>
                     </a:p>
                   </a:txBody>
-                  <a:tcPr marL="12700" marR="12700" marT="12700" marB="0" anchor="ctr"/>
+                  <a:tcPr marL="9525" marR="9525" marT="12700" marB="0" anchor="ctr"/>
                 </a:tc>
                 <a:tc>
                   <a:txBody>
@@ -10935,7 +10989,7 @@
                     <a:p>
                       <a:pPr algn="ctr" fontAlgn="ctr"/>
                       <a:r>
-                        <a:rPr lang="fr-FR" sz="1100" b="1" i="0" u="none" strike="noStrike">
+                        <a:rPr lang="fr-FR" sz="1100" b="1" i="0" u="none" strike="noStrike" dirty="0">
                           <a:solidFill>
                             <a:srgbClr val="000000"/>
                           </a:solidFill>
@@ -10946,7 +11000,7 @@
                       </a:r>
                     </a:p>
                   </a:txBody>
-                  <a:tcPr marL="12700" marR="12700" marT="12700" marB="0" anchor="ctr"/>
+                  <a:tcPr marL="9525" marR="9525" marT="12700" marB="0" anchor="ctr"/>
                 </a:tc>
                 <a:tc>
                   <a:txBody>
@@ -10985,7 +11039,7 @@
                       </a:r>
                     </a:p>
                   </a:txBody>
-                  <a:tcPr marL="12700" marR="12700" marT="12700" marB="0" anchor="ctr"/>
+                  <a:tcPr marL="9525" marR="9525" marT="12700" marB="0" anchor="ctr"/>
                 </a:tc>
                 <a:tc>
                   <a:txBody>
@@ -11005,7 +11059,7 @@
                       </a:r>
                     </a:p>
                   </a:txBody>
-                  <a:tcPr marL="12700" marR="12700" marT="12700" marB="0" anchor="ctr"/>
+                  <a:tcPr marL="9525" marR="9525" marT="12700" marB="0" anchor="ctr"/>
                 </a:tc>
               </a:tr>
               <a:tr h="1879522">
@@ -11027,7 +11081,7 @@
                       </a:r>
                     </a:p>
                   </a:txBody>
-                  <a:tcPr marL="12700" marR="12700" marT="12700" marB="0" anchor="ctr"/>
+                  <a:tcPr marL="9525" marR="9525" marT="12700" marB="0" anchor="ctr"/>
                 </a:tc>
                 <a:tc>
                   <a:txBody>
@@ -11047,7 +11101,7 @@
                       </a:r>
                     </a:p>
                   </a:txBody>
-                  <a:tcPr marL="12700" marR="12700" marT="12700" marB="0" anchor="ctr"/>
+                  <a:tcPr marL="9525" marR="9525" marT="12700" marB="0" anchor="ctr"/>
                 </a:tc>
                 <a:tc>
                   <a:txBody>
@@ -11067,7 +11121,7 @@
                       </a:r>
                     </a:p>
                   </a:txBody>
-                  <a:tcPr marL="12700" marR="12700" marT="12700" marB="0" anchor="ctr"/>
+                  <a:tcPr marL="9525" marR="9525" marT="12700" marB="0" anchor="ctr"/>
                 </a:tc>
                 <a:tc>
                   <a:txBody>
@@ -11087,7 +11141,7 @@
                       </a:r>
                     </a:p>
                   </a:txBody>
-                  <a:tcPr marL="12700" marR="12700" marT="12700" marB="0" anchor="ctr"/>
+                  <a:tcPr marL="9525" marR="9525" marT="12700" marB="0" anchor="ctr"/>
                 </a:tc>
                 <a:tc>
                   <a:txBody>
@@ -11107,7 +11161,7 @@
                       </a:r>
                     </a:p>
                   </a:txBody>
-                  <a:tcPr marL="12700" marR="12700" marT="12700" marB="0" anchor="ctr"/>
+                  <a:tcPr marL="9525" marR="9525" marT="12700" marB="0" anchor="ctr"/>
                 </a:tc>
                 <a:tc>
                   <a:txBody>
@@ -11127,7 +11181,7 @@
                       </a:r>
                     </a:p>
                   </a:txBody>
-                  <a:tcPr marL="12700" marR="12700" marT="12700" marB="0" anchor="ctr"/>
+                  <a:tcPr marL="9525" marR="9525" marT="12700" marB="0" anchor="ctr"/>
                 </a:tc>
                 <a:tc>
                   <a:txBody>
@@ -11164,7 +11218,7 @@
                       </a:endParaRPr>
                     </a:p>
                   </a:txBody>
-                  <a:tcPr marL="12700" marR="12700" marT="12700" marB="0" anchor="ctr"/>
+                  <a:tcPr marL="9525" marR="9525" marT="12700" marB="0" anchor="ctr"/>
                 </a:tc>
               </a:tr>
               <a:tr h="2252600">
@@ -11186,7 +11240,7 @@
                       </a:r>
                     </a:p>
                   </a:txBody>
-                  <a:tcPr marL="12700" marR="12700" marT="12700" marB="0" anchor="ctr"/>
+                  <a:tcPr marL="9525" marR="9525" marT="12700" marB="0" anchor="ctr"/>
                 </a:tc>
                 <a:tc>
                   <a:txBody>
@@ -11206,7 +11260,7 @@
                       </a:r>
                     </a:p>
                   </a:txBody>
-                  <a:tcPr marL="12700" marR="12700" marT="12700" marB="0" anchor="ctr"/>
+                  <a:tcPr marL="9525" marR="9525" marT="12700" marB="0" anchor="ctr"/>
                 </a:tc>
                 <a:tc>
                   <a:txBody>
@@ -11242,7 +11296,7 @@
                       </a:endParaRPr>
                     </a:p>
                   </a:txBody>
-                  <a:tcPr marL="12700" marR="12700" marT="12700" marB="0" anchor="ctr"/>
+                  <a:tcPr marL="9525" marR="9525" marT="12700" marB="0" anchor="ctr"/>
                 </a:tc>
                 <a:tc>
                   <a:txBody>
@@ -11278,7 +11332,7 @@
                       </a:endParaRPr>
                     </a:p>
                   </a:txBody>
-                  <a:tcPr marL="12700" marR="12700" marT="12700" marB="0" anchor="ctr"/>
+                  <a:tcPr marL="9525" marR="9525" marT="12700" marB="0" anchor="ctr"/>
                 </a:tc>
                 <a:tc>
                   <a:txBody>
@@ -11298,7 +11352,7 @@
                       </a:r>
                     </a:p>
                   </a:txBody>
-                  <a:tcPr marL="12700" marR="12700" marT="12700" marB="0" anchor="ctr"/>
+                  <a:tcPr marL="9525" marR="9525" marT="12700" marB="0" anchor="ctr"/>
                 </a:tc>
                 <a:tc>
                   <a:txBody>
@@ -11318,7 +11372,7 @@
                       </a:r>
                     </a:p>
                   </a:txBody>
-                  <a:tcPr marL="12700" marR="12700" marT="12700" marB="0" anchor="ctr"/>
+                  <a:tcPr marL="9525" marR="9525" marT="12700" marB="0" anchor="ctr"/>
                 </a:tc>
                 <a:tc>
                   <a:txBody>
@@ -11355,7 +11409,7 @@
                       </a:endParaRPr>
                     </a:p>
                   </a:txBody>
-                  <a:tcPr marL="12700" marR="12700" marT="12700" marB="0" anchor="ctr"/>
+                  <a:tcPr marL="9525" marR="9525" marT="12700" marB="0" anchor="ctr"/>
                 </a:tc>
               </a:tr>
             </a:tbl>
@@ -11372,6 +11426,13 @@
   <p:clrMapOvr>
     <a:masterClrMapping/>
   </p:clrMapOvr>
+  <p:timing>
+    <p:tnLst>
+      <p:par>
+        <p:cTn xmlns:p14="http://schemas.microsoft.com/office/powerpoint/2010/main" id="1" dur="indefinite" restart="never" nodeType="tmRoot"/>
+      </p:par>
+    </p:tnLst>
+  </p:timing>
 </p:sld>
 </file>
 
@@ -11449,8 +11510,8 @@
           </p:nvPr>
         </p:nvGraphicFramePr>
         <p:xfrm>
-          <a:off x="677863" y="1314373"/>
-          <a:ext cx="11091430" cy="5331333"/>
+          <a:off x="508397" y="1314374"/>
+          <a:ext cx="8318576" cy="5331333"/>
         </p:xfrm>
         <a:graphic>
           <a:graphicData uri="http://schemas.openxmlformats.org/drawingml/2006/table">
@@ -11459,13 +11520,13 @@
                 <a:tableStyleId>{5C22544A-7EE6-4342-B048-85BDC9FD1C3A}</a:tableStyleId>
               </a:tblPr>
               <a:tblGrid>
-                <a:gridCol w="1584490"/>
-                <a:gridCol w="1584490"/>
-                <a:gridCol w="1584490"/>
-                <a:gridCol w="1584490"/>
-                <a:gridCol w="1584490"/>
-                <a:gridCol w="1584490"/>
-                <a:gridCol w="1584490"/>
+                <a:gridCol w="1188368"/>
+                <a:gridCol w="1188368"/>
+                <a:gridCol w="1188368"/>
+                <a:gridCol w="1188368"/>
+                <a:gridCol w="1188368"/>
+                <a:gridCol w="1188368"/>
+                <a:gridCol w="1188368"/>
               </a:tblGrid>
               <a:tr h="650006">
                 <a:tc>
@@ -11486,7 +11547,7 @@
                       </a:r>
                     </a:p>
                   </a:txBody>
-                  <a:tcPr marL="12700" marR="12700" marT="12700" marB="0" anchor="ctr"/>
+                  <a:tcPr marL="9525" marR="9525" marT="12700" marB="0" anchor="ctr"/>
                 </a:tc>
                 <a:tc>
                   <a:txBody>
@@ -11525,7 +11586,7 @@
                       </a:r>
                     </a:p>
                   </a:txBody>
-                  <a:tcPr marL="12700" marR="12700" marT="12700" marB="0" anchor="ctr"/>
+                  <a:tcPr marL="9525" marR="9525" marT="12700" marB="0" anchor="ctr"/>
                 </a:tc>
                 <a:tc>
                   <a:txBody>
@@ -11564,7 +11625,7 @@
                       </a:r>
                     </a:p>
                   </a:txBody>
-                  <a:tcPr marL="12700" marR="12700" marT="12700" marB="0" anchor="ctr"/>
+                  <a:tcPr marL="9525" marR="9525" marT="12700" marB="0" anchor="ctr"/>
                 </a:tc>
                 <a:tc>
                   <a:txBody>
@@ -11603,7 +11664,7 @@
                       </a:r>
                     </a:p>
                   </a:txBody>
-                  <a:tcPr marL="12700" marR="12700" marT="12700" marB="0" anchor="ctr"/>
+                  <a:tcPr marL="9525" marR="9525" marT="12700" marB="0" anchor="ctr"/>
                 </a:tc>
                 <a:tc>
                   <a:txBody>
@@ -11623,7 +11684,7 @@
                       </a:r>
                     </a:p>
                   </a:txBody>
-                  <a:tcPr marL="12700" marR="12700" marT="12700" marB="0" anchor="ctr"/>
+                  <a:tcPr marL="9525" marR="9525" marT="12700" marB="0" anchor="ctr"/>
                 </a:tc>
                 <a:tc>
                   <a:txBody>
@@ -11662,7 +11723,7 @@
                       </a:r>
                     </a:p>
                   </a:txBody>
-                  <a:tcPr marL="12700" marR="12700" marT="12700" marB="0" anchor="ctr"/>
+                  <a:tcPr marL="9525" marR="9525" marT="12700" marB="0" anchor="ctr"/>
                 </a:tc>
                 <a:tc>
                   <a:txBody>
@@ -11682,7 +11743,7 @@
                       </a:r>
                     </a:p>
                   </a:txBody>
-                  <a:tcPr marL="12700" marR="12700" marT="12700" marB="0" anchor="ctr"/>
+                  <a:tcPr marL="9525" marR="9525" marT="12700" marB="0" anchor="ctr"/>
                 </a:tc>
               </a:tr>
               <a:tr h="1917999">
@@ -11714,7 +11775,7 @@
                       </a:r>
                     </a:p>
                   </a:txBody>
-                  <a:tcPr marL="12700" marR="12700" marT="12700" marB="0" anchor="ctr"/>
+                  <a:tcPr marL="9525" marR="9525" marT="12700" marB="0" anchor="ctr"/>
                 </a:tc>
                 <a:tc>
                   <a:txBody>
@@ -11734,7 +11795,7 @@
                       </a:r>
                     </a:p>
                   </a:txBody>
-                  <a:tcPr marL="12700" marR="12700" marT="12700" marB="0" anchor="ctr"/>
+                  <a:tcPr marL="9525" marR="9525" marT="12700" marB="0" anchor="ctr"/>
                 </a:tc>
                 <a:tc>
                   <a:txBody>
@@ -11770,7 +11831,7 @@
                       </a:endParaRPr>
                     </a:p>
                   </a:txBody>
-                  <a:tcPr marL="12700" marR="12700" marT="12700" marB="0" anchor="ctr"/>
+                  <a:tcPr marL="9525" marR="9525" marT="12700" marB="0" anchor="ctr"/>
                 </a:tc>
                 <a:tc>
                   <a:txBody>
@@ -11790,7 +11851,7 @@
                       </a:r>
                     </a:p>
                   </a:txBody>
-                  <a:tcPr marL="12700" marR="12700" marT="12700" marB="0" anchor="ctr"/>
+                  <a:tcPr marL="9525" marR="9525" marT="12700" marB="0" anchor="ctr"/>
                 </a:tc>
                 <a:tc>
                   <a:txBody>
@@ -11810,7 +11871,7 @@
                       </a:r>
                     </a:p>
                   </a:txBody>
-                  <a:tcPr marL="12700" marR="12700" marT="12700" marB="0" anchor="ctr"/>
+                  <a:tcPr marL="9525" marR="9525" marT="12700" marB="0" anchor="ctr"/>
                 </a:tc>
                 <a:tc>
                   <a:txBody>
@@ -11830,7 +11891,7 @@
                       </a:r>
                     </a:p>
                   </a:txBody>
-                  <a:tcPr marL="12700" marR="12700" marT="12700" marB="0" anchor="ctr"/>
+                  <a:tcPr marL="9525" marR="9525" marT="12700" marB="0" anchor="ctr"/>
                 </a:tc>
                 <a:tc>
                   <a:txBody>
@@ -11850,7 +11911,7 @@
                       </a:r>
                     </a:p>
                   </a:txBody>
-                  <a:tcPr marL="12700" marR="12700" marT="12700" marB="0" anchor="ctr"/>
+                  <a:tcPr marL="9525" marR="9525" marT="12700" marB="0" anchor="ctr"/>
                 </a:tc>
               </a:tr>
               <a:tr h="2763328">
@@ -11891,7 +11952,7 @@
                       </a:r>
                     </a:p>
                   </a:txBody>
-                  <a:tcPr marL="12700" marR="12700" marT="12700" marB="0" anchor="ctr"/>
+                  <a:tcPr marL="9525" marR="9525" marT="12700" marB="0" anchor="ctr"/>
                 </a:tc>
                 <a:tc>
                   <a:txBody>
@@ -11911,7 +11972,7 @@
                       </a:r>
                     </a:p>
                   </a:txBody>
-                  <a:tcPr marL="12700" marR="12700" marT="12700" marB="0" anchor="ctr"/>
+                  <a:tcPr marL="9525" marR="9525" marT="12700" marB="0" anchor="ctr"/>
                 </a:tc>
                 <a:tc>
                   <a:txBody>
@@ -11950,7 +12011,7 @@
                       </a:r>
                     </a:p>
                   </a:txBody>
-                  <a:tcPr marL="12700" marR="12700" marT="12700" marB="0" anchor="ctr"/>
+                  <a:tcPr marL="9525" marR="9525" marT="12700" marB="0" anchor="ctr"/>
                 </a:tc>
                 <a:tc>
                   <a:txBody>
@@ -11970,7 +12031,7 @@
                       </a:r>
                     </a:p>
                   </a:txBody>
-                  <a:tcPr marL="12700" marR="12700" marT="12700" marB="0" anchor="ctr"/>
+                  <a:tcPr marL="9525" marR="9525" marT="12700" marB="0" anchor="ctr"/>
                 </a:tc>
                 <a:tc>
                   <a:txBody>
@@ -11990,7 +12051,7 @@
                       </a:r>
                     </a:p>
                   </a:txBody>
-                  <a:tcPr marL="12700" marR="12700" marT="12700" marB="0" anchor="ctr"/>
+                  <a:tcPr marL="9525" marR="9525" marT="12700" marB="0" anchor="ctr"/>
                 </a:tc>
                 <a:tc>
                   <a:txBody>
@@ -12010,7 +12071,7 @@
                       </a:r>
                     </a:p>
                   </a:txBody>
-                  <a:tcPr marL="12700" marR="12700" marT="12700" marB="0" anchor="ctr"/>
+                  <a:tcPr marL="9525" marR="9525" marT="12700" marB="0" anchor="ctr"/>
                 </a:tc>
                 <a:tc>
                   <a:txBody>
@@ -12030,7 +12091,7 @@
                       </a:r>
                     </a:p>
                   </a:txBody>
-                  <a:tcPr marL="12700" marR="12700" marT="12700" marB="0" anchor="ctr"/>
+                  <a:tcPr marL="9525" marR="9525" marT="12700" marB="0" anchor="ctr"/>
                 </a:tc>
               </a:tr>
             </a:tbl>
@@ -12047,6 +12108,13 @@
   <p:clrMapOvr>
     <a:masterClrMapping/>
   </p:clrMapOvr>
+  <p:timing>
+    <p:tnLst>
+      <p:par>
+        <p:cTn xmlns:p14="http://schemas.microsoft.com/office/powerpoint/2010/main" id="1" dur="indefinite" restart="never" nodeType="tmRoot"/>
+      </p:par>
+    </p:tnLst>
+  </p:timing>
 </p:sld>
 </file>
 
@@ -12082,8 +12150,8 @@
         </p:nvSpPr>
         <p:spPr>
           <a:xfrm>
-            <a:off x="677333" y="609600"/>
-            <a:ext cx="10832495" cy="1320800"/>
+            <a:off x="508000" y="609600"/>
+            <a:ext cx="8124371" cy="1320800"/>
           </a:xfrm>
         </p:spPr>
         <p:txBody>
@@ -12121,8 +12189,8 @@
         </p:nvGrpSpPr>
         <p:grpSpPr bwMode="auto">
           <a:xfrm>
-            <a:off x="194734" y="1930400"/>
-            <a:ext cx="11790625" cy="3771900"/>
+            <a:off x="146051" y="1930400"/>
+            <a:ext cx="8842969" cy="3771900"/>
             <a:chOff x="-877" y="651"/>
             <a:chExt cx="9434" cy="3018"/>
           </a:xfrm>
@@ -12154,7 +12222,7 @@
             </a:ln>
             <a:extLst>
               <a:ext uri="{909E8E84-426E-40dd-AFC4-6F175D3DCCD1}">
-                <a14:hiddenFill xmlns:a14="http://schemas.microsoft.com/office/drawing/2010/main" xmlns="">
+                <a14:hiddenFill xmlns:a14="http://schemas.microsoft.com/office/drawing/2010/main">
                   <a:solidFill>
                     <a:srgbClr val="FFFFFF"/>
                   </a:solidFill>
@@ -12214,7 +12282,7 @@
             </a:ln>
             <a:extLst>
               <a:ext uri="{909E8E84-426E-40dd-AFC4-6F175D3DCCD1}">
-                <a14:hiddenFill xmlns:a14="http://schemas.microsoft.com/office/drawing/2010/main" xmlns="">
+                <a14:hiddenFill xmlns:a14="http://schemas.microsoft.com/office/drawing/2010/main">
                   <a:solidFill>
                     <a:srgbClr val="FFFFFF"/>
                   </a:solidFill>
@@ -12234,6 +12302,13 @@
   <p:clrMapOvr>
     <a:masterClrMapping/>
   </p:clrMapOvr>
+  <p:timing>
+    <p:tnLst>
+      <p:par>
+        <p:cTn xmlns:p14="http://schemas.microsoft.com/office/powerpoint/2010/main" id="1" dur="indefinite" restart="never" nodeType="tmRoot"/>
+      </p:par>
+    </p:tnLst>
+  </p:timing>
 </p:sld>
 </file>
 
@@ -12295,13 +12370,13 @@
         </p:nvSpPr>
         <p:spPr>
           <a:xfrm>
-            <a:off x="5885029" y="2565501"/>
-            <a:ext cx="5241520" cy="2415939"/>
+            <a:off x="4413772" y="2565502"/>
+            <a:ext cx="3931140" cy="2415939"/>
           </a:xfrm>
         </p:spPr>
         <p:txBody>
           <a:bodyPr>
-            <a:normAutofit/>
+            <a:normAutofit fontScale="85000" lnSpcReduction="10000"/>
           </a:bodyPr>
           <a:lstStyle/>
           <a:p>
@@ -12333,6 +12408,10 @@
             <a:r>
               <a:rPr lang="fr-CA" dirty="0" err="1" smtClean="0"/>
               <a:t>TeV</a:t>
+            </a:r>
+            <a:r>
+              <a:rPr lang="fr-CA" dirty="0" smtClean="0"/>
+              <a:t> pour étudier la structure de la matière</a:t>
             </a:r>
             <a:endParaRPr lang="fr-CA" dirty="0" smtClean="0"/>
           </a:p>
@@ -12363,8 +12442,8 @@
         </p:blipFill>
         <p:spPr>
           <a:xfrm>
-            <a:off x="162703" y="1210121"/>
-            <a:ext cx="5613712" cy="5126700"/>
+            <a:off x="211673" y="1210121"/>
+            <a:ext cx="4210284" cy="4900820"/>
           </a:xfrm>
           <a:prstGeom prst="rect">
             <a:avLst/>
@@ -12388,8 +12467,8 @@
         </p:nvSpPr>
         <p:spPr>
           <a:xfrm>
-            <a:off x="645828" y="6336821"/>
-            <a:ext cx="5130587" cy="461665"/>
+            <a:off x="499313" y="6142586"/>
+            <a:ext cx="3847940" cy="646331"/>
           </a:xfrm>
           <a:prstGeom prst="rect">
             <a:avLst/>
@@ -12427,7 +12506,7 @@
   <p:timing>
     <p:tnLst>
       <p:par>
-        <p:cTn id="1" dur="indefinite" restart="never" nodeType="tmRoot"/>
+        <p:cTn xmlns:p14="http://schemas.microsoft.com/office/powerpoint/2010/main" id="1" dur="indefinite" restart="never" nodeType="tmRoot"/>
       </p:par>
     </p:tnLst>
   </p:timing>
@@ -12466,8 +12545,8 @@
         </p:nvSpPr>
         <p:spPr>
           <a:xfrm>
-            <a:off x="239549" y="127000"/>
-            <a:ext cx="10979993" cy="1320800"/>
+            <a:off x="179662" y="127000"/>
+            <a:ext cx="8234995" cy="1320800"/>
           </a:xfrm>
         </p:spPr>
         <p:txBody>
@@ -12505,8 +12584,8 @@
         </p:nvGrpSpPr>
         <p:grpSpPr bwMode="auto">
           <a:xfrm>
-            <a:off x="239550" y="1195615"/>
-            <a:ext cx="11838150" cy="3684588"/>
+            <a:off x="179662" y="1195615"/>
+            <a:ext cx="8878613" cy="3684588"/>
             <a:chOff x="134" y="1143"/>
             <a:chExt cx="8180" cy="2546"/>
           </a:xfrm>
@@ -12538,7 +12617,7 @@
             </a:ln>
             <a:extLst>
               <a:ext uri="{909E8E84-426E-40dd-AFC4-6F175D3DCCD1}">
-                <a14:hiddenFill xmlns:a14="http://schemas.microsoft.com/office/drawing/2010/main" xmlns="">
+                <a14:hiddenFill xmlns:a14="http://schemas.microsoft.com/office/drawing/2010/main">
                   <a:solidFill>
                     <a:srgbClr val="FFFFFF"/>
                   </a:solidFill>
@@ -12598,7 +12677,7 @@
             </a:ln>
             <a:extLst>
               <a:ext uri="{909E8E84-426E-40dd-AFC4-6F175D3DCCD1}">
-                <a14:hiddenFill xmlns:a14="http://schemas.microsoft.com/office/drawing/2010/main" xmlns="">
+                <a14:hiddenFill xmlns:a14="http://schemas.microsoft.com/office/drawing/2010/main">
                   <a:solidFill>
                     <a:srgbClr val="FFFFFF"/>
                   </a:solidFill>
@@ -12622,8 +12701,8 @@
         </p:nvGrpSpPr>
         <p:grpSpPr bwMode="auto">
           <a:xfrm>
-            <a:off x="271935" y="4972029"/>
-            <a:ext cx="11805765" cy="2037010"/>
+            <a:off x="203952" y="4972029"/>
+            <a:ext cx="8854324" cy="2037010"/>
             <a:chOff x="125" y="2942"/>
             <a:chExt cx="8763" cy="1512"/>
           </a:xfrm>
@@ -12650,14 +12729,14 @@
             </a:ln>
             <a:extLst>
               <a:ext uri="{909E8E84-426E-40dd-AFC4-6F175D3DCCD1}">
-                <a14:hiddenFill xmlns:a14="http://schemas.microsoft.com/office/drawing/2010/main" xmlns="">
+                <a14:hiddenFill xmlns:a14="http://schemas.microsoft.com/office/drawing/2010/main">
                   <a:solidFill>
                     <a:srgbClr val="FFFFFF"/>
                   </a:solidFill>
                 </a14:hiddenFill>
               </a:ext>
               <a:ext uri="{91240B29-F687-4f45-9708-019B960494DF}">
-                <a14:hiddenLine xmlns:a14="http://schemas.microsoft.com/office/drawing/2010/main" xmlns="" w="9525">
+                <a14:hiddenLine xmlns:a14="http://schemas.microsoft.com/office/drawing/2010/main" w="9525">
                   <a:solidFill>
                     <a:srgbClr val="000000"/>
                   </a:solidFill>
@@ -12720,7 +12799,7 @@
             </a:ln>
             <a:extLst>
               <a:ext uri="{909E8E84-426E-40dd-AFC4-6F175D3DCCD1}">
-                <a14:hiddenFill xmlns:a14="http://schemas.microsoft.com/office/drawing/2010/main" xmlns="">
+                <a14:hiddenFill xmlns:a14="http://schemas.microsoft.com/office/drawing/2010/main">
                   <a:solidFill>
                     <a:srgbClr val="FFFFFF"/>
                   </a:solidFill>
@@ -12740,6 +12819,13 @@
   <p:clrMapOvr>
     <a:masterClrMapping/>
   </p:clrMapOvr>
+  <p:timing>
+    <p:tnLst>
+      <p:par>
+        <p:cTn xmlns:p14="http://schemas.microsoft.com/office/powerpoint/2010/main" id="1" dur="indefinite" restart="never" nodeType="tmRoot"/>
+      </p:par>
+    </p:tnLst>
+  </p:timing>
 </p:sld>
 </file>
 
@@ -12820,8 +12906,8 @@
         </p:blipFill>
         <p:spPr>
           <a:xfrm>
-            <a:off x="351756" y="1930400"/>
-            <a:ext cx="11662659" cy="3984173"/>
+            <a:off x="263818" y="1930401"/>
+            <a:ext cx="8746994" cy="3984173"/>
           </a:xfrm>
           <a:prstGeom prst="rect">
             <a:avLst/>
@@ -12848,7 +12934,7 @@
   <p:timing>
     <p:tnLst>
       <p:par>
-        <p:cTn id="1" dur="indefinite" restart="never" nodeType="tmRoot"/>
+        <p:cTn xmlns:p14="http://schemas.microsoft.com/office/powerpoint/2010/main" id="1" dur="indefinite" restart="never" nodeType="tmRoot"/>
       </p:par>
     </p:tnLst>
   </p:timing>
@@ -12923,8 +13009,8 @@
         </p:blipFill>
         <p:spPr>
           <a:xfrm>
-            <a:off x="341087" y="85779"/>
-            <a:ext cx="11611026" cy="6590791"/>
+            <a:off x="255815" y="85780"/>
+            <a:ext cx="8708270" cy="6590791"/>
           </a:xfrm>
           <a:prstGeom prst="rect">
             <a:avLst/>
@@ -12951,7 +13037,7 @@
   <p:timing>
     <p:tnLst>
       <p:par>
-        <p:cTn id="1" dur="indefinite" restart="never" nodeType="tmRoot"/>
+        <p:cTn xmlns:p14="http://schemas.microsoft.com/office/powerpoint/2010/main" id="1" dur="indefinite" restart="never" nodeType="tmRoot"/>
       </p:par>
     </p:tnLst>
   </p:timing>
@@ -13036,8 +13122,8 @@
         </p:blipFill>
         <p:spPr>
           <a:xfrm>
-            <a:off x="250371" y="1767113"/>
-            <a:ext cx="11638808" cy="4472523"/>
+            <a:off x="187778" y="1767114"/>
+            <a:ext cx="8729106" cy="4472523"/>
           </a:xfrm>
           <a:prstGeom prst="rect">
             <a:avLst/>
@@ -13064,7 +13150,7 @@
   <p:timing>
     <p:tnLst>
       <p:par>
-        <p:cTn id="1" dur="indefinite" restart="never" nodeType="tmRoot"/>
+        <p:cTn xmlns:p14="http://schemas.microsoft.com/office/powerpoint/2010/main" id="1" dur="indefinite" restart="never" nodeType="tmRoot"/>
       </p:par>
     </p:tnLst>
   </p:timing>
@@ -13103,8 +13189,8 @@
         </p:nvSpPr>
         <p:spPr>
           <a:xfrm>
-            <a:off x="677334" y="609600"/>
-            <a:ext cx="10239278" cy="1320800"/>
+            <a:off x="508000" y="609600"/>
+            <a:ext cx="7679459" cy="1320800"/>
           </a:xfrm>
         </p:spPr>
         <p:txBody>
@@ -13134,13 +13220,13 @@
         </p:nvSpPr>
         <p:spPr>
           <a:xfrm>
-            <a:off x="5456151" y="1236905"/>
-            <a:ext cx="5794202" cy="5298261"/>
+            <a:off x="4092113" y="1236905"/>
+            <a:ext cx="4345652" cy="5298261"/>
           </a:xfrm>
         </p:spPr>
         <p:txBody>
           <a:bodyPr>
-            <a:normAutofit fontScale="92500" lnSpcReduction="10000"/>
+            <a:normAutofit fontScale="85000" lnSpcReduction="20000"/>
           </a:bodyPr>
           <a:lstStyle/>
           <a:p>
@@ -13194,6 +13280,7 @@
               <a:rPr lang="fr-CA" dirty="0" smtClean="0"/>
               <a:t>Les électroaimants de l’accélérateur doivent être modifiés pour remplir la nouvelle spécification</a:t>
             </a:r>
+            <a:endParaRPr lang="fr-CA" dirty="0" smtClean="0"/>
           </a:p>
         </p:txBody>
       </p:sp>
@@ -13224,8 +13311,8 @@
         </p:blipFill>
         <p:spPr bwMode="auto">
           <a:xfrm>
-            <a:off x="1143688" y="1564428"/>
-            <a:ext cx="3991454" cy="4473128"/>
+            <a:off x="678472" y="2121647"/>
+            <a:ext cx="2993591" cy="3751556"/>
           </a:xfrm>
           <a:prstGeom prst="rect">
             <a:avLst/>
@@ -13239,24 +13326,14 @@
           <a:effectLst/>
           <a:extLst>
             <a:ext uri="{909E8E84-426E-40dd-AFC4-6F175D3DCCD1}">
-              <a14:hiddenFill xmlns:a14="http://schemas.microsoft.com/office/drawing/2010/main" xmlns="">
+              <a14:hiddenFill xmlns:a14="http://schemas.microsoft.com/office/drawing/2010/main">
                 <a:solidFill>
                   <a:schemeClr val="accent1"/>
                 </a:solidFill>
               </a14:hiddenFill>
             </a:ext>
-            <a:ext uri="{91240B29-F687-4f45-9708-019B960494DF}">
-              <a14:hiddenLine xmlns:a14="http://schemas.microsoft.com/office/drawing/2010/main" xmlns="" w="9525">
-                <a:solidFill>
-                  <a:schemeClr val="tx1"/>
-                </a:solidFill>
-                <a:miter lim="800000"/>
-                <a:headEnd/>
-                <a:tailEnd/>
-              </a14:hiddenLine>
-            </a:ext>
             <a:ext uri="{AF507438-7753-43e0-B8FC-AC1667EBCBE1}">
-              <a14:hiddenEffects xmlns:a14="http://schemas.microsoft.com/office/drawing/2010/main" xmlns="">
+              <a14:hiddenEffects xmlns:a14="http://schemas.microsoft.com/office/drawing/2010/main">
                 <a:effectLst>
                   <a:outerShdw blurRad="63500" dist="38099" dir="2700000" algn="ctr" rotWithShape="0">
                     <a:schemeClr val="bg2">
@@ -13281,8 +13358,8 @@
         </p:nvSpPr>
         <p:spPr>
           <a:xfrm>
-            <a:off x="1143688" y="6073501"/>
-            <a:ext cx="3991454" cy="461665"/>
+            <a:off x="857766" y="6073502"/>
+            <a:ext cx="2993591" cy="461665"/>
           </a:xfrm>
           <a:prstGeom prst="rect">
             <a:avLst/>
@@ -13297,11 +13374,7 @@
           <a:p>
             <a:r>
               <a:rPr lang="de-DE" sz="1200" dirty="0" smtClean="0"/>
-              <a:t>Source</a:t>
-            </a:r>
-            <a:r>
-              <a:rPr lang="de-DE" sz="1200" dirty="0" smtClean="0"/>
-              <a:t>: http</a:t>
+              <a:t>Source: http</a:t>
             </a:r>
             <a:r>
               <a:rPr lang="de-DE" sz="1200" dirty="0"/>
@@ -13324,7 +13397,7 @@
   <p:timing>
     <p:tnLst>
       <p:par>
-        <p:cTn id="1" dur="indefinite" restart="never" nodeType="tmRoot"/>
+        <p:cTn xmlns:p14="http://schemas.microsoft.com/office/powerpoint/2010/main" id="1" dur="indefinite" restart="never" nodeType="tmRoot"/>
       </p:par>
     </p:tnLst>
   </p:timing>
@@ -13361,7 +13434,12 @@
             </p:custDataLst>
           </p:nvPr>
         </p:nvSpPr>
-        <p:spPr/>
+        <p:spPr>
+          <a:xfrm>
+            <a:off x="493060" y="161365"/>
+            <a:ext cx="6447501" cy="1320800"/>
+          </a:xfrm>
+        </p:spPr>
         <p:txBody>
           <a:bodyPr/>
           <a:lstStyle/>
@@ -13389,13 +13467,13 @@
         </p:nvSpPr>
         <p:spPr>
           <a:xfrm>
-            <a:off x="242591" y="3823639"/>
-            <a:ext cx="11007762" cy="3091005"/>
+            <a:off x="181943" y="3823640"/>
+            <a:ext cx="8255822" cy="3091005"/>
           </a:xfrm>
         </p:spPr>
         <p:txBody>
           <a:bodyPr>
-            <a:normAutofit fontScale="62500" lnSpcReduction="20000"/>
+            <a:normAutofit fontScale="55000" lnSpcReduction="20000"/>
           </a:bodyPr>
           <a:lstStyle/>
           <a:p>
@@ -13407,15 +13485,7 @@
           <a:p>
             <a:r>
               <a:rPr lang="fr-CA" sz="2600" dirty="0" smtClean="0"/>
-              <a:t>L’AFE (Active Front End) est un redresseur </a:t>
-            </a:r>
-            <a:r>
-              <a:rPr lang="fr-CA" sz="2600" dirty="0" smtClean="0"/>
-              <a:t>constitué </a:t>
-            </a:r>
-            <a:r>
-              <a:rPr lang="fr-CA" sz="2600" dirty="0" smtClean="0"/>
-              <a:t>de cellules de base NPC (</a:t>
+              <a:t>L’AFE (Active Front End) est un redresseur constitué de cellules de base NPC (</a:t>
             </a:r>
             <a:r>
               <a:rPr lang="fr-CA" sz="2600" dirty="0" err="1" smtClean="0"/>
@@ -13471,29 +13541,13 @@
             </a:r>
             <a:r>
               <a:rPr lang="fr-CA" sz="2600" dirty="0" smtClean="0"/>
-              <a:t> constituent un convertisseur CC-CC à 4 quadrants permettant d’aliment les électroaimants du PS-Booster avec forme de courant précise (détaillée plus loin). </a:t>
-            </a:r>
+              <a:t> constituent un convertisseur CC-CC à 4 quadrants permettant d’aliment les électroaimants du PS-Booster avec forme de courant précise (détaillée plus loin). Dois fournir une puissance crête de 18MW à une série d’électroaimants correspondant à une charge de 0.1H et de 0.28Ω.</a:t>
+            </a:r>
+          </a:p>
+          <a:p>
             <a:r>
               <a:rPr lang="fr-CA" sz="2600" dirty="0" smtClean="0"/>
-              <a:t>Dois </a:t>
-            </a:r>
-            <a:r>
-              <a:rPr lang="fr-CA" sz="2600" dirty="0" smtClean="0"/>
-              <a:t>fournir une puissance crête de 18MW à une série d’électroaimants correspondant à une charge de 0.1H et de 0.28Ω.</a:t>
-            </a:r>
-          </a:p>
-          <a:p>
-            <a:r>
-              <a:rPr lang="fr-CA" sz="2600" dirty="0" smtClean="0"/>
-              <a:t>Les 3 phases des cellules NPC du convertisseur CC-CC sont </a:t>
-            </a:r>
-            <a:r>
-              <a:rPr lang="fr-CA" sz="2600" dirty="0" smtClean="0"/>
-              <a:t>associées </a:t>
-            </a:r>
-            <a:r>
-              <a:rPr lang="fr-CA" sz="2600" dirty="0" smtClean="0"/>
-              <a:t>par les inductances de découplage (permettant aux différentes cellules d’alimenter simultanément l’électroaimant)</a:t>
+              <a:t>Les 3 phases des cellules NPC du convertisseur CC-CC sont associées par les inductances de découplage (permettant aux différentes cellules d’alimenter simultanément l’électroaimant)</a:t>
             </a:r>
           </a:p>
           <a:p>
@@ -13527,8 +13581,8 @@
         </p:blipFill>
         <p:spPr>
           <a:xfrm>
-            <a:off x="1740146" y="1270000"/>
-            <a:ext cx="8012650" cy="2294078"/>
+            <a:off x="1305109" y="1374588"/>
+            <a:ext cx="6009488" cy="2189490"/>
           </a:xfrm>
           <a:prstGeom prst="rect">
             <a:avLst/>
@@ -13552,8 +13606,8 @@
         </p:nvSpPr>
         <p:spPr>
           <a:xfrm>
-            <a:off x="5022940" y="3562824"/>
-            <a:ext cx="1447063" cy="276999"/>
+            <a:off x="3767206" y="3562825"/>
+            <a:ext cx="1450262" cy="276999"/>
           </a:xfrm>
           <a:prstGeom prst="rect">
             <a:avLst/>
@@ -13591,7 +13645,7 @@
   <p:timing>
     <p:tnLst>
       <p:par>
-        <p:cTn id="1" dur="indefinite" restart="never" nodeType="tmRoot"/>
+        <p:cTn xmlns:p14="http://schemas.microsoft.com/office/powerpoint/2010/main" id="1" dur="indefinite" restart="never" nodeType="tmRoot"/>
       </p:par>
     </p:tnLst>
   </p:timing>
@@ -13628,7 +13682,12 @@
             </p:custDataLst>
           </p:nvPr>
         </p:nvSpPr>
-        <p:spPr/>
+        <p:spPr>
+          <a:xfrm>
+            <a:off x="493060" y="325717"/>
+            <a:ext cx="6447501" cy="1320800"/>
+          </a:xfrm>
+        </p:spPr>
         <p:txBody>
           <a:bodyPr/>
           <a:lstStyle/>
@@ -13661,8 +13720,8 @@
         </p:blipFill>
         <p:spPr>
           <a:xfrm>
-            <a:off x="483541" y="1631191"/>
-            <a:ext cx="9971369" cy="4025966"/>
+            <a:off x="467243" y="1631191"/>
+            <a:ext cx="7478527" cy="4025966"/>
           </a:xfrm>
           <a:prstGeom prst="rect">
             <a:avLst/>
@@ -13686,8 +13745,8 @@
         </p:nvSpPr>
         <p:spPr>
           <a:xfrm>
-            <a:off x="4745693" y="5826995"/>
-            <a:ext cx="1447063" cy="276999"/>
+            <a:off x="3559270" y="5826996"/>
+            <a:ext cx="1450262" cy="276999"/>
           </a:xfrm>
           <a:prstGeom prst="rect">
             <a:avLst/>
@@ -13725,7 +13784,7 @@
   <p:timing>
     <p:tnLst>
       <p:par>
-        <p:cTn id="1" dur="indefinite" restart="never" nodeType="tmRoot"/>
+        <p:cTn xmlns:p14="http://schemas.microsoft.com/office/powerpoint/2010/main" id="1" dur="indefinite" restart="never" nodeType="tmRoot"/>
       </p:par>
     </p:tnLst>
   </p:timing>
@@ -13764,8 +13823,8 @@
         </p:nvSpPr>
         <p:spPr>
           <a:xfrm>
-            <a:off x="690034" y="101600"/>
-            <a:ext cx="8596668" cy="1320800"/>
+            <a:off x="517526" y="101600"/>
+            <a:ext cx="6447501" cy="1320800"/>
           </a:xfrm>
         </p:spPr>
         <p:txBody>
@@ -13795,13 +13854,13 @@
         </p:nvSpPr>
         <p:spPr>
           <a:xfrm>
-            <a:off x="5793653" y="1398354"/>
-            <a:ext cx="5456700" cy="5165350"/>
+            <a:off x="4345240" y="1398354"/>
+            <a:ext cx="4092525" cy="5165350"/>
           </a:xfrm>
         </p:spPr>
         <p:txBody>
           <a:bodyPr>
-            <a:normAutofit lnSpcReduction="10000"/>
+            <a:normAutofit fontScale="92500" lnSpcReduction="10000"/>
           </a:bodyPr>
           <a:lstStyle/>
           <a:p>
@@ -13879,8 +13938,8 @@
         </p:blipFill>
         <p:spPr>
           <a:xfrm>
-            <a:off x="1237094" y="738615"/>
-            <a:ext cx="3665106" cy="2897756"/>
+            <a:off x="927820" y="738615"/>
+            <a:ext cx="2748830" cy="2897756"/>
           </a:xfrm>
           <a:prstGeom prst="rect">
             <a:avLst/>
@@ -13917,8 +13976,8 @@
         </p:blipFill>
         <p:spPr>
           <a:xfrm>
-            <a:off x="922491" y="4240227"/>
-            <a:ext cx="4482989" cy="1933996"/>
+            <a:off x="691869" y="4314932"/>
+            <a:ext cx="3362242" cy="1933996"/>
           </a:xfrm>
           <a:prstGeom prst="rect">
             <a:avLst/>
@@ -13942,8 +14001,8 @@
         </p:nvSpPr>
         <p:spPr>
           <a:xfrm>
-            <a:off x="1013088" y="6313754"/>
-            <a:ext cx="4128566" cy="276999"/>
+            <a:off x="253620" y="6313755"/>
+            <a:ext cx="4108817" cy="276999"/>
           </a:xfrm>
           <a:prstGeom prst="rect">
             <a:avLst/>
@@ -13959,15 +14018,7 @@
             <a:pPr algn="ctr"/>
             <a:r>
               <a:rPr lang="en-US" sz="1200" dirty="0" smtClean="0"/>
-              <a:t>Figure 10 du document </a:t>
-            </a:r>
-            <a:r>
-              <a:rPr lang="en-US" sz="1200" dirty="0" smtClean="0"/>
-              <a:t>D3176</a:t>
-            </a:r>
-            <a:r>
-              <a:rPr lang="en-US" sz="1200" dirty="0" smtClean="0"/>
-              <a:t>, Techniques de </a:t>
+              <a:t>Figure 10 du document D3176, Techniques de </a:t>
             </a:r>
             <a:r>
               <a:rPr lang="en-US" sz="1200" dirty="0" err="1" smtClean="0"/>
@@ -13993,8 +14044,8 @@
         </p:nvSpPr>
         <p:spPr>
           <a:xfrm>
-            <a:off x="148647" y="3630300"/>
-            <a:ext cx="5842000" cy="738664"/>
+            <a:off x="111485" y="3630300"/>
+            <a:ext cx="4381500" cy="923330"/>
           </a:xfrm>
           <a:prstGeom prst="rect">
             <a:avLst/>
@@ -14051,7 +14102,7 @@
   <p:timing>
     <p:tnLst>
       <p:par>
-        <p:cTn id="1" dur="indefinite" restart="never" nodeType="tmRoot"/>
+        <p:cTn xmlns:p14="http://schemas.microsoft.com/office/powerpoint/2010/main" id="1" dur="indefinite" restart="never" nodeType="tmRoot"/>
       </p:par>
     </p:tnLst>
   </p:timing>
@@ -14090,8 +14141,8 @@
         </p:nvSpPr>
         <p:spPr>
           <a:xfrm>
-            <a:off x="295581" y="204998"/>
-            <a:ext cx="8596668" cy="1320800"/>
+            <a:off x="221686" y="204998"/>
+            <a:ext cx="6447501" cy="1320800"/>
           </a:xfrm>
         </p:spPr>
         <p:txBody>
@@ -14121,13 +14172,13 @@
         </p:nvSpPr>
         <p:spPr>
           <a:xfrm>
-            <a:off x="827664" y="4848002"/>
-            <a:ext cx="8788819" cy="1706288"/>
+            <a:off x="620749" y="4848002"/>
+            <a:ext cx="6591614" cy="1706288"/>
           </a:xfrm>
         </p:spPr>
         <p:txBody>
           <a:bodyPr>
-            <a:normAutofit fontScale="92500"/>
+            <a:normAutofit fontScale="85000" lnSpcReduction="20000"/>
           </a:bodyPr>
           <a:lstStyle/>
           <a:p>
@@ -14177,8 +14228,8 @@
         </p:blipFill>
         <p:spPr>
           <a:xfrm>
-            <a:off x="788756" y="876090"/>
-            <a:ext cx="4026402" cy="3388184"/>
+            <a:off x="591567" y="876090"/>
+            <a:ext cx="3019802" cy="3388184"/>
           </a:xfrm>
           <a:prstGeom prst="rect">
             <a:avLst/>
@@ -14216,8 +14267,8 @@
         </p:blipFill>
         <p:spPr>
           <a:xfrm>
-            <a:off x="5026818" y="879154"/>
-            <a:ext cx="3791336" cy="3385120"/>
+            <a:off x="3770114" y="879154"/>
+            <a:ext cx="2843502" cy="3385120"/>
           </a:xfrm>
           <a:prstGeom prst="rect">
             <a:avLst/>
@@ -14241,8 +14292,8 @@
         </p:nvSpPr>
         <p:spPr>
           <a:xfrm>
-            <a:off x="788756" y="4279138"/>
-            <a:ext cx="8029398" cy="276999"/>
+            <a:off x="591567" y="4279139"/>
+            <a:ext cx="6022049" cy="461665"/>
           </a:xfrm>
           <a:prstGeom prst="rect">
             <a:avLst/>
@@ -14266,11 +14317,7 @@
             </a:r>
             <a:r>
               <a:rPr lang="en-US" sz="1200" dirty="0" smtClean="0"/>
-              <a:t> </a:t>
-            </a:r>
-            <a:r>
-              <a:rPr lang="en-US" sz="1200" dirty="0" smtClean="0"/>
-              <a:t>du </a:t>
+              <a:t> du </a:t>
             </a:r>
             <a:r>
               <a:rPr lang="en-US" sz="1200" dirty="0" err="1" smtClean="0"/>
@@ -14305,7 +14352,7 @@
   <p:timing>
     <p:tnLst>
       <p:par>
-        <p:cTn id="1" dur="indefinite" restart="never" nodeType="tmRoot"/>
+        <p:cTn xmlns:p14="http://schemas.microsoft.com/office/powerpoint/2010/main" id="1" dur="indefinite" restart="never" nodeType="tmRoot"/>
       </p:par>
     </p:tnLst>
   </p:timing>
@@ -14370,8 +14417,8 @@
         </p:nvSpPr>
         <p:spPr>
           <a:xfrm>
-            <a:off x="5936355" y="1270566"/>
-            <a:ext cx="5578050" cy="5487551"/>
+            <a:off x="4452266" y="1270566"/>
+            <a:ext cx="4183538" cy="5487551"/>
           </a:xfrm>
         </p:spPr>
         <p:txBody>
@@ -14446,8 +14493,8 @@
         </p:blipFill>
         <p:spPr>
           <a:xfrm>
-            <a:off x="598360" y="1272017"/>
-            <a:ext cx="4928043" cy="5047864"/>
+            <a:off x="448771" y="1272017"/>
+            <a:ext cx="3696032" cy="5047864"/>
           </a:xfrm>
           <a:prstGeom prst="rect">
             <a:avLst/>
@@ -14471,8 +14518,8 @@
         </p:nvSpPr>
         <p:spPr>
           <a:xfrm>
-            <a:off x="1002907" y="6319881"/>
-            <a:ext cx="4118948" cy="276999"/>
+            <a:off x="242377" y="6319882"/>
+            <a:ext cx="4108817" cy="276999"/>
           </a:xfrm>
           <a:prstGeom prst="rect">
             <a:avLst/>
@@ -14529,7 +14576,7 @@
   <p:timing>
     <p:tnLst>
       <p:par>
-        <p:cTn id="1" dur="indefinite" restart="never" nodeType="tmRoot"/>
+        <p:cTn xmlns:p14="http://schemas.microsoft.com/office/powerpoint/2010/main" id="1" dur="indefinite" restart="never" nodeType="tmRoot"/>
       </p:par>
     </p:tnLst>
   </p:timing>
@@ -15345,7 +15392,7 @@
   <a:extraClrSchemeLst/>
   <a:extLst>
     <a:ext uri="{05A4C25C-085E-4340-85A3-A5531E510DB2}">
-      <thm15:themeFamily xmlns:thm15="http://schemas.microsoft.com/office/thememl/2012/main" name="Facet" id="{C0C680CD-088A-49FC-A102-D699147F32B2}" vid="{CFBC31BA-B70F-4F30-BCAA-4F3011E16C4D}"/>
+      <thm15:themeFamily xmlns:thm15="http://schemas.microsoft.com/office/thememl/2012/main" xmlns="" name="Facet" id="{C0C680CD-088A-49FC-A102-D699147F32B2}" vid="{CFBC31BA-B70F-4F30-BCAA-4F3011E16C4D}"/>
     </a:ext>
   </a:extLst>
 </a:theme>

</xml_diff>